<commit_message>
Readme, presentation and figures
</commit_message>
<xml_diff>
--- a/ZebraKet/ZebraKet.pptx
+++ b/ZebraKet/ZebraKet.pptx
@@ -7,6 +7,8 @@
   <p:sldIdLst>
     <p:sldId id="256" r:id="rId2"/>
     <p:sldId id="257" r:id="rId3"/>
+    <p:sldId id="258" r:id="rId4"/>
+    <p:sldId id="259" r:id="rId5"/>
   </p:sldIdLst>
   <p:sldSz cx="12192000" cy="6858000"/>
   <p:notesSz cx="6858000" cy="9144000"/>
@@ -116,6 +118,7 @@
 <file path=ppt/revisionInfo.xml><?xml version="1.0" encoding="utf-8"?>
 <p1510:revInfo xmlns:a="http://schemas.openxmlformats.org/drawingml/2006/main" xmlns:r="http://schemas.openxmlformats.org/officeDocument/2006/relationships" xmlns:p1510="http://schemas.microsoft.com/office/powerpoint/2015/10/main">
   <p1510:revLst>
+    <p1510:client id="{347333E8-42F3-4862-A9F8-CFD0F59E5ECB}" v="7" dt="2021-07-28T02:23:46.871"/>
     <p1510:client id="{BBEBDA30-66B9-4473-90D7-39906A7E1114}" v="6" dt="2021-07-27T22:29:25.086"/>
   </p1510:revLst>
 </p1510:revInfo>
@@ -123,6 +126,179 @@
 
 <file path=ppt/changesInfos/changesInfo1.xml><?xml version="1.0" encoding="utf-8"?>
 <pc:chgInfo xmlns:a="http://schemas.openxmlformats.org/drawingml/2006/main" xmlns:r="http://schemas.openxmlformats.org/officeDocument/2006/relationships" xmlns:ac="http://schemas.microsoft.com/office/drawing/2013/main/command" xmlns:pc="http://schemas.microsoft.com/office/powerpoint/2013/main/command">
+  <pc:docChgLst>
+    <pc:chgData name="Alex Khan" userId="3a873f7f057fbc28" providerId="LiveId" clId="{347333E8-42F3-4862-A9F8-CFD0F59E5ECB}"/>
+    <pc:docChg chg="custSel addSld modSld">
+      <pc:chgData name="Alex Khan" userId="3a873f7f057fbc28" providerId="LiveId" clId="{347333E8-42F3-4862-A9F8-CFD0F59E5ECB}" dt="2021-07-28T02:24:04.909" v="466" actId="1076"/>
+      <pc:docMkLst>
+        <pc:docMk/>
+      </pc:docMkLst>
+      <pc:sldChg chg="addSp modSp mod">
+        <pc:chgData name="Alex Khan" userId="3a873f7f057fbc28" providerId="LiveId" clId="{347333E8-42F3-4862-A9F8-CFD0F59E5ECB}" dt="2021-07-28T02:24:04.909" v="466" actId="1076"/>
+        <pc:sldMkLst>
+          <pc:docMk/>
+          <pc:sldMk cId="2525406007" sldId="256"/>
+        </pc:sldMkLst>
+        <pc:picChg chg="add mod">
+          <ac:chgData name="Alex Khan" userId="3a873f7f057fbc28" providerId="LiveId" clId="{347333E8-42F3-4862-A9F8-CFD0F59E5ECB}" dt="2021-07-28T02:24:04.909" v="466" actId="1076"/>
+          <ac:picMkLst>
+            <pc:docMk/>
+            <pc:sldMk cId="2525406007" sldId="256"/>
+            <ac:picMk id="4" creationId="{8632940D-9062-427C-BD67-719A559A3CF3}"/>
+          </ac:picMkLst>
+        </pc:picChg>
+      </pc:sldChg>
+      <pc:sldChg chg="addSp delSp modSp mod">
+        <pc:chgData name="Alex Khan" userId="3a873f7f057fbc28" providerId="LiveId" clId="{347333E8-42F3-4862-A9F8-CFD0F59E5ECB}" dt="2021-07-28T02:16:46.571" v="462" actId="170"/>
+        <pc:sldMkLst>
+          <pc:docMk/>
+          <pc:sldMk cId="3777364752" sldId="257"/>
+        </pc:sldMkLst>
+        <pc:spChg chg="mod">
+          <ac:chgData name="Alex Khan" userId="3a873f7f057fbc28" providerId="LiveId" clId="{347333E8-42F3-4862-A9F8-CFD0F59E5ECB}" dt="2021-07-28T02:04:25.921" v="53" actId="20577"/>
+          <ac:spMkLst>
+            <pc:docMk/>
+            <pc:sldMk cId="3777364752" sldId="257"/>
+            <ac:spMk id="2" creationId="{FB318E58-570B-4F4D-9CB4-DD4834E6E1A2}"/>
+          </ac:spMkLst>
+        </pc:spChg>
+        <pc:spChg chg="mod">
+          <ac:chgData name="Alex Khan" userId="3a873f7f057fbc28" providerId="LiveId" clId="{347333E8-42F3-4862-A9F8-CFD0F59E5ECB}" dt="2021-07-28T02:08:08.584" v="424" actId="20577"/>
+          <ac:spMkLst>
+            <pc:docMk/>
+            <pc:sldMk cId="3777364752" sldId="257"/>
+            <ac:spMk id="3" creationId="{EA59D45B-60E6-453D-9227-4385E4B04822}"/>
+          </ac:spMkLst>
+        </pc:spChg>
+        <pc:spChg chg="add mod">
+          <ac:chgData name="Alex Khan" userId="3a873f7f057fbc28" providerId="LiveId" clId="{347333E8-42F3-4862-A9F8-CFD0F59E5ECB}" dt="2021-07-28T02:15:27.401" v="442" actId="14861"/>
+          <ac:spMkLst>
+            <pc:docMk/>
+            <pc:sldMk cId="3777364752" sldId="257"/>
+            <ac:spMk id="4" creationId="{47B15490-F876-4C1A-A7ED-C88AE3E16C36}"/>
+          </ac:spMkLst>
+        </pc:spChg>
+        <pc:spChg chg="add mod">
+          <ac:chgData name="Alex Khan" userId="3a873f7f057fbc28" providerId="LiveId" clId="{347333E8-42F3-4862-A9F8-CFD0F59E5ECB}" dt="2021-07-28T02:15:27.401" v="442" actId="14861"/>
+          <ac:spMkLst>
+            <pc:docMk/>
+            <pc:sldMk cId="3777364752" sldId="257"/>
+            <ac:spMk id="7" creationId="{A040E231-076C-4673-8ADB-1BBF14BCF2AF}"/>
+          </ac:spMkLst>
+        </pc:spChg>
+        <pc:spChg chg="add mod">
+          <ac:chgData name="Alex Khan" userId="3a873f7f057fbc28" providerId="LiveId" clId="{347333E8-42F3-4862-A9F8-CFD0F59E5ECB}" dt="2021-07-28T02:15:27.401" v="442" actId="14861"/>
+          <ac:spMkLst>
+            <pc:docMk/>
+            <pc:sldMk cId="3777364752" sldId="257"/>
+            <ac:spMk id="9" creationId="{AB55D23D-2929-41A1-848E-4FAF426DAA58}"/>
+          </ac:spMkLst>
+        </pc:spChg>
+        <pc:spChg chg="add mod">
+          <ac:chgData name="Alex Khan" userId="3a873f7f057fbc28" providerId="LiveId" clId="{347333E8-42F3-4862-A9F8-CFD0F59E5ECB}" dt="2021-07-28T02:15:34.853" v="443" actId="14861"/>
+          <ac:spMkLst>
+            <pc:docMk/>
+            <pc:sldMk cId="3777364752" sldId="257"/>
+            <ac:spMk id="11" creationId="{89C57FF5-6F6B-411E-A95D-855466E06DF7}"/>
+          </ac:spMkLst>
+        </pc:spChg>
+        <pc:spChg chg="add mod">
+          <ac:chgData name="Alex Khan" userId="3a873f7f057fbc28" providerId="LiveId" clId="{347333E8-42F3-4862-A9F8-CFD0F59E5ECB}" dt="2021-07-28T02:16:41.949" v="461" actId="1076"/>
+          <ac:spMkLst>
+            <pc:docMk/>
+            <pc:sldMk cId="3777364752" sldId="257"/>
+            <ac:spMk id="15" creationId="{706C262C-7AE1-4ABA-B8E9-991151745307}"/>
+          </ac:spMkLst>
+        </pc:spChg>
+        <pc:spChg chg="add mod">
+          <ac:chgData name="Alex Khan" userId="3a873f7f057fbc28" providerId="LiveId" clId="{347333E8-42F3-4862-A9F8-CFD0F59E5ECB}" dt="2021-07-28T02:16:00.442" v="449" actId="1076"/>
+          <ac:spMkLst>
+            <pc:docMk/>
+            <pc:sldMk cId="3777364752" sldId="257"/>
+            <ac:spMk id="16" creationId="{E0C87FAB-D7E0-45C7-B13D-E44AAEB92F32}"/>
+          </ac:spMkLst>
+        </pc:spChg>
+        <pc:cxnChg chg="add mod">
+          <ac:chgData name="Alex Khan" userId="3a873f7f057fbc28" providerId="LiveId" clId="{347333E8-42F3-4862-A9F8-CFD0F59E5ECB}" dt="2021-07-28T02:12:53.105" v="438" actId="1076"/>
+          <ac:cxnSpMkLst>
+            <pc:docMk/>
+            <pc:sldMk cId="3777364752" sldId="257"/>
+            <ac:cxnSpMk id="6" creationId="{CFE3C244-4D31-445E-85CE-53C3174B2EC3}"/>
+          </ac:cxnSpMkLst>
+        </pc:cxnChg>
+        <pc:cxnChg chg="add mod">
+          <ac:chgData name="Alex Khan" userId="3a873f7f057fbc28" providerId="LiveId" clId="{347333E8-42F3-4862-A9F8-CFD0F59E5ECB}" dt="2021-07-28T02:12:53.105" v="438" actId="1076"/>
+          <ac:cxnSpMkLst>
+            <pc:docMk/>
+            <pc:sldMk cId="3777364752" sldId="257"/>
+            <ac:cxnSpMk id="8" creationId="{F5023A28-B079-4D7C-894D-CFFFF35383FF}"/>
+          </ac:cxnSpMkLst>
+        </pc:cxnChg>
+        <pc:cxnChg chg="add del mod">
+          <ac:chgData name="Alex Khan" userId="3a873f7f057fbc28" providerId="LiveId" clId="{347333E8-42F3-4862-A9F8-CFD0F59E5ECB}" dt="2021-07-28T02:12:00.321" v="433" actId="478"/>
+          <ac:cxnSpMkLst>
+            <pc:docMk/>
+            <pc:sldMk cId="3777364752" sldId="257"/>
+            <ac:cxnSpMk id="10" creationId="{E457D79E-B0E0-466E-9E6A-52E93237FDDD}"/>
+          </ac:cxnSpMkLst>
+        </pc:cxnChg>
+        <pc:cxnChg chg="add mod">
+          <ac:chgData name="Alex Khan" userId="3a873f7f057fbc28" providerId="LiveId" clId="{347333E8-42F3-4862-A9F8-CFD0F59E5ECB}" dt="2021-07-28T02:16:41.949" v="461" actId="1076"/>
+          <ac:cxnSpMkLst>
+            <pc:docMk/>
+            <pc:sldMk cId="3777364752" sldId="257"/>
+            <ac:cxnSpMk id="13" creationId="{B797188B-3276-4C06-8EE4-76B71C20F156}"/>
+          </ac:cxnSpMkLst>
+        </pc:cxnChg>
+        <pc:cxnChg chg="add mod ord">
+          <ac:chgData name="Alex Khan" userId="3a873f7f057fbc28" providerId="LiveId" clId="{347333E8-42F3-4862-A9F8-CFD0F59E5ECB}" dt="2021-07-28T02:16:46.571" v="462" actId="170"/>
+          <ac:cxnSpMkLst>
+            <pc:docMk/>
+            <pc:sldMk cId="3777364752" sldId="257"/>
+            <ac:cxnSpMk id="14" creationId="{6F890061-9C1F-4A3A-8926-919980F19D58}"/>
+          </ac:cxnSpMkLst>
+        </pc:cxnChg>
+        <pc:cxnChg chg="add mod">
+          <ac:chgData name="Alex Khan" userId="3a873f7f057fbc28" providerId="LiveId" clId="{347333E8-42F3-4862-A9F8-CFD0F59E5ECB}" dt="2021-07-28T02:16:31.014" v="458" actId="14100"/>
+          <ac:cxnSpMkLst>
+            <pc:docMk/>
+            <pc:sldMk cId="3777364752" sldId="257"/>
+            <ac:cxnSpMk id="18" creationId="{135EC877-5D45-436B-A28A-CBF1DF37B7C3}"/>
+          </ac:cxnSpMkLst>
+        </pc:cxnChg>
+      </pc:sldChg>
+      <pc:sldChg chg="modSp new mod">
+        <pc:chgData name="Alex Khan" userId="3a873f7f057fbc28" providerId="LiveId" clId="{347333E8-42F3-4862-A9F8-CFD0F59E5ECB}" dt="2021-07-28T02:04:42.540" v="70" actId="20577"/>
+        <pc:sldMkLst>
+          <pc:docMk/>
+          <pc:sldMk cId="3183133460" sldId="258"/>
+        </pc:sldMkLst>
+        <pc:spChg chg="mod">
+          <ac:chgData name="Alex Khan" userId="3a873f7f057fbc28" providerId="LiveId" clId="{347333E8-42F3-4862-A9F8-CFD0F59E5ECB}" dt="2021-07-28T02:04:42.540" v="70" actId="20577"/>
+          <ac:spMkLst>
+            <pc:docMk/>
+            <pc:sldMk cId="3183133460" sldId="258"/>
+            <ac:spMk id="2" creationId="{49ACE9E3-EE9F-48D1-BF7A-0B12768F7E8D}"/>
+          </ac:spMkLst>
+        </pc:spChg>
+      </pc:sldChg>
+      <pc:sldChg chg="modSp new mod">
+        <pc:chgData name="Alex Khan" userId="3a873f7f057fbc28" providerId="LiveId" clId="{347333E8-42F3-4862-A9F8-CFD0F59E5ECB}" dt="2021-07-28T02:05:01.931" v="105" actId="20577"/>
+        <pc:sldMkLst>
+          <pc:docMk/>
+          <pc:sldMk cId="2019088010" sldId="259"/>
+        </pc:sldMkLst>
+        <pc:spChg chg="mod">
+          <ac:chgData name="Alex Khan" userId="3a873f7f057fbc28" providerId="LiveId" clId="{347333E8-42F3-4862-A9F8-CFD0F59E5ECB}" dt="2021-07-28T02:05:01.931" v="105" actId="20577"/>
+          <ac:spMkLst>
+            <pc:docMk/>
+            <pc:sldMk cId="2019088010" sldId="259"/>
+            <ac:spMk id="2" creationId="{B4DEFB80-6FDC-49B1-867D-DFEC75A5A963}"/>
+          </ac:spMkLst>
+        </pc:spChg>
+      </pc:sldChg>
+    </pc:docChg>
+  </pc:docChgLst>
   <pc:docChgLst>
     <pc:chgData name="Alex Khan" userId="3a873f7f057fbc28" providerId="LiveId" clId="{BBEBDA30-66B9-4473-90D7-39906A7E1114}"/>
     <pc:docChg chg="custSel addSld delSld modSld">
@@ -3545,6 +3721,36 @@
           </a:prstGeom>
         </p:spPr>
       </p:pic>
+      <p:pic>
+        <p:nvPicPr>
+          <p:cNvPr id="4" name="Picture 3">
+            <a:extLst>
+              <a:ext uri="{FF2B5EF4-FFF2-40B4-BE49-F238E27FC236}">
+                <a16:creationId xmlns:a16="http://schemas.microsoft.com/office/drawing/2014/main" id="{8632940D-9062-427C-BD67-719A559A3CF3}"/>
+              </a:ext>
+            </a:extLst>
+          </p:cNvPr>
+          <p:cNvPicPr>
+            <a:picLocks noChangeAspect="1"/>
+          </p:cNvPicPr>
+          <p:nvPr/>
+        </p:nvPicPr>
+        <p:blipFill>
+          <a:blip r:embed="rId3"/>
+          <a:stretch>
+            <a:fillRect/>
+          </a:stretch>
+        </p:blipFill>
+        <p:spPr>
+          <a:xfrm>
+            <a:off x="3778919" y="5527070"/>
+            <a:ext cx="4394534" cy="1261247"/>
+          </a:xfrm>
+          <a:prstGeom prst="rect">
+            <a:avLst/>
+          </a:prstGeom>
+        </p:spPr>
+      </p:pic>
     </p:spTree>
     <p:extLst>
       <p:ext uri="{BB962C8B-B14F-4D97-AF65-F5344CB8AC3E}">
@@ -3596,39 +3802,742 @@
           <a:bodyPr/>
           <a:lstStyle/>
           <a:p>
+            <a:r>
+              <a:rPr lang="en-US" dirty="0"/>
+              <a:t>Motivation for the Problem we solved</a:t>
+            </a:r>
+          </a:p>
+        </p:txBody>
+      </p:sp>
+      <p:sp>
+        <p:nvSpPr>
+          <p:cNvPr id="3" name="Content Placeholder 2">
+            <a:extLst>
+              <a:ext uri="{FF2B5EF4-FFF2-40B4-BE49-F238E27FC236}">
+                <a16:creationId xmlns:a16="http://schemas.microsoft.com/office/drawing/2014/main" id="{EA59D45B-60E6-453D-9227-4385E4B04822}"/>
+              </a:ext>
+            </a:extLst>
+          </p:cNvPr>
+          <p:cNvSpPr>
+            <a:spLocks noGrp="1"/>
+          </p:cNvSpPr>
+          <p:nvPr>
+            <p:ph idx="1"/>
+          </p:nvPr>
+        </p:nvSpPr>
+        <p:spPr/>
+        <p:txBody>
+          <a:bodyPr>
+            <a:normAutofit fontScale="92500" lnSpcReduction="10000"/>
+          </a:bodyPr>
+          <a:lstStyle/>
+          <a:p>
+            <a:r>
+              <a:rPr lang="en-US" dirty="0"/>
+              <a:t>Most businesses are working with simple rules and process flow which are not optimized</a:t>
+            </a:r>
+          </a:p>
+          <a:p>
+            <a:r>
+              <a:rPr lang="en-US" dirty="0"/>
+              <a:t>Companies work with other firms with competing objectives</a:t>
+            </a:r>
+          </a:p>
+          <a:p>
             <a:endParaRPr lang="en-US" dirty="0"/>
           </a:p>
-        </p:txBody>
-      </p:sp>
-      <p:sp>
-        <p:nvSpPr>
-          <p:cNvPr id="3" name="Content Placeholder 2">
-            <a:extLst>
-              <a:ext uri="{FF2B5EF4-FFF2-40B4-BE49-F238E27FC236}">
-                <a16:creationId xmlns:a16="http://schemas.microsoft.com/office/drawing/2014/main" id="{EA59D45B-60E6-453D-9227-4385E4B04822}"/>
-              </a:ext>
-            </a:extLst>
-          </p:cNvPr>
-          <p:cNvSpPr>
-            <a:spLocks noGrp="1"/>
-          </p:cNvSpPr>
-          <p:nvPr>
-            <p:ph idx="1"/>
-          </p:nvPr>
-        </p:nvSpPr>
-        <p:spPr/>
-        <p:txBody>
-          <a:bodyPr/>
-          <a:lstStyle/>
-          <a:p>
+          <a:p>
+            <a:endParaRPr lang="en-US" dirty="0"/>
+          </a:p>
+          <a:p>
+            <a:endParaRPr lang="en-US" dirty="0"/>
+          </a:p>
+          <a:p>
+            <a:endParaRPr lang="en-US" dirty="0"/>
+          </a:p>
+          <a:p>
+            <a:endParaRPr lang="en-US" dirty="0"/>
+          </a:p>
+          <a:p>
+            <a:r>
+              <a:rPr lang="en-US" dirty="0"/>
+              <a:t>We wanted to find a way to use the QUBO method to optimize between a set of objectives to understand the benefits and challenges.</a:t>
+            </a:r>
+          </a:p>
+        </p:txBody>
+      </p:sp>
+      <p:sp>
+        <p:nvSpPr>
+          <p:cNvPr id="4" name="Flowchart: Alternate Process 3">
+            <a:extLst>
+              <a:ext uri="{FF2B5EF4-FFF2-40B4-BE49-F238E27FC236}">
+                <a16:creationId xmlns:a16="http://schemas.microsoft.com/office/drawing/2014/main" id="{47B15490-F876-4C1A-A7ED-C88AE3E16C36}"/>
+              </a:ext>
+            </a:extLst>
+          </p:cNvPr>
+          <p:cNvSpPr/>
+          <p:nvPr/>
+        </p:nvSpPr>
+        <p:spPr>
+          <a:xfrm>
+            <a:off x="762000" y="3712326"/>
+            <a:ext cx="1187116" cy="689811"/>
+          </a:xfrm>
+          <a:prstGeom prst="flowChartAlternateProcess">
+            <a:avLst/>
+          </a:prstGeom>
+          <a:effectLst>
+            <a:reflection blurRad="6350" stA="52000" endA="300" endPos="35000" dir="5400000" sy="-100000" algn="bl" rotWithShape="0"/>
+          </a:effectLst>
+        </p:spPr>
+        <p:style>
+          <a:lnRef idx="2">
+            <a:schemeClr val="dk1"/>
+          </a:lnRef>
+          <a:fillRef idx="1">
+            <a:schemeClr val="lt1"/>
+          </a:fillRef>
+          <a:effectRef idx="0">
+            <a:schemeClr val="dk1"/>
+          </a:effectRef>
+          <a:fontRef idx="minor">
+            <a:schemeClr val="dk1"/>
+          </a:fontRef>
+        </p:style>
+        <p:txBody>
+          <a:bodyPr rtlCol="0" anchor="ctr"/>
+          <a:lstStyle/>
+          <a:p>
+            <a:pPr algn="ctr"/>
             <a:endParaRPr lang="en-US"/>
           </a:p>
         </p:txBody>
       </p:sp>
+      <p:cxnSp>
+        <p:nvCxnSpPr>
+          <p:cNvPr id="6" name="Straight Arrow Connector 5">
+            <a:extLst>
+              <a:ext uri="{FF2B5EF4-FFF2-40B4-BE49-F238E27FC236}">
+                <a16:creationId xmlns:a16="http://schemas.microsoft.com/office/drawing/2014/main" id="{CFE3C244-4D31-445E-85CE-53C3174B2EC3}"/>
+              </a:ext>
+            </a:extLst>
+          </p:cNvPr>
+          <p:cNvCxnSpPr/>
+          <p:nvPr/>
+        </p:nvCxnSpPr>
+        <p:spPr>
+          <a:xfrm>
+            <a:off x="1949116" y="4041190"/>
+            <a:ext cx="561474" cy="0"/>
+          </a:xfrm>
+          <a:prstGeom prst="straightConnector1">
+            <a:avLst/>
+          </a:prstGeom>
+          <a:ln>
+            <a:tailEnd type="triangle"/>
+          </a:ln>
+        </p:spPr>
+        <p:style>
+          <a:lnRef idx="1">
+            <a:schemeClr val="dk1"/>
+          </a:lnRef>
+          <a:fillRef idx="0">
+            <a:schemeClr val="dk1"/>
+          </a:fillRef>
+          <a:effectRef idx="0">
+            <a:schemeClr val="dk1"/>
+          </a:effectRef>
+          <a:fontRef idx="minor">
+            <a:schemeClr val="tx1"/>
+          </a:fontRef>
+        </p:style>
+      </p:cxnSp>
+      <p:sp>
+        <p:nvSpPr>
+          <p:cNvPr id="7" name="Flowchart: Alternate Process 6">
+            <a:extLst>
+              <a:ext uri="{FF2B5EF4-FFF2-40B4-BE49-F238E27FC236}">
+                <a16:creationId xmlns:a16="http://schemas.microsoft.com/office/drawing/2014/main" id="{A040E231-076C-4673-8ADB-1BBF14BCF2AF}"/>
+              </a:ext>
+            </a:extLst>
+          </p:cNvPr>
+          <p:cNvSpPr/>
+          <p:nvPr/>
+        </p:nvSpPr>
+        <p:spPr>
+          <a:xfrm>
+            <a:off x="2510590" y="3712326"/>
+            <a:ext cx="1187116" cy="689811"/>
+          </a:xfrm>
+          <a:prstGeom prst="flowChartAlternateProcess">
+            <a:avLst/>
+          </a:prstGeom>
+          <a:effectLst>
+            <a:reflection blurRad="6350" stA="52000" endA="300" endPos="35000" dir="5400000" sy="-100000" algn="bl" rotWithShape="0"/>
+          </a:effectLst>
+        </p:spPr>
+        <p:style>
+          <a:lnRef idx="2">
+            <a:schemeClr val="dk1"/>
+          </a:lnRef>
+          <a:fillRef idx="1">
+            <a:schemeClr val="lt1"/>
+          </a:fillRef>
+          <a:effectRef idx="0">
+            <a:schemeClr val="dk1"/>
+          </a:effectRef>
+          <a:fontRef idx="minor">
+            <a:schemeClr val="dk1"/>
+          </a:fontRef>
+        </p:style>
+        <p:txBody>
+          <a:bodyPr rtlCol="0" anchor="ctr"/>
+          <a:lstStyle/>
+          <a:p>
+            <a:pPr algn="ctr"/>
+            <a:endParaRPr lang="en-US"/>
+          </a:p>
+        </p:txBody>
+      </p:sp>
+      <p:cxnSp>
+        <p:nvCxnSpPr>
+          <p:cNvPr id="8" name="Straight Arrow Connector 7">
+            <a:extLst>
+              <a:ext uri="{FF2B5EF4-FFF2-40B4-BE49-F238E27FC236}">
+                <a16:creationId xmlns:a16="http://schemas.microsoft.com/office/drawing/2014/main" id="{F5023A28-B079-4D7C-894D-CFFFF35383FF}"/>
+              </a:ext>
+            </a:extLst>
+          </p:cNvPr>
+          <p:cNvCxnSpPr/>
+          <p:nvPr/>
+        </p:nvCxnSpPr>
+        <p:spPr>
+          <a:xfrm>
+            <a:off x="3697706" y="4041190"/>
+            <a:ext cx="561474" cy="0"/>
+          </a:xfrm>
+          <a:prstGeom prst="straightConnector1">
+            <a:avLst/>
+          </a:prstGeom>
+          <a:ln>
+            <a:tailEnd type="triangle"/>
+          </a:ln>
+        </p:spPr>
+        <p:style>
+          <a:lnRef idx="1">
+            <a:schemeClr val="dk1"/>
+          </a:lnRef>
+          <a:fillRef idx="0">
+            <a:schemeClr val="dk1"/>
+          </a:fillRef>
+          <a:effectRef idx="0">
+            <a:schemeClr val="dk1"/>
+          </a:effectRef>
+          <a:fontRef idx="minor">
+            <a:schemeClr val="tx1"/>
+          </a:fontRef>
+        </p:style>
+      </p:cxnSp>
+      <p:sp>
+        <p:nvSpPr>
+          <p:cNvPr id="9" name="Flowchart: Alternate Process 8">
+            <a:extLst>
+              <a:ext uri="{FF2B5EF4-FFF2-40B4-BE49-F238E27FC236}">
+                <a16:creationId xmlns:a16="http://schemas.microsoft.com/office/drawing/2014/main" id="{AB55D23D-2929-41A1-848E-4FAF426DAA58}"/>
+              </a:ext>
+            </a:extLst>
+          </p:cNvPr>
+          <p:cNvSpPr/>
+          <p:nvPr/>
+        </p:nvSpPr>
+        <p:spPr>
+          <a:xfrm>
+            <a:off x="4259180" y="3710905"/>
+            <a:ext cx="1187116" cy="689811"/>
+          </a:xfrm>
+          <a:prstGeom prst="flowChartAlternateProcess">
+            <a:avLst/>
+          </a:prstGeom>
+          <a:effectLst>
+            <a:reflection blurRad="6350" stA="52000" endA="300" endPos="35000" dir="5400000" sy="-100000" algn="bl" rotWithShape="0"/>
+          </a:effectLst>
+        </p:spPr>
+        <p:style>
+          <a:lnRef idx="2">
+            <a:schemeClr val="dk1"/>
+          </a:lnRef>
+          <a:fillRef idx="1">
+            <a:schemeClr val="lt1"/>
+          </a:fillRef>
+          <a:effectRef idx="0">
+            <a:schemeClr val="dk1"/>
+          </a:effectRef>
+          <a:fontRef idx="minor">
+            <a:schemeClr val="dk1"/>
+          </a:fontRef>
+        </p:style>
+        <p:txBody>
+          <a:bodyPr rtlCol="0" anchor="ctr"/>
+          <a:lstStyle/>
+          <a:p>
+            <a:pPr algn="ctr"/>
+            <a:endParaRPr lang="en-US"/>
+          </a:p>
+        </p:txBody>
+      </p:sp>
+      <p:sp>
+        <p:nvSpPr>
+          <p:cNvPr id="11" name="Flowchart: Process 10">
+            <a:extLst>
+              <a:ext uri="{FF2B5EF4-FFF2-40B4-BE49-F238E27FC236}">
+                <a16:creationId xmlns:a16="http://schemas.microsoft.com/office/drawing/2014/main" id="{89C57FF5-6F6B-411E-A95D-855466E06DF7}"/>
+              </a:ext>
+            </a:extLst>
+          </p:cNvPr>
+          <p:cNvSpPr/>
+          <p:nvPr/>
+        </p:nvSpPr>
+        <p:spPr>
+          <a:xfrm>
+            <a:off x="7603958" y="3575968"/>
+            <a:ext cx="561474" cy="955927"/>
+          </a:xfrm>
+          <a:prstGeom prst="flowChartProcess">
+            <a:avLst/>
+          </a:prstGeom>
+          <a:effectLst>
+            <a:outerShdw blurRad="152400" dist="317500" dir="5400000" sx="90000" sy="-19000" rotWithShape="0">
+              <a:prstClr val="black">
+                <a:alpha val="15000"/>
+              </a:prstClr>
+            </a:outerShdw>
+            <a:reflection blurRad="6350" stA="52000" endA="300" endPos="35000" dir="5400000" sy="-100000" algn="bl" rotWithShape="0"/>
+          </a:effectLst>
+        </p:spPr>
+        <p:style>
+          <a:lnRef idx="2">
+            <a:schemeClr val="dk1"/>
+          </a:lnRef>
+          <a:fillRef idx="1">
+            <a:schemeClr val="lt1"/>
+          </a:fillRef>
+          <a:effectRef idx="0">
+            <a:schemeClr val="dk1"/>
+          </a:effectRef>
+          <a:fontRef idx="minor">
+            <a:schemeClr val="dk1"/>
+          </a:fontRef>
+        </p:style>
+        <p:txBody>
+          <a:bodyPr rtlCol="0" anchor="ctr"/>
+          <a:lstStyle/>
+          <a:p>
+            <a:pPr algn="ctr"/>
+            <a:endParaRPr lang="en-US"/>
+          </a:p>
+        </p:txBody>
+      </p:sp>
+      <p:cxnSp>
+        <p:nvCxnSpPr>
+          <p:cNvPr id="13" name="Straight Arrow Connector 12">
+            <a:extLst>
+              <a:ext uri="{FF2B5EF4-FFF2-40B4-BE49-F238E27FC236}">
+                <a16:creationId xmlns:a16="http://schemas.microsoft.com/office/drawing/2014/main" id="{B797188B-3276-4C06-8EE4-76B71C20F156}"/>
+              </a:ext>
+            </a:extLst>
+          </p:cNvPr>
+          <p:cNvCxnSpPr>
+            <a:cxnSpLocks/>
+            <a:endCxn id="15" idx="1"/>
+          </p:cNvCxnSpPr>
+          <p:nvPr/>
+        </p:nvCxnSpPr>
+        <p:spPr>
+          <a:xfrm flipV="1">
+            <a:off x="8143378" y="3695827"/>
+            <a:ext cx="1132970" cy="149784"/>
+          </a:xfrm>
+          <a:prstGeom prst="straightConnector1">
+            <a:avLst/>
+          </a:prstGeom>
+          <a:ln>
+            <a:headEnd type="triangle"/>
+            <a:tailEnd type="triangle"/>
+          </a:ln>
+        </p:spPr>
+        <p:style>
+          <a:lnRef idx="1">
+            <a:schemeClr val="dk1"/>
+          </a:lnRef>
+          <a:fillRef idx="0">
+            <a:schemeClr val="dk1"/>
+          </a:fillRef>
+          <a:effectRef idx="0">
+            <a:schemeClr val="dk1"/>
+          </a:effectRef>
+          <a:fontRef idx="minor">
+            <a:schemeClr val="tx1"/>
+          </a:fontRef>
+        </p:style>
+      </p:cxnSp>
+      <p:sp>
+        <p:nvSpPr>
+          <p:cNvPr id="15" name="Flowchart: Process 14">
+            <a:extLst>
+              <a:ext uri="{FF2B5EF4-FFF2-40B4-BE49-F238E27FC236}">
+                <a16:creationId xmlns:a16="http://schemas.microsoft.com/office/drawing/2014/main" id="{706C262C-7AE1-4ABA-B8E9-991151745307}"/>
+              </a:ext>
+            </a:extLst>
+          </p:cNvPr>
+          <p:cNvSpPr/>
+          <p:nvPr/>
+        </p:nvSpPr>
+        <p:spPr>
+          <a:xfrm>
+            <a:off x="9276348" y="3217863"/>
+            <a:ext cx="561474" cy="955927"/>
+          </a:xfrm>
+          <a:prstGeom prst="flowChartProcess">
+            <a:avLst/>
+          </a:prstGeom>
+          <a:effectLst>
+            <a:outerShdw blurRad="152400" dist="317500" dir="5400000" sx="90000" sy="-19000" rotWithShape="0">
+              <a:prstClr val="black">
+                <a:alpha val="15000"/>
+              </a:prstClr>
+            </a:outerShdw>
+            <a:reflection blurRad="6350" stA="52000" endA="300" endPos="35000" dir="5400000" sy="-100000" algn="bl" rotWithShape="0"/>
+          </a:effectLst>
+        </p:spPr>
+        <p:style>
+          <a:lnRef idx="2">
+            <a:schemeClr val="dk1"/>
+          </a:lnRef>
+          <a:fillRef idx="1">
+            <a:schemeClr val="lt1"/>
+          </a:fillRef>
+          <a:effectRef idx="0">
+            <a:schemeClr val="dk1"/>
+          </a:effectRef>
+          <a:fontRef idx="minor">
+            <a:schemeClr val="dk1"/>
+          </a:fontRef>
+        </p:style>
+        <p:txBody>
+          <a:bodyPr rtlCol="0" anchor="ctr"/>
+          <a:lstStyle/>
+          <a:p>
+            <a:pPr algn="ctr"/>
+            <a:endParaRPr lang="en-US"/>
+          </a:p>
+        </p:txBody>
+      </p:sp>
+      <p:cxnSp>
+        <p:nvCxnSpPr>
+          <p:cNvPr id="14" name="Straight Arrow Connector 13">
+            <a:extLst>
+              <a:ext uri="{FF2B5EF4-FFF2-40B4-BE49-F238E27FC236}">
+                <a16:creationId xmlns:a16="http://schemas.microsoft.com/office/drawing/2014/main" id="{6F890061-9C1F-4A3A-8926-919980F19D58}"/>
+              </a:ext>
+            </a:extLst>
+          </p:cNvPr>
+          <p:cNvCxnSpPr>
+            <a:cxnSpLocks/>
+          </p:cNvCxnSpPr>
+          <p:nvPr/>
+        </p:nvCxnSpPr>
+        <p:spPr>
+          <a:xfrm flipV="1">
+            <a:off x="9180094" y="3994484"/>
+            <a:ext cx="300790" cy="585538"/>
+          </a:xfrm>
+          <a:prstGeom prst="straightConnector1">
+            <a:avLst/>
+          </a:prstGeom>
+          <a:ln>
+            <a:headEnd type="triangle"/>
+            <a:tailEnd type="triangle"/>
+          </a:ln>
+        </p:spPr>
+        <p:style>
+          <a:lnRef idx="1">
+            <a:schemeClr val="dk1"/>
+          </a:lnRef>
+          <a:fillRef idx="0">
+            <a:schemeClr val="dk1"/>
+          </a:fillRef>
+          <a:effectRef idx="0">
+            <a:schemeClr val="dk1"/>
+          </a:effectRef>
+          <a:fontRef idx="minor">
+            <a:schemeClr val="tx1"/>
+          </a:fontRef>
+        </p:style>
+      </p:cxnSp>
+      <p:sp>
+        <p:nvSpPr>
+          <p:cNvPr id="16" name="Flowchart: Process 15">
+            <a:extLst>
+              <a:ext uri="{FF2B5EF4-FFF2-40B4-BE49-F238E27FC236}">
+                <a16:creationId xmlns:a16="http://schemas.microsoft.com/office/drawing/2014/main" id="{E0C87FAB-D7E0-45C7-B13D-E44AAEB92F32}"/>
+              </a:ext>
+            </a:extLst>
+          </p:cNvPr>
+          <p:cNvSpPr/>
+          <p:nvPr/>
+        </p:nvSpPr>
+        <p:spPr>
+          <a:xfrm>
+            <a:off x="8618620" y="3922752"/>
+            <a:ext cx="561474" cy="955927"/>
+          </a:xfrm>
+          <a:prstGeom prst="flowChartProcess">
+            <a:avLst/>
+          </a:prstGeom>
+          <a:effectLst>
+            <a:outerShdw blurRad="152400" dist="317500" dir="5400000" sx="90000" sy="-19000" rotWithShape="0">
+              <a:prstClr val="black">
+                <a:alpha val="15000"/>
+              </a:prstClr>
+            </a:outerShdw>
+            <a:reflection blurRad="6350" stA="52000" endA="300" endPos="35000" dir="5400000" sy="-100000" algn="bl" rotWithShape="0"/>
+          </a:effectLst>
+        </p:spPr>
+        <p:style>
+          <a:lnRef idx="2">
+            <a:schemeClr val="dk1"/>
+          </a:lnRef>
+          <a:fillRef idx="1">
+            <a:schemeClr val="lt1"/>
+          </a:fillRef>
+          <a:effectRef idx="0">
+            <a:schemeClr val="dk1"/>
+          </a:effectRef>
+          <a:fontRef idx="minor">
+            <a:schemeClr val="dk1"/>
+          </a:fontRef>
+        </p:style>
+        <p:txBody>
+          <a:bodyPr rtlCol="0" anchor="ctr"/>
+          <a:lstStyle/>
+          <a:p>
+            <a:pPr algn="ctr"/>
+            <a:endParaRPr lang="en-US"/>
+          </a:p>
+        </p:txBody>
+      </p:sp>
+      <p:cxnSp>
+        <p:nvCxnSpPr>
+          <p:cNvPr id="18" name="Straight Arrow Connector 17">
+            <a:extLst>
+              <a:ext uri="{FF2B5EF4-FFF2-40B4-BE49-F238E27FC236}">
+                <a16:creationId xmlns:a16="http://schemas.microsoft.com/office/drawing/2014/main" id="{135EC877-5D45-436B-A28A-CBF1DF37B7C3}"/>
+              </a:ext>
+            </a:extLst>
+          </p:cNvPr>
+          <p:cNvCxnSpPr>
+            <a:cxnSpLocks/>
+          </p:cNvCxnSpPr>
+          <p:nvPr/>
+        </p:nvCxnSpPr>
+        <p:spPr>
+          <a:xfrm flipH="1" flipV="1">
+            <a:off x="8029074" y="4188868"/>
+            <a:ext cx="589546" cy="391155"/>
+          </a:xfrm>
+          <a:prstGeom prst="straightConnector1">
+            <a:avLst/>
+          </a:prstGeom>
+          <a:ln>
+            <a:headEnd type="triangle"/>
+            <a:tailEnd type="triangle"/>
+          </a:ln>
+        </p:spPr>
+        <p:style>
+          <a:lnRef idx="1">
+            <a:schemeClr val="dk1"/>
+          </a:lnRef>
+          <a:fillRef idx="0">
+            <a:schemeClr val="dk1"/>
+          </a:fillRef>
+          <a:effectRef idx="0">
+            <a:schemeClr val="dk1"/>
+          </a:effectRef>
+          <a:fontRef idx="minor">
+            <a:schemeClr val="tx1"/>
+          </a:fontRef>
+        </p:style>
+      </p:cxnSp>
     </p:spTree>
     <p:extLst>
       <p:ext uri="{BB962C8B-B14F-4D97-AF65-F5344CB8AC3E}">
         <p14:creationId xmlns:p14="http://schemas.microsoft.com/office/powerpoint/2010/main" val="3777364752"/>
+      </p:ext>
+    </p:extLst>
+  </p:cSld>
+  <p:clrMapOvr>
+    <a:masterClrMapping/>
+  </p:clrMapOvr>
+</p:sld>
+</file>
+
+<file path=ppt/slides/slide3.xml><?xml version="1.0" encoding="utf-8"?>
+<p:sld xmlns:a="http://schemas.openxmlformats.org/drawingml/2006/main" xmlns:r="http://schemas.openxmlformats.org/officeDocument/2006/relationships" xmlns:p="http://schemas.openxmlformats.org/presentationml/2006/main">
+  <p:cSld>
+    <p:spTree>
+      <p:nvGrpSpPr>
+        <p:cNvPr id="1" name=""/>
+        <p:cNvGrpSpPr/>
+        <p:nvPr/>
+      </p:nvGrpSpPr>
+      <p:grpSpPr>
+        <a:xfrm>
+          <a:off x="0" y="0"/>
+          <a:ext cx="0" cy="0"/>
+          <a:chOff x="0" y="0"/>
+          <a:chExt cx="0" cy="0"/>
+        </a:xfrm>
+      </p:grpSpPr>
+      <p:sp>
+        <p:nvSpPr>
+          <p:cNvPr id="2" name="Title 1">
+            <a:extLst>
+              <a:ext uri="{FF2B5EF4-FFF2-40B4-BE49-F238E27FC236}">
+                <a16:creationId xmlns:a16="http://schemas.microsoft.com/office/drawing/2014/main" id="{49ACE9E3-EE9F-48D1-BF7A-0B12768F7E8D}"/>
+              </a:ext>
+            </a:extLst>
+          </p:cNvPr>
+          <p:cNvSpPr>
+            <a:spLocks noGrp="1"/>
+          </p:cNvSpPr>
+          <p:nvPr>
+            <p:ph type="title"/>
+          </p:nvPr>
+        </p:nvSpPr>
+        <p:spPr/>
+        <p:txBody>
+          <a:bodyPr/>
+          <a:lstStyle/>
+          <a:p>
+            <a:r>
+              <a:rPr lang="en-US" dirty="0"/>
+              <a:t>Data and Results</a:t>
+            </a:r>
+          </a:p>
+        </p:txBody>
+      </p:sp>
+      <p:sp>
+        <p:nvSpPr>
+          <p:cNvPr id="3" name="Content Placeholder 2">
+            <a:extLst>
+              <a:ext uri="{FF2B5EF4-FFF2-40B4-BE49-F238E27FC236}">
+                <a16:creationId xmlns:a16="http://schemas.microsoft.com/office/drawing/2014/main" id="{0D35F901-2ADE-44E9-9625-508BEA63ED07}"/>
+              </a:ext>
+            </a:extLst>
+          </p:cNvPr>
+          <p:cNvSpPr>
+            <a:spLocks noGrp="1"/>
+          </p:cNvSpPr>
+          <p:nvPr>
+            <p:ph idx="1"/>
+          </p:nvPr>
+        </p:nvSpPr>
+        <p:spPr/>
+        <p:txBody>
+          <a:bodyPr/>
+          <a:lstStyle/>
+          <a:p>
+            <a:endParaRPr lang="en-US"/>
+          </a:p>
+        </p:txBody>
+      </p:sp>
+    </p:spTree>
+    <p:extLst>
+      <p:ext uri="{BB962C8B-B14F-4D97-AF65-F5344CB8AC3E}">
+        <p14:creationId xmlns:p14="http://schemas.microsoft.com/office/powerpoint/2010/main" val="3183133460"/>
+      </p:ext>
+    </p:extLst>
+  </p:cSld>
+  <p:clrMapOvr>
+    <a:masterClrMapping/>
+  </p:clrMapOvr>
+</p:sld>
+</file>
+
+<file path=ppt/slides/slide4.xml><?xml version="1.0" encoding="utf-8"?>
+<p:sld xmlns:a="http://schemas.openxmlformats.org/drawingml/2006/main" xmlns:r="http://schemas.openxmlformats.org/officeDocument/2006/relationships" xmlns:p="http://schemas.openxmlformats.org/presentationml/2006/main">
+  <p:cSld>
+    <p:spTree>
+      <p:nvGrpSpPr>
+        <p:cNvPr id="1" name=""/>
+        <p:cNvGrpSpPr/>
+        <p:nvPr/>
+      </p:nvGrpSpPr>
+      <p:grpSpPr>
+        <a:xfrm>
+          <a:off x="0" y="0"/>
+          <a:ext cx="0" cy="0"/>
+          <a:chOff x="0" y="0"/>
+          <a:chExt cx="0" cy="0"/>
+        </a:xfrm>
+      </p:grpSpPr>
+      <p:sp>
+        <p:nvSpPr>
+          <p:cNvPr id="2" name="Title 1">
+            <a:extLst>
+              <a:ext uri="{FF2B5EF4-FFF2-40B4-BE49-F238E27FC236}">
+                <a16:creationId xmlns:a16="http://schemas.microsoft.com/office/drawing/2014/main" id="{B4DEFB80-6FDC-49B1-867D-DFEC75A5A963}"/>
+              </a:ext>
+            </a:extLst>
+          </p:cNvPr>
+          <p:cNvSpPr>
+            <a:spLocks noGrp="1"/>
+          </p:cNvSpPr>
+          <p:nvPr>
+            <p:ph type="title"/>
+          </p:nvPr>
+        </p:nvSpPr>
+        <p:spPr/>
+        <p:txBody>
+          <a:bodyPr/>
+          <a:lstStyle/>
+          <a:p>
+            <a:r>
+              <a:rPr lang="en-US" dirty="0"/>
+              <a:t>Observations and Lessons Learned</a:t>
+            </a:r>
+          </a:p>
+        </p:txBody>
+      </p:sp>
+      <p:sp>
+        <p:nvSpPr>
+          <p:cNvPr id="3" name="Content Placeholder 2">
+            <a:extLst>
+              <a:ext uri="{FF2B5EF4-FFF2-40B4-BE49-F238E27FC236}">
+                <a16:creationId xmlns:a16="http://schemas.microsoft.com/office/drawing/2014/main" id="{97388C2B-7AED-46B7-92CE-EB873D293EBF}"/>
+              </a:ext>
+            </a:extLst>
+          </p:cNvPr>
+          <p:cNvSpPr>
+            <a:spLocks noGrp="1"/>
+          </p:cNvSpPr>
+          <p:nvPr>
+            <p:ph idx="1"/>
+          </p:nvPr>
+        </p:nvSpPr>
+        <p:spPr/>
+        <p:txBody>
+          <a:bodyPr/>
+          <a:lstStyle/>
+          <a:p>
+            <a:endParaRPr lang="en-US" dirty="0"/>
+          </a:p>
+        </p:txBody>
+      </p:sp>
+    </p:spTree>
+    <p:extLst>
+      <p:ext uri="{BB962C8B-B14F-4D97-AF65-F5344CB8AC3E}">
+        <p14:creationId xmlns:p14="http://schemas.microsoft.com/office/powerpoint/2010/main" val="2019088010"/>
       </p:ext>
     </p:extLst>
   </p:cSld>

</xml_diff>

<commit_message>
Updated powerpoint and images
</commit_message>
<xml_diff>
--- a/ZebraKet/ZebraKet.pptx
+++ b/ZebraKet/ZebraKet.pptx
@@ -7,8 +7,9 @@
   <p:sldIdLst>
     <p:sldId id="256" r:id="rId2"/>
     <p:sldId id="257" r:id="rId3"/>
-    <p:sldId id="258" r:id="rId4"/>
-    <p:sldId id="259" r:id="rId5"/>
+    <p:sldId id="261" r:id="rId4"/>
+    <p:sldId id="263" r:id="rId5"/>
+    <p:sldId id="262" r:id="rId6"/>
   </p:sldIdLst>
   <p:sldSz cx="12192000" cy="6858000"/>
   <p:notesSz cx="6858000" cy="9144000"/>
@@ -118,7 +119,7 @@
 <file path=ppt/revisionInfo.xml><?xml version="1.0" encoding="utf-8"?>
 <p1510:revInfo xmlns:a="http://schemas.openxmlformats.org/drawingml/2006/main" xmlns:r="http://schemas.openxmlformats.org/officeDocument/2006/relationships" xmlns:p1510="http://schemas.microsoft.com/office/powerpoint/2015/10/main">
   <p1510:revLst>
-    <p1510:client id="{347333E8-42F3-4862-A9F8-CFD0F59E5ECB}" v="7" dt="2021-07-28T02:23:46.871"/>
+    <p1510:client id="{347333E8-42F3-4862-A9F8-CFD0F59E5ECB}" v="16" dt="2021-07-28T13:06:48.442"/>
     <p1510:client id="{BBEBDA30-66B9-4473-90D7-39906A7E1114}" v="6" dt="2021-07-27T22:29:25.086"/>
   </p1510:revLst>
 </p1510:revInfo>
@@ -128,34 +129,58 @@
 <pc:chgInfo xmlns:a="http://schemas.openxmlformats.org/drawingml/2006/main" xmlns:r="http://schemas.openxmlformats.org/officeDocument/2006/relationships" xmlns:ac="http://schemas.microsoft.com/office/drawing/2013/main/command" xmlns:pc="http://schemas.microsoft.com/office/powerpoint/2013/main/command">
   <pc:docChgLst>
     <pc:chgData name="Alex Khan" userId="3a873f7f057fbc28" providerId="LiveId" clId="{347333E8-42F3-4862-A9F8-CFD0F59E5ECB}"/>
-    <pc:docChg chg="custSel addSld modSld">
-      <pc:chgData name="Alex Khan" userId="3a873f7f057fbc28" providerId="LiveId" clId="{347333E8-42F3-4862-A9F8-CFD0F59E5ECB}" dt="2021-07-28T02:24:04.909" v="466" actId="1076"/>
+    <pc:docChg chg="undo custSel addSld delSld modSld sldOrd">
+      <pc:chgData name="Alex Khan" userId="3a873f7f057fbc28" providerId="LiveId" clId="{347333E8-42F3-4862-A9F8-CFD0F59E5ECB}" dt="2021-07-28T13:07:00.604" v="946" actId="1076"/>
       <pc:docMkLst>
         <pc:docMk/>
       </pc:docMkLst>
-      <pc:sldChg chg="addSp modSp mod">
-        <pc:chgData name="Alex Khan" userId="3a873f7f057fbc28" providerId="LiveId" clId="{347333E8-42F3-4862-A9F8-CFD0F59E5ECB}" dt="2021-07-28T02:24:04.909" v="466" actId="1076"/>
+      <pc:sldChg chg="addSp delSp modSp mod">
+        <pc:chgData name="Alex Khan" userId="3a873f7f057fbc28" providerId="LiveId" clId="{347333E8-42F3-4862-A9F8-CFD0F59E5ECB}" dt="2021-07-28T12:49:47.916" v="572" actId="14100"/>
         <pc:sldMkLst>
           <pc:docMk/>
           <pc:sldMk cId="2525406007" sldId="256"/>
         </pc:sldMkLst>
-        <pc:picChg chg="add mod">
-          <ac:chgData name="Alex Khan" userId="3a873f7f057fbc28" providerId="LiveId" clId="{347333E8-42F3-4862-A9F8-CFD0F59E5ECB}" dt="2021-07-28T02:24:04.909" v="466" actId="1076"/>
+        <pc:spChg chg="mod">
+          <ac:chgData name="Alex Khan" userId="3a873f7f057fbc28" providerId="LiveId" clId="{347333E8-42F3-4862-A9F8-CFD0F59E5ECB}" dt="2021-07-28T12:49:47.916" v="572" actId="14100"/>
+          <ac:spMkLst>
+            <pc:docMk/>
+            <pc:sldMk cId="2525406007" sldId="256"/>
+            <ac:spMk id="2" creationId="{AE878046-98E5-479C-843E-01D136A521A8}"/>
+          </ac:spMkLst>
+        </pc:spChg>
+        <pc:picChg chg="add del mod">
+          <ac:chgData name="Alex Khan" userId="3a873f7f057fbc28" providerId="LiveId" clId="{347333E8-42F3-4862-A9F8-CFD0F59E5ECB}" dt="2021-07-28T04:16:49.615" v="467" actId="478"/>
           <ac:picMkLst>
             <pc:docMk/>
             <pc:sldMk cId="2525406007" sldId="256"/>
             <ac:picMk id="4" creationId="{8632940D-9062-427C-BD67-719A559A3CF3}"/>
           </ac:picMkLst>
         </pc:picChg>
+        <pc:picChg chg="add mod">
+          <ac:chgData name="Alex Khan" userId="3a873f7f057fbc28" providerId="LiveId" clId="{347333E8-42F3-4862-A9F8-CFD0F59E5ECB}" dt="2021-07-28T04:17:01.676" v="472" actId="1076"/>
+          <ac:picMkLst>
+            <pc:docMk/>
+            <pc:sldMk cId="2525406007" sldId="256"/>
+            <ac:picMk id="6" creationId="{9C6E3DFD-2B50-4C85-88AD-0FDA2D1AE8AC}"/>
+          </ac:picMkLst>
+        </pc:picChg>
+        <pc:picChg chg="mod">
+          <ac:chgData name="Alex Khan" userId="3a873f7f057fbc28" providerId="LiveId" clId="{347333E8-42F3-4862-A9F8-CFD0F59E5ECB}" dt="2021-07-28T12:49:47.916" v="572" actId="14100"/>
+          <ac:picMkLst>
+            <pc:docMk/>
+            <pc:sldMk cId="2525406007" sldId="256"/>
+            <ac:picMk id="7" creationId="{092045CF-DCAA-4DCC-BE8E-B6D21426E524}"/>
+          </ac:picMkLst>
+        </pc:picChg>
       </pc:sldChg>
       <pc:sldChg chg="addSp delSp modSp mod">
-        <pc:chgData name="Alex Khan" userId="3a873f7f057fbc28" providerId="LiveId" clId="{347333E8-42F3-4862-A9F8-CFD0F59E5ECB}" dt="2021-07-28T02:16:46.571" v="462" actId="170"/>
+        <pc:chgData name="Alex Khan" userId="3a873f7f057fbc28" providerId="LiveId" clId="{347333E8-42F3-4862-A9F8-CFD0F59E5ECB}" dt="2021-07-28T13:07:00.604" v="946" actId="1076"/>
         <pc:sldMkLst>
           <pc:docMk/>
           <pc:sldMk cId="3777364752" sldId="257"/>
         </pc:sldMkLst>
         <pc:spChg chg="mod">
-          <ac:chgData name="Alex Khan" userId="3a873f7f057fbc28" providerId="LiveId" clId="{347333E8-42F3-4862-A9F8-CFD0F59E5ECB}" dt="2021-07-28T02:04:25.921" v="53" actId="20577"/>
+          <ac:chgData name="Alex Khan" userId="3a873f7f057fbc28" providerId="LiveId" clId="{347333E8-42F3-4862-A9F8-CFD0F59E5ECB}" dt="2021-07-28T04:18:25.984" v="566" actId="20577"/>
           <ac:spMkLst>
             <pc:docMk/>
             <pc:sldMk cId="3777364752" sldId="257"/>
@@ -163,71 +188,127 @@
           </ac:spMkLst>
         </pc:spChg>
         <pc:spChg chg="mod">
-          <ac:chgData name="Alex Khan" userId="3a873f7f057fbc28" providerId="LiveId" clId="{347333E8-42F3-4862-A9F8-CFD0F59E5ECB}" dt="2021-07-28T02:08:08.584" v="424" actId="20577"/>
+          <ac:chgData name="Alex Khan" userId="3a873f7f057fbc28" providerId="LiveId" clId="{347333E8-42F3-4862-A9F8-CFD0F59E5ECB}" dt="2021-07-28T12:54:09.635" v="834" actId="15"/>
           <ac:spMkLst>
             <pc:docMk/>
             <pc:sldMk cId="3777364752" sldId="257"/>
             <ac:spMk id="3" creationId="{EA59D45B-60E6-453D-9227-4385E4B04822}"/>
           </ac:spMkLst>
         </pc:spChg>
-        <pc:spChg chg="add mod">
-          <ac:chgData name="Alex Khan" userId="3a873f7f057fbc28" providerId="LiveId" clId="{347333E8-42F3-4862-A9F8-CFD0F59E5ECB}" dt="2021-07-28T02:15:27.401" v="442" actId="14861"/>
+        <pc:spChg chg="add del mod">
+          <ac:chgData name="Alex Khan" userId="3a873f7f057fbc28" providerId="LiveId" clId="{347333E8-42F3-4862-A9F8-CFD0F59E5ECB}" dt="2021-07-28T12:50:33.153" v="576" actId="478"/>
           <ac:spMkLst>
             <pc:docMk/>
             <pc:sldMk cId="3777364752" sldId="257"/>
             <ac:spMk id="4" creationId="{47B15490-F876-4C1A-A7ED-C88AE3E16C36}"/>
           </ac:spMkLst>
         </pc:spChg>
-        <pc:spChg chg="add mod">
-          <ac:chgData name="Alex Khan" userId="3a873f7f057fbc28" providerId="LiveId" clId="{347333E8-42F3-4862-A9F8-CFD0F59E5ECB}" dt="2021-07-28T02:15:27.401" v="442" actId="14861"/>
+        <pc:spChg chg="add del mod">
+          <ac:chgData name="Alex Khan" userId="3a873f7f057fbc28" providerId="LiveId" clId="{347333E8-42F3-4862-A9F8-CFD0F59E5ECB}" dt="2021-07-28T12:50:33.153" v="576" actId="478"/>
           <ac:spMkLst>
             <pc:docMk/>
             <pc:sldMk cId="3777364752" sldId="257"/>
             <ac:spMk id="7" creationId="{A040E231-076C-4673-8ADB-1BBF14BCF2AF}"/>
           </ac:spMkLst>
         </pc:spChg>
-        <pc:spChg chg="add mod">
-          <ac:chgData name="Alex Khan" userId="3a873f7f057fbc28" providerId="LiveId" clId="{347333E8-42F3-4862-A9F8-CFD0F59E5ECB}" dt="2021-07-28T02:15:27.401" v="442" actId="14861"/>
+        <pc:spChg chg="add del mod">
+          <ac:chgData name="Alex Khan" userId="3a873f7f057fbc28" providerId="LiveId" clId="{347333E8-42F3-4862-A9F8-CFD0F59E5ECB}" dt="2021-07-28T12:50:33.153" v="576" actId="478"/>
           <ac:spMkLst>
             <pc:docMk/>
             <pc:sldMk cId="3777364752" sldId="257"/>
             <ac:spMk id="9" creationId="{AB55D23D-2929-41A1-848E-4FAF426DAA58}"/>
           </ac:spMkLst>
         </pc:spChg>
-        <pc:spChg chg="add mod">
-          <ac:chgData name="Alex Khan" userId="3a873f7f057fbc28" providerId="LiveId" clId="{347333E8-42F3-4862-A9F8-CFD0F59E5ECB}" dt="2021-07-28T02:15:34.853" v="443" actId="14861"/>
+        <pc:spChg chg="add del mod">
+          <ac:chgData name="Alex Khan" userId="3a873f7f057fbc28" providerId="LiveId" clId="{347333E8-42F3-4862-A9F8-CFD0F59E5ECB}" dt="2021-07-28T12:50:36.477" v="577" actId="478"/>
           <ac:spMkLst>
             <pc:docMk/>
             <pc:sldMk cId="3777364752" sldId="257"/>
             <ac:spMk id="11" creationId="{89C57FF5-6F6B-411E-A95D-855466E06DF7}"/>
           </ac:spMkLst>
         </pc:spChg>
-        <pc:spChg chg="add mod">
-          <ac:chgData name="Alex Khan" userId="3a873f7f057fbc28" providerId="LiveId" clId="{347333E8-42F3-4862-A9F8-CFD0F59E5ECB}" dt="2021-07-28T02:16:41.949" v="461" actId="1076"/>
+        <pc:spChg chg="add del mod">
+          <ac:chgData name="Alex Khan" userId="3a873f7f057fbc28" providerId="LiveId" clId="{347333E8-42F3-4862-A9F8-CFD0F59E5ECB}" dt="2021-07-28T12:50:36.477" v="577" actId="478"/>
           <ac:spMkLst>
             <pc:docMk/>
             <pc:sldMk cId="3777364752" sldId="257"/>
             <ac:spMk id="15" creationId="{706C262C-7AE1-4ABA-B8E9-991151745307}"/>
           </ac:spMkLst>
         </pc:spChg>
-        <pc:spChg chg="add mod">
-          <ac:chgData name="Alex Khan" userId="3a873f7f057fbc28" providerId="LiveId" clId="{347333E8-42F3-4862-A9F8-CFD0F59E5ECB}" dt="2021-07-28T02:16:00.442" v="449" actId="1076"/>
+        <pc:spChg chg="add del mod">
+          <ac:chgData name="Alex Khan" userId="3a873f7f057fbc28" providerId="LiveId" clId="{347333E8-42F3-4862-A9F8-CFD0F59E5ECB}" dt="2021-07-28T12:50:36.477" v="577" actId="478"/>
           <ac:spMkLst>
             <pc:docMk/>
             <pc:sldMk cId="3777364752" sldId="257"/>
             <ac:spMk id="16" creationId="{E0C87FAB-D7E0-45C7-B13D-E44AAEB92F32}"/>
           </ac:spMkLst>
         </pc:spChg>
-        <pc:cxnChg chg="add mod">
-          <ac:chgData name="Alex Khan" userId="3a873f7f057fbc28" providerId="LiveId" clId="{347333E8-42F3-4862-A9F8-CFD0F59E5ECB}" dt="2021-07-28T02:12:53.105" v="438" actId="1076"/>
+        <pc:spChg chg="add mod">
+          <ac:chgData name="Alex Khan" userId="3a873f7f057fbc28" providerId="LiveId" clId="{347333E8-42F3-4862-A9F8-CFD0F59E5ECB}" dt="2021-07-28T13:07:00.604" v="946" actId="1076"/>
+          <ac:spMkLst>
+            <pc:docMk/>
+            <pc:sldMk cId="3777364752" sldId="257"/>
+            <ac:spMk id="17" creationId="{EC329BEC-6873-4097-9D21-C48EB340D98B}"/>
+          </ac:spMkLst>
+        </pc:spChg>
+        <pc:spChg chg="add mod">
+          <ac:chgData name="Alex Khan" userId="3a873f7f057fbc28" providerId="LiveId" clId="{347333E8-42F3-4862-A9F8-CFD0F59E5ECB}" dt="2021-07-28T13:07:00.604" v="946" actId="1076"/>
+          <ac:spMkLst>
+            <pc:docMk/>
+            <pc:sldMk cId="3777364752" sldId="257"/>
+            <ac:spMk id="19" creationId="{60D3D24E-83DC-4C75-9BBD-B552DE77C671}"/>
+          </ac:spMkLst>
+        </pc:spChg>
+        <pc:spChg chg="add mod">
+          <ac:chgData name="Alex Khan" userId="3a873f7f057fbc28" providerId="LiveId" clId="{347333E8-42F3-4862-A9F8-CFD0F59E5ECB}" dt="2021-07-28T13:07:00.604" v="946" actId="1076"/>
+          <ac:spMkLst>
+            <pc:docMk/>
+            <pc:sldMk cId="3777364752" sldId="257"/>
+            <ac:spMk id="20" creationId="{142EA6A7-0829-455A-A230-CC74DF7B212B}"/>
+          </ac:spMkLst>
+        </pc:spChg>
+        <pc:spChg chg="add mod">
+          <ac:chgData name="Alex Khan" userId="3a873f7f057fbc28" providerId="LiveId" clId="{347333E8-42F3-4862-A9F8-CFD0F59E5ECB}" dt="2021-07-28T13:07:00.604" v="946" actId="1076"/>
+          <ac:spMkLst>
+            <pc:docMk/>
+            <pc:sldMk cId="3777364752" sldId="257"/>
+            <ac:spMk id="21" creationId="{CE5EFECE-3578-48CD-9EA4-F02153E318CB}"/>
+          </ac:spMkLst>
+        </pc:spChg>
+        <pc:spChg chg="add mod">
+          <ac:chgData name="Alex Khan" userId="3a873f7f057fbc28" providerId="LiveId" clId="{347333E8-42F3-4862-A9F8-CFD0F59E5ECB}" dt="2021-07-28T13:07:00.604" v="946" actId="1076"/>
+          <ac:spMkLst>
+            <pc:docMk/>
+            <pc:sldMk cId="3777364752" sldId="257"/>
+            <ac:spMk id="22" creationId="{B7DFEDE4-4422-48C9-8D00-3BACCABF57D3}"/>
+          </ac:spMkLst>
+        </pc:spChg>
+        <pc:picChg chg="add del mod">
+          <ac:chgData name="Alex Khan" userId="3a873f7f057fbc28" providerId="LiveId" clId="{347333E8-42F3-4862-A9F8-CFD0F59E5ECB}" dt="2021-07-28T12:50:36.477" v="577" actId="478"/>
+          <ac:picMkLst>
+            <pc:docMk/>
+            <pc:sldMk cId="3777364752" sldId="257"/>
+            <ac:picMk id="5" creationId="{C6552F25-B552-4C69-B52E-84613882DA88}"/>
+          </ac:picMkLst>
+        </pc:picChg>
+        <pc:picChg chg="add mod">
+          <ac:chgData name="Alex Khan" userId="3a873f7f057fbc28" providerId="LiveId" clId="{347333E8-42F3-4862-A9F8-CFD0F59E5ECB}" dt="2021-07-28T12:51:15.704" v="594" actId="1076"/>
+          <ac:picMkLst>
+            <pc:docMk/>
+            <pc:sldMk cId="3777364752" sldId="257"/>
+            <ac:picMk id="10" creationId="{9A4FC35F-DE4F-4BB1-B415-AAE4B962EE14}"/>
+          </ac:picMkLst>
+        </pc:picChg>
+        <pc:cxnChg chg="add del mod">
+          <ac:chgData name="Alex Khan" userId="3a873f7f057fbc28" providerId="LiveId" clId="{347333E8-42F3-4862-A9F8-CFD0F59E5ECB}" dt="2021-07-28T12:50:33.153" v="576" actId="478"/>
           <ac:cxnSpMkLst>
             <pc:docMk/>
             <pc:sldMk cId="3777364752" sldId="257"/>
             <ac:cxnSpMk id="6" creationId="{CFE3C244-4D31-445E-85CE-53C3174B2EC3}"/>
           </ac:cxnSpMkLst>
         </pc:cxnChg>
-        <pc:cxnChg chg="add mod">
-          <ac:chgData name="Alex Khan" userId="3a873f7f057fbc28" providerId="LiveId" clId="{347333E8-42F3-4862-A9F8-CFD0F59E5ECB}" dt="2021-07-28T02:12:53.105" v="438" actId="1076"/>
+        <pc:cxnChg chg="add del mod">
+          <ac:chgData name="Alex Khan" userId="3a873f7f057fbc28" providerId="LiveId" clId="{347333E8-42F3-4862-A9F8-CFD0F59E5ECB}" dt="2021-07-28T12:50:33.153" v="576" actId="478"/>
           <ac:cxnSpMkLst>
             <pc:docMk/>
             <pc:sldMk cId="3777364752" sldId="257"/>
@@ -242,24 +323,24 @@
             <ac:cxnSpMk id="10" creationId="{E457D79E-B0E0-466E-9E6A-52E93237FDDD}"/>
           </ac:cxnSpMkLst>
         </pc:cxnChg>
-        <pc:cxnChg chg="add mod">
-          <ac:chgData name="Alex Khan" userId="3a873f7f057fbc28" providerId="LiveId" clId="{347333E8-42F3-4862-A9F8-CFD0F59E5ECB}" dt="2021-07-28T02:16:41.949" v="461" actId="1076"/>
+        <pc:cxnChg chg="add del mod">
+          <ac:chgData name="Alex Khan" userId="3a873f7f057fbc28" providerId="LiveId" clId="{347333E8-42F3-4862-A9F8-CFD0F59E5ECB}" dt="2021-07-28T12:50:36.477" v="577" actId="478"/>
           <ac:cxnSpMkLst>
             <pc:docMk/>
             <pc:sldMk cId="3777364752" sldId="257"/>
             <ac:cxnSpMk id="13" creationId="{B797188B-3276-4C06-8EE4-76B71C20F156}"/>
           </ac:cxnSpMkLst>
         </pc:cxnChg>
-        <pc:cxnChg chg="add mod ord">
-          <ac:chgData name="Alex Khan" userId="3a873f7f057fbc28" providerId="LiveId" clId="{347333E8-42F3-4862-A9F8-CFD0F59E5ECB}" dt="2021-07-28T02:16:46.571" v="462" actId="170"/>
+        <pc:cxnChg chg="add del mod ord">
+          <ac:chgData name="Alex Khan" userId="3a873f7f057fbc28" providerId="LiveId" clId="{347333E8-42F3-4862-A9F8-CFD0F59E5ECB}" dt="2021-07-28T12:50:36.477" v="577" actId="478"/>
           <ac:cxnSpMkLst>
             <pc:docMk/>
             <pc:sldMk cId="3777364752" sldId="257"/>
             <ac:cxnSpMk id="14" creationId="{6F890061-9C1F-4A3A-8926-919980F19D58}"/>
           </ac:cxnSpMkLst>
         </pc:cxnChg>
-        <pc:cxnChg chg="add mod">
-          <ac:chgData name="Alex Khan" userId="3a873f7f057fbc28" providerId="LiveId" clId="{347333E8-42F3-4862-A9F8-CFD0F59E5ECB}" dt="2021-07-28T02:16:31.014" v="458" actId="14100"/>
+        <pc:cxnChg chg="add del mod">
+          <ac:chgData name="Alex Khan" userId="3a873f7f057fbc28" providerId="LiveId" clId="{347333E8-42F3-4862-A9F8-CFD0F59E5ECB}" dt="2021-07-28T12:50:36.477" v="577" actId="478"/>
           <ac:cxnSpMkLst>
             <pc:docMk/>
             <pc:sldMk cId="3777364752" sldId="257"/>
@@ -267,8 +348,8 @@
           </ac:cxnSpMkLst>
         </pc:cxnChg>
       </pc:sldChg>
-      <pc:sldChg chg="modSp new mod">
-        <pc:chgData name="Alex Khan" userId="3a873f7f057fbc28" providerId="LiveId" clId="{347333E8-42F3-4862-A9F8-CFD0F59E5ECB}" dt="2021-07-28T02:04:42.540" v="70" actId="20577"/>
+      <pc:sldChg chg="modSp new del mod">
+        <pc:chgData name="Alex Khan" userId="3a873f7f057fbc28" providerId="LiveId" clId="{347333E8-42F3-4862-A9F8-CFD0F59E5ECB}" dt="2021-07-28T12:56:51.460" v="836" actId="47"/>
         <pc:sldMkLst>
           <pc:docMk/>
           <pc:sldMk cId="3183133460" sldId="258"/>
@@ -296,6 +377,241 @@
             <ac:spMk id="2" creationId="{B4DEFB80-6FDC-49B1-867D-DFEC75A5A963}"/>
           </ac:spMkLst>
         </pc:spChg>
+      </pc:sldChg>
+      <pc:sldChg chg="modSp new del mod">
+        <pc:chgData name="Alex Khan" userId="3a873f7f057fbc28" providerId="LiveId" clId="{347333E8-42F3-4862-A9F8-CFD0F59E5ECB}" dt="2021-07-28T13:04:24.424" v="940" actId="47"/>
+        <pc:sldMkLst>
+          <pc:docMk/>
+          <pc:sldMk cId="873179939" sldId="260"/>
+        </pc:sldMkLst>
+        <pc:spChg chg="mod">
+          <ac:chgData name="Alex Khan" userId="3a873f7f057fbc28" providerId="LiveId" clId="{347333E8-42F3-4862-A9F8-CFD0F59E5ECB}" dt="2021-07-28T04:17:22.968" v="499" actId="20577"/>
+          <ac:spMkLst>
+            <pc:docMk/>
+            <pc:sldMk cId="873179939" sldId="260"/>
+            <ac:spMk id="2" creationId="{A524C67F-567D-4CD7-B333-C0B3B9C5F459}"/>
+          </ac:spMkLst>
+        </pc:spChg>
+      </pc:sldChg>
+      <pc:sldChg chg="modSp add mod ord modTransition">
+        <pc:chgData name="Alex Khan" userId="3a873f7f057fbc28" providerId="LiveId" clId="{347333E8-42F3-4862-A9F8-CFD0F59E5ECB}" dt="2021-07-28T13:04:27.349" v="942"/>
+        <pc:sldMkLst>
+          <pc:docMk/>
+          <pc:sldMk cId="1121094365" sldId="261"/>
+        </pc:sldMkLst>
+        <pc:spChg chg="mod">
+          <ac:chgData name="Alex Khan" userId="3a873f7f057fbc28" providerId="LiveId" clId="{347333E8-42F3-4862-A9F8-CFD0F59E5ECB}" dt="2021-07-28T13:04:21.069" v="939" actId="27636"/>
+          <ac:spMkLst>
+            <pc:docMk/>
+            <pc:sldMk cId="1121094365" sldId="261"/>
+            <ac:spMk id="5" creationId="{C930425E-4A15-0D49-88E2-40194DDC8519}"/>
+          </ac:spMkLst>
+        </pc:spChg>
+      </pc:sldChg>
+      <pc:sldChg chg="del">
+        <pc:chgData name="Alex Khan" userId="3a873f7f057fbc28" providerId="LiveId" clId="{347333E8-42F3-4862-A9F8-CFD0F59E5ECB}" dt="2021-07-28T12:49:09.329" v="569" actId="47"/>
+        <pc:sldMkLst>
+          <pc:docMk/>
+          <pc:sldMk cId="4188069637" sldId="261"/>
+        </pc:sldMkLst>
+      </pc:sldChg>
+      <pc:sldChg chg="delSp modSp add mod setBg delDesignElem">
+        <pc:chgData name="Alex Khan" userId="3a873f7f057fbc28" providerId="LiveId" clId="{347333E8-42F3-4862-A9F8-CFD0F59E5ECB}" dt="2021-07-28T12:49:16.084" v="570" actId="1076"/>
+        <pc:sldMkLst>
+          <pc:docMk/>
+          <pc:sldMk cId="903607634" sldId="262"/>
+        </pc:sldMkLst>
+        <pc:spChg chg="del">
+          <ac:chgData name="Alex Khan" userId="3a873f7f057fbc28" providerId="LiveId" clId="{347333E8-42F3-4862-A9F8-CFD0F59E5ECB}" dt="2021-07-28T12:49:06.604" v="568"/>
+          <ac:spMkLst>
+            <pc:docMk/>
+            <pc:sldMk cId="903607634" sldId="262"/>
+            <ac:spMk id="10" creationId="{E91DC736-0EF8-4F87-9146-EBF1D2EE4D3D}"/>
+          </ac:spMkLst>
+        </pc:spChg>
+        <pc:spChg chg="del">
+          <ac:chgData name="Alex Khan" userId="3a873f7f057fbc28" providerId="LiveId" clId="{347333E8-42F3-4862-A9F8-CFD0F59E5ECB}" dt="2021-07-28T12:49:06.604" v="568"/>
+          <ac:spMkLst>
+            <pc:docMk/>
+            <pc:sldMk cId="903607634" sldId="262"/>
+            <ac:spMk id="12" creationId="{097CD68E-23E3-4007-8847-CD0944C4F7BE}"/>
+          </ac:spMkLst>
+        </pc:spChg>
+        <pc:spChg chg="del">
+          <ac:chgData name="Alex Khan" userId="3a873f7f057fbc28" providerId="LiveId" clId="{347333E8-42F3-4862-A9F8-CFD0F59E5ECB}" dt="2021-07-28T12:49:06.604" v="568"/>
+          <ac:spMkLst>
+            <pc:docMk/>
+            <pc:sldMk cId="903607634" sldId="262"/>
+            <ac:spMk id="14" creationId="{AF2F604E-43BE-4DC3-B983-E071523364F8}"/>
+          </ac:spMkLst>
+        </pc:spChg>
+        <pc:spChg chg="del">
+          <ac:chgData name="Alex Khan" userId="3a873f7f057fbc28" providerId="LiveId" clId="{347333E8-42F3-4862-A9F8-CFD0F59E5ECB}" dt="2021-07-28T12:49:06.604" v="568"/>
+          <ac:spMkLst>
+            <pc:docMk/>
+            <pc:sldMk cId="903607634" sldId="262"/>
+            <ac:spMk id="16" creationId="{08C9B587-E65E-4B52-B37C-ABEBB6E87928}"/>
+          </ac:spMkLst>
+        </pc:spChg>
+        <pc:picChg chg="mod">
+          <ac:chgData name="Alex Khan" userId="3a873f7f057fbc28" providerId="LiveId" clId="{347333E8-42F3-4862-A9F8-CFD0F59E5ECB}" dt="2021-07-28T12:49:16.084" v="570" actId="1076"/>
+          <ac:picMkLst>
+            <pc:docMk/>
+            <pc:sldMk cId="903607634" sldId="262"/>
+            <ac:picMk id="7" creationId="{0A45E6AA-E181-457E-9692-7CB1DEAE3DED}"/>
+          </ac:picMkLst>
+        </pc:picChg>
+      </pc:sldChg>
+      <pc:sldChg chg="addSp delSp modSp add mod ord modTransition">
+        <pc:chgData name="Alex Khan" userId="3a873f7f057fbc28" providerId="LiveId" clId="{347333E8-42F3-4862-A9F8-CFD0F59E5ECB}" dt="2021-07-28T13:05:31.813" v="944" actId="1076"/>
+        <pc:sldMkLst>
+          <pc:docMk/>
+          <pc:sldMk cId="0" sldId="263"/>
+        </pc:sldMkLst>
+        <pc:spChg chg="add mod">
+          <ac:chgData name="Alex Khan" userId="3a873f7f057fbc28" providerId="LiveId" clId="{347333E8-42F3-4862-A9F8-CFD0F59E5ECB}" dt="2021-07-28T13:01:41.108" v="935" actId="1076"/>
+          <ac:spMkLst>
+            <pc:docMk/>
+            <pc:sldMk cId="0" sldId="263"/>
+            <ac:spMk id="3" creationId="{C59A9298-C7EA-4F0E-9C18-310B8A642A46}"/>
+          </ac:spMkLst>
+        </pc:spChg>
+        <pc:spChg chg="add mod">
+          <ac:chgData name="Alex Khan" userId="3a873f7f057fbc28" providerId="LiveId" clId="{347333E8-42F3-4862-A9F8-CFD0F59E5ECB}" dt="2021-07-28T13:05:31.813" v="944" actId="1076"/>
+          <ac:spMkLst>
+            <pc:docMk/>
+            <pc:sldMk cId="0" sldId="263"/>
+            <ac:spMk id="16" creationId="{871E5C1B-7CF8-45AD-98DF-1E060B4A34B1}"/>
+          </ac:spMkLst>
+        </pc:spChg>
+        <pc:spChg chg="add mod">
+          <ac:chgData name="Alex Khan" userId="3a873f7f057fbc28" providerId="LiveId" clId="{347333E8-42F3-4862-A9F8-CFD0F59E5ECB}" dt="2021-07-28T13:05:31.813" v="944" actId="1076"/>
+          <ac:spMkLst>
+            <pc:docMk/>
+            <pc:sldMk cId="0" sldId="263"/>
+            <ac:spMk id="17" creationId="{026D07F1-6D3D-4C51-BA65-ECAD14BF5F14}"/>
+          </ac:spMkLst>
+        </pc:spChg>
+        <pc:spChg chg="add mod">
+          <ac:chgData name="Alex Khan" userId="3a873f7f057fbc28" providerId="LiveId" clId="{347333E8-42F3-4862-A9F8-CFD0F59E5ECB}" dt="2021-07-28T13:05:31.813" v="944" actId="1076"/>
+          <ac:spMkLst>
+            <pc:docMk/>
+            <pc:sldMk cId="0" sldId="263"/>
+            <ac:spMk id="18" creationId="{3E15E10E-DA1F-4120-A1E8-0FF7D0C88BD7}"/>
+          </ac:spMkLst>
+        </pc:spChg>
+        <pc:spChg chg="add mod">
+          <ac:chgData name="Alex Khan" userId="3a873f7f057fbc28" providerId="LiveId" clId="{347333E8-42F3-4862-A9F8-CFD0F59E5ECB}" dt="2021-07-28T13:05:31.813" v="944" actId="1076"/>
+          <ac:spMkLst>
+            <pc:docMk/>
+            <pc:sldMk cId="0" sldId="263"/>
+            <ac:spMk id="19" creationId="{753286B4-5E09-49E2-B4EF-E8FBAB2022A1}"/>
+          </ac:spMkLst>
+        </pc:spChg>
+        <pc:spChg chg="add mod">
+          <ac:chgData name="Alex Khan" userId="3a873f7f057fbc28" providerId="LiveId" clId="{347333E8-42F3-4862-A9F8-CFD0F59E5ECB}" dt="2021-07-28T13:05:31.813" v="944" actId="1076"/>
+          <ac:spMkLst>
+            <pc:docMk/>
+            <pc:sldMk cId="0" sldId="263"/>
+            <ac:spMk id="20" creationId="{C5F1DC02-181A-45C3-9897-93BC2DA21FCF}"/>
+          </ac:spMkLst>
+        </pc:spChg>
+        <pc:spChg chg="mod">
+          <ac:chgData name="Alex Khan" userId="3a873f7f057fbc28" providerId="LiveId" clId="{347333E8-42F3-4862-A9F8-CFD0F59E5ECB}" dt="2021-07-28T12:58:52.874" v="901" actId="1076"/>
+          <ac:spMkLst>
+            <pc:docMk/>
+            <pc:sldMk cId="0" sldId="263"/>
+            <ac:spMk id="119" creationId="{00000000-0000-0000-0000-000000000000}"/>
+          </ac:spMkLst>
+        </pc:spChg>
+        <pc:spChg chg="mod">
+          <ac:chgData name="Alex Khan" userId="3a873f7f057fbc28" providerId="LiveId" clId="{347333E8-42F3-4862-A9F8-CFD0F59E5ECB}" dt="2021-07-28T12:58:59.568" v="903" actId="1076"/>
+          <ac:spMkLst>
+            <pc:docMk/>
+            <pc:sldMk cId="0" sldId="263"/>
+            <ac:spMk id="120" creationId="{00000000-0000-0000-0000-000000000000}"/>
+          </ac:spMkLst>
+        </pc:spChg>
+        <pc:spChg chg="mod">
+          <ac:chgData name="Alex Khan" userId="3a873f7f057fbc28" providerId="LiveId" clId="{347333E8-42F3-4862-A9F8-CFD0F59E5ECB}" dt="2021-07-28T13:01:41.108" v="935" actId="1076"/>
+          <ac:spMkLst>
+            <pc:docMk/>
+            <pc:sldMk cId="0" sldId="263"/>
+            <ac:spMk id="121" creationId="{00000000-0000-0000-0000-000000000000}"/>
+          </ac:spMkLst>
+        </pc:spChg>
+        <pc:spChg chg="del">
+          <ac:chgData name="Alex Khan" userId="3a873f7f057fbc28" providerId="LiveId" clId="{347333E8-42F3-4862-A9F8-CFD0F59E5ECB}" dt="2021-07-28T12:59:17.316" v="905" actId="478"/>
+          <ac:spMkLst>
+            <pc:docMk/>
+            <pc:sldMk cId="0" sldId="263"/>
+            <ac:spMk id="122" creationId="{00000000-0000-0000-0000-000000000000}"/>
+          </ac:spMkLst>
+        </pc:spChg>
+        <pc:spChg chg="del">
+          <ac:chgData name="Alex Khan" userId="3a873f7f057fbc28" providerId="LiveId" clId="{347333E8-42F3-4862-A9F8-CFD0F59E5ECB}" dt="2021-07-28T12:59:19.237" v="906" actId="478"/>
+          <ac:spMkLst>
+            <pc:docMk/>
+            <pc:sldMk cId="0" sldId="263"/>
+            <ac:spMk id="123" creationId="{00000000-0000-0000-0000-000000000000}"/>
+          </ac:spMkLst>
+        </pc:spChg>
+        <pc:spChg chg="del">
+          <ac:chgData name="Alex Khan" userId="3a873f7f057fbc28" providerId="LiveId" clId="{347333E8-42F3-4862-A9F8-CFD0F59E5ECB}" dt="2021-07-28T12:59:20.218" v="907" actId="478"/>
+          <ac:spMkLst>
+            <pc:docMk/>
+            <pc:sldMk cId="0" sldId="263"/>
+            <ac:spMk id="124" creationId="{00000000-0000-0000-0000-000000000000}"/>
+          </ac:spMkLst>
+        </pc:spChg>
+        <pc:picChg chg="add del mod">
+          <ac:chgData name="Alex Khan" userId="3a873f7f057fbc28" providerId="LiveId" clId="{347333E8-42F3-4862-A9F8-CFD0F59E5ECB}" dt="2021-07-28T13:02:02.923" v="937" actId="478"/>
+          <ac:picMkLst>
+            <pc:docMk/>
+            <pc:sldMk cId="0" sldId="263"/>
+            <ac:picMk id="2" creationId="{382368EC-D64B-4764-A4E2-D98249EC1608}"/>
+          </ac:picMkLst>
+        </pc:picChg>
+        <pc:picChg chg="del">
+          <ac:chgData name="Alex Khan" userId="3a873f7f057fbc28" providerId="LiveId" clId="{347333E8-42F3-4862-A9F8-CFD0F59E5ECB}" dt="2021-07-28T12:56:57.390" v="839" actId="478"/>
+          <ac:picMkLst>
+            <pc:docMk/>
+            <pc:sldMk cId="0" sldId="263"/>
+            <ac:picMk id="113" creationId="{00000000-0000-0000-0000-000000000000}"/>
+          </ac:picMkLst>
+        </pc:picChg>
+        <pc:picChg chg="mod">
+          <ac:chgData name="Alex Khan" userId="3a873f7f057fbc28" providerId="LiveId" clId="{347333E8-42F3-4862-A9F8-CFD0F59E5ECB}" dt="2021-07-28T12:58:48.598" v="900" actId="1076"/>
+          <ac:picMkLst>
+            <pc:docMk/>
+            <pc:sldMk cId="0" sldId="263"/>
+            <ac:picMk id="115" creationId="{00000000-0000-0000-0000-000000000000}"/>
+          </ac:picMkLst>
+        </pc:picChg>
+        <pc:picChg chg="mod">
+          <ac:chgData name="Alex Khan" userId="3a873f7f057fbc28" providerId="LiveId" clId="{347333E8-42F3-4862-A9F8-CFD0F59E5ECB}" dt="2021-07-28T12:58:56.024" v="902" actId="1076"/>
+          <ac:picMkLst>
+            <pc:docMk/>
+            <pc:sldMk cId="0" sldId="263"/>
+            <ac:picMk id="116" creationId="{00000000-0000-0000-0000-000000000000}"/>
+          </ac:picMkLst>
+        </pc:picChg>
+        <pc:picChg chg="mod">
+          <ac:chgData name="Alex Khan" userId="3a873f7f057fbc28" providerId="LiveId" clId="{347333E8-42F3-4862-A9F8-CFD0F59E5ECB}" dt="2021-07-28T12:59:28.448" v="908" actId="1076"/>
+          <ac:picMkLst>
+            <pc:docMk/>
+            <pc:sldMk cId="0" sldId="263"/>
+            <ac:picMk id="117" creationId="{00000000-0000-0000-0000-000000000000}"/>
+          </ac:picMkLst>
+        </pc:picChg>
+        <pc:picChg chg="mod">
+          <ac:chgData name="Alex Khan" userId="3a873f7f057fbc28" providerId="LiveId" clId="{347333E8-42F3-4862-A9F8-CFD0F59E5ECB}" dt="2021-07-28T12:59:38.032" v="910" actId="1076"/>
+          <ac:picMkLst>
+            <pc:docMk/>
+            <pc:sldMk cId="0" sldId="263"/>
+            <ac:picMk id="118" creationId="{00000000-0000-0000-0000-000000000000}"/>
+          </ac:picMkLst>
+        </pc:picChg>
       </pc:sldChg>
     </pc:docChg>
   </pc:docChgLst>
@@ -535,7 +851,7 @@
           <a:p>
             <a:fld id="{AA0EF018-D57F-477B-A0AD-713D42A0E9C3}" type="datetimeFigureOut">
               <a:rPr lang="en-US" smtClean="0"/>
-              <a:t>7/27/2021</a:t>
+              <a:t>7/28/2021</a:t>
             </a:fld>
             <a:endParaRPr lang="en-US"/>
           </a:p>
@@ -733,7 +1049,7 @@
           <a:p>
             <a:fld id="{AA0EF018-D57F-477B-A0AD-713D42A0E9C3}" type="datetimeFigureOut">
               <a:rPr lang="en-US" smtClean="0"/>
-              <a:t>7/27/2021</a:t>
+              <a:t>7/28/2021</a:t>
             </a:fld>
             <a:endParaRPr lang="en-US"/>
           </a:p>
@@ -941,7 +1257,7 @@
           <a:p>
             <a:fld id="{AA0EF018-D57F-477B-A0AD-713D42A0E9C3}" type="datetimeFigureOut">
               <a:rPr lang="en-US" smtClean="0"/>
-              <a:t>7/27/2021</a:t>
+              <a:t>7/28/2021</a:t>
             </a:fld>
             <a:endParaRPr lang="en-US"/>
           </a:p>
@@ -1139,7 +1455,7 @@
           <a:p>
             <a:fld id="{AA0EF018-D57F-477B-A0AD-713D42A0E9C3}" type="datetimeFigureOut">
               <a:rPr lang="en-US" smtClean="0"/>
-              <a:t>7/27/2021</a:t>
+              <a:t>7/28/2021</a:t>
             </a:fld>
             <a:endParaRPr lang="en-US"/>
           </a:p>
@@ -1414,7 +1730,7 @@
           <a:p>
             <a:fld id="{AA0EF018-D57F-477B-A0AD-713D42A0E9C3}" type="datetimeFigureOut">
               <a:rPr lang="en-US" smtClean="0"/>
-              <a:t>7/27/2021</a:t>
+              <a:t>7/28/2021</a:t>
             </a:fld>
             <a:endParaRPr lang="en-US"/>
           </a:p>
@@ -1679,7 +1995,7 @@
           <a:p>
             <a:fld id="{AA0EF018-D57F-477B-A0AD-713D42A0E9C3}" type="datetimeFigureOut">
               <a:rPr lang="en-US" smtClean="0"/>
-              <a:t>7/27/2021</a:t>
+              <a:t>7/28/2021</a:t>
             </a:fld>
             <a:endParaRPr lang="en-US"/>
           </a:p>
@@ -2091,7 +2407,7 @@
           <a:p>
             <a:fld id="{AA0EF018-D57F-477B-A0AD-713D42A0E9C3}" type="datetimeFigureOut">
               <a:rPr lang="en-US" smtClean="0"/>
-              <a:t>7/27/2021</a:t>
+              <a:t>7/28/2021</a:t>
             </a:fld>
             <a:endParaRPr lang="en-US"/>
           </a:p>
@@ -2232,7 +2548,7 @@
           <a:p>
             <a:fld id="{AA0EF018-D57F-477B-A0AD-713D42A0E9C3}" type="datetimeFigureOut">
               <a:rPr lang="en-US" smtClean="0"/>
-              <a:t>7/27/2021</a:t>
+              <a:t>7/28/2021</a:t>
             </a:fld>
             <a:endParaRPr lang="en-US"/>
           </a:p>
@@ -2345,7 +2661,7 @@
           <a:p>
             <a:fld id="{AA0EF018-D57F-477B-A0AD-713D42A0E9C3}" type="datetimeFigureOut">
               <a:rPr lang="en-US" smtClean="0"/>
-              <a:t>7/27/2021</a:t>
+              <a:t>7/28/2021</a:t>
             </a:fld>
             <a:endParaRPr lang="en-US"/>
           </a:p>
@@ -2656,7 +2972,7 @@
           <a:p>
             <a:fld id="{AA0EF018-D57F-477B-A0AD-713D42A0E9C3}" type="datetimeFigureOut">
               <a:rPr lang="en-US" smtClean="0"/>
-              <a:t>7/27/2021</a:t>
+              <a:t>7/28/2021</a:t>
             </a:fld>
             <a:endParaRPr lang="en-US"/>
           </a:p>
@@ -2944,7 +3260,7 @@
           <a:p>
             <a:fld id="{AA0EF018-D57F-477B-A0AD-713D42A0E9C3}" type="datetimeFigureOut">
               <a:rPr lang="en-US" smtClean="0"/>
-              <a:t>7/27/2021</a:t>
+              <a:t>7/28/2021</a:t>
             </a:fld>
             <a:endParaRPr lang="en-US"/>
           </a:p>
@@ -3185,7 +3501,7 @@
           <a:p>
             <a:fld id="{AA0EF018-D57F-477B-A0AD-713D42A0E9C3}" type="datetimeFigureOut">
               <a:rPr lang="en-US" smtClean="0"/>
-              <a:t>7/27/2021</a:t>
+              <a:t>7/28/2021</a:t>
             </a:fld>
             <a:endParaRPr lang="en-US"/>
           </a:p>
@@ -3723,10 +4039,10 @@
       </p:pic>
       <p:pic>
         <p:nvPicPr>
-          <p:cNvPr id="4" name="Picture 3">
-            <a:extLst>
-              <a:ext uri="{FF2B5EF4-FFF2-40B4-BE49-F238E27FC236}">
-                <a16:creationId xmlns:a16="http://schemas.microsoft.com/office/drawing/2014/main" id="{8632940D-9062-427C-BD67-719A559A3CF3}"/>
+          <p:cNvPr id="6" name="Picture 5" descr="A picture containing person, person, clothing, wall&#10;&#10;Description automatically generated">
+            <a:extLst>
+              <a:ext uri="{FF2B5EF4-FFF2-40B4-BE49-F238E27FC236}">
+                <a16:creationId xmlns:a16="http://schemas.microsoft.com/office/drawing/2014/main" id="{9C6E3DFD-2B50-4C85-88AD-0FDA2D1AE8AC}"/>
               </a:ext>
             </a:extLst>
           </p:cNvPr>
@@ -3736,15 +4052,21 @@
           <p:nvPr/>
         </p:nvPicPr>
         <p:blipFill>
-          <a:blip r:embed="rId3"/>
+          <a:blip r:embed="rId3">
+            <a:extLst>
+              <a:ext uri="{28A0092B-C50C-407E-A947-70E740481C1C}">
+                <a14:useLocalDpi xmlns:a14="http://schemas.microsoft.com/office/drawing/2010/main" val="0"/>
+              </a:ext>
+            </a:extLst>
+          </a:blip>
           <a:stretch>
             <a:fillRect/>
           </a:stretch>
         </p:blipFill>
         <p:spPr>
           <a:xfrm>
-            <a:off x="3778919" y="5527070"/>
-            <a:ext cx="4394534" cy="1261247"/>
+            <a:off x="3288898" y="5192299"/>
+            <a:ext cx="5421966" cy="1556124"/>
           </a:xfrm>
           <a:prstGeom prst="rect">
             <a:avLst/>
@@ -3804,7 +4126,7 @@
           <a:p>
             <a:r>
               <a:rPr lang="en-US" dirty="0"/>
-              <a:t>Motivation for the Problem we solved</a:t>
+              <a:t>Solving Dual Objectives in Supply Chain</a:t>
             </a:r>
           </a:p>
         </p:txBody>
@@ -3825,53 +4147,103 @@
             <p:ph idx="1"/>
           </p:nvPr>
         </p:nvSpPr>
-        <p:spPr/>
+        <p:spPr>
+          <a:xfrm>
+            <a:off x="838200" y="1825625"/>
+            <a:ext cx="6509084" cy="4351338"/>
+          </a:xfrm>
+        </p:spPr>
         <p:txBody>
           <a:bodyPr>
-            <a:normAutofit fontScale="92500" lnSpcReduction="10000"/>
+            <a:normAutofit/>
           </a:bodyPr>
           <a:lstStyle/>
           <a:p>
             <a:r>
-              <a:rPr lang="en-US" dirty="0"/>
-              <a:t>Most businesses are working with simple rules and process flow which are not optimized</a:t>
-            </a:r>
-          </a:p>
-          <a:p>
-            <a:r>
-              <a:rPr lang="en-US" dirty="0"/>
-              <a:t>Companies work with other firms with competing objectives</a:t>
-            </a:r>
-          </a:p>
-          <a:p>
-            <a:endParaRPr lang="en-US" dirty="0"/>
-          </a:p>
-          <a:p>
-            <a:endParaRPr lang="en-US" dirty="0"/>
-          </a:p>
-          <a:p>
-            <a:endParaRPr lang="en-US" dirty="0"/>
-          </a:p>
-          <a:p>
-            <a:endParaRPr lang="en-US" dirty="0"/>
-          </a:p>
-          <a:p>
-            <a:endParaRPr lang="en-US" dirty="0"/>
-          </a:p>
-          <a:p>
-            <a:r>
-              <a:rPr lang="en-US" dirty="0"/>
-              <a:t>We wanted to find a way to use the QUBO method to optimize between a set of objectives to understand the benefits and challenges.</a:t>
-            </a:r>
-          </a:p>
-        </p:txBody>
-      </p:sp>
-      <p:sp>
-        <p:nvSpPr>
-          <p:cNvPr id="4" name="Flowchart: Alternate Process 3">
-            <a:extLst>
-              <a:ext uri="{FF2B5EF4-FFF2-40B4-BE49-F238E27FC236}">
-                <a16:creationId xmlns:a16="http://schemas.microsoft.com/office/drawing/2014/main" id="{47B15490-F876-4C1A-A7ED-C88AE3E16C36}"/>
+              <a:rPr lang="en-US" sz="2400" dirty="0"/>
+              <a:t>Rules Based Process Flow</a:t>
+            </a:r>
+          </a:p>
+          <a:p>
+            <a:r>
+              <a:rPr lang="en-US" sz="2400" dirty="0"/>
+              <a:t>Competing objectives</a:t>
+            </a:r>
+          </a:p>
+          <a:p>
+            <a:r>
+              <a:rPr lang="en-US" sz="2400" dirty="0"/>
+              <a:t>Optimizing Supply Chain</a:t>
+            </a:r>
+          </a:p>
+          <a:p>
+            <a:pPr lvl="1"/>
+            <a:r>
+              <a:rPr lang="en-US" sz="2000" dirty="0"/>
+              <a:t>Minimize cost through supplier pre-selection</a:t>
+            </a:r>
+          </a:p>
+          <a:p>
+            <a:pPr lvl="1"/>
+            <a:r>
+              <a:rPr lang="en-US" sz="2000" dirty="0"/>
+              <a:t>Profit maximization on Inventory</a:t>
+            </a:r>
+          </a:p>
+          <a:p>
+            <a:endParaRPr lang="en-US" sz="2400" dirty="0"/>
+          </a:p>
+          <a:p>
+            <a:r>
+              <a:rPr lang="en-US" sz="2400" dirty="0"/>
+              <a:t>Goal:</a:t>
+            </a:r>
+          </a:p>
+          <a:p>
+            <a:pPr lvl="1"/>
+            <a:r>
+              <a:rPr lang="en-US" sz="2000" dirty="0"/>
+              <a:t>Chained Optimization Rules Engine (CORE)</a:t>
+            </a:r>
+          </a:p>
+        </p:txBody>
+      </p:sp>
+      <p:pic>
+        <p:nvPicPr>
+          <p:cNvPr id="10" name="Picture 9">
+            <a:extLst>
+              <a:ext uri="{FF2B5EF4-FFF2-40B4-BE49-F238E27FC236}">
+                <a16:creationId xmlns:a16="http://schemas.microsoft.com/office/drawing/2014/main" id="{9A4FC35F-DE4F-4BB1-B415-AAE4B962EE14}"/>
+              </a:ext>
+            </a:extLst>
+          </p:cNvPr>
+          <p:cNvPicPr>
+            <a:picLocks noChangeAspect="1"/>
+          </p:cNvPicPr>
+          <p:nvPr/>
+        </p:nvPicPr>
+        <p:blipFill>
+          <a:blip r:embed="rId2"/>
+          <a:stretch>
+            <a:fillRect/>
+          </a:stretch>
+        </p:blipFill>
+        <p:spPr>
+          <a:xfrm>
+            <a:off x="6958709" y="3233237"/>
+            <a:ext cx="5233291" cy="2943726"/>
+          </a:xfrm>
+          <a:prstGeom prst="rect">
+            <a:avLst/>
+          </a:prstGeom>
+        </p:spPr>
+      </p:pic>
+      <p:sp>
+        <p:nvSpPr>
+          <p:cNvPr id="17" name="Flowchart: Alternate Process 3">
+            <a:extLst>
+              <a:ext uri="{FF2B5EF4-FFF2-40B4-BE49-F238E27FC236}">
+                <a16:creationId xmlns:a16="http://schemas.microsoft.com/office/drawing/2014/main" id="{EC329BEC-6873-4097-9D21-C48EB340D98B}"/>
               </a:ext>
             </a:extLst>
           </p:cNvPr>
@@ -3880,84 +4252,130 @@
         </p:nvSpPr>
         <p:spPr>
           <a:xfrm>
-            <a:off x="762000" y="3712326"/>
-            <a:ext cx="1187116" cy="689811"/>
+            <a:off x="1411703" y="5622087"/>
+            <a:ext cx="1187118" cy="689813"/>
           </a:xfrm>
-          <a:prstGeom prst="flowChartAlternateProcess">
+          <a:custGeom>
+            <a:avLst/>
+            <a:gdLst/>
+            <a:ahLst/>
+            <a:cxnLst>
+              <a:cxn ang="0">
+                <a:pos x="wd2" y="hd2"/>
+              </a:cxn>
+              <a:cxn ang="5400000">
+                <a:pos x="wd2" y="hd2"/>
+              </a:cxn>
+              <a:cxn ang="10800000">
+                <a:pos x="wd2" y="hd2"/>
+              </a:cxn>
+              <a:cxn ang="16200000">
+                <a:pos x="wd2" y="hd2"/>
+              </a:cxn>
+            </a:cxnLst>
+            <a:rect l="0" t="0" r="r" b="b"/>
+            <a:pathLst>
+              <a:path w="21600" h="21600" extrusionOk="0">
+                <a:moveTo>
+                  <a:pt x="0" y="3600"/>
+                </a:moveTo>
+                <a:cubicBezTo>
+                  <a:pt x="0" y="1612"/>
+                  <a:pt x="937" y="0"/>
+                  <a:pt x="2092" y="0"/>
+                </a:cubicBezTo>
+                <a:lnTo>
+                  <a:pt x="19508" y="0"/>
+                </a:lnTo>
+                <a:cubicBezTo>
+                  <a:pt x="20663" y="0"/>
+                  <a:pt x="21600" y="1612"/>
+                  <a:pt x="21600" y="3600"/>
+                </a:cubicBezTo>
+                <a:lnTo>
+                  <a:pt x="21600" y="18000"/>
+                </a:lnTo>
+                <a:cubicBezTo>
+                  <a:pt x="21600" y="19988"/>
+                  <a:pt x="20663" y="21600"/>
+                  <a:pt x="19508" y="21600"/>
+                </a:cubicBezTo>
+                <a:lnTo>
+                  <a:pt x="2092" y="21600"/>
+                </a:lnTo>
+                <a:cubicBezTo>
+                  <a:pt x="937" y="21600"/>
+                  <a:pt x="0" y="19988"/>
+                  <a:pt x="0" y="18000"/>
+                </a:cubicBezTo>
+                <a:close/>
+              </a:path>
+            </a:pathLst>
+          </a:custGeom>
+          <a:solidFill>
+            <a:srgbClr val="FFFFFF"/>
+          </a:solidFill>
+          <a:ln w="12700">
+            <a:solidFill>
+              <a:srgbClr val="000000"/>
+            </a:solidFill>
+            <a:miter/>
+          </a:ln>
+          <a:effectLst>
+            <a:reflection stA="52000" endPos="40000" dir="5400000" sy="-100000" algn="bl" rotWithShape="0"/>
+          </a:effectLst>
+        </p:spPr>
+        <p:txBody>
+          <a:bodyPr lIns="45719" rIns="45719" anchor="ctr"/>
+          <a:lstStyle/>
+          <a:p>
+            <a:pPr algn="ctr"/>
+            <a:endParaRPr/>
+          </a:p>
+        </p:txBody>
+      </p:sp>
+      <p:sp>
+        <p:nvSpPr>
+          <p:cNvPr id="19" name="Straight Arrow Connector 5">
+            <a:extLst>
+              <a:ext uri="{FF2B5EF4-FFF2-40B4-BE49-F238E27FC236}">
+                <a16:creationId xmlns:a16="http://schemas.microsoft.com/office/drawing/2014/main" id="{60D3D24E-83DC-4C75-9BBD-B552DE77C671}"/>
+              </a:ext>
+            </a:extLst>
+          </p:cNvPr>
+          <p:cNvSpPr/>
+          <p:nvPr/>
+        </p:nvSpPr>
+        <p:spPr>
+          <a:xfrm>
+            <a:off x="2598818" y="5950951"/>
+            <a:ext cx="561475" cy="1"/>
+          </a:xfrm>
+          <a:prstGeom prst="line">
             <a:avLst/>
           </a:prstGeom>
-          <a:effectLst>
-            <a:reflection blurRad="6350" stA="52000" endA="300" endPos="35000" dir="5400000" sy="-100000" algn="bl" rotWithShape="0"/>
-          </a:effectLst>
-        </p:spPr>
-        <p:style>
-          <a:lnRef idx="2">
-            <a:schemeClr val="dk1"/>
-          </a:lnRef>
-          <a:fillRef idx="1">
-            <a:schemeClr val="lt1"/>
-          </a:fillRef>
-          <a:effectRef idx="0">
-            <a:schemeClr val="dk1"/>
-          </a:effectRef>
-          <a:fontRef idx="minor">
-            <a:schemeClr val="dk1"/>
-          </a:fontRef>
-        </p:style>
-        <p:txBody>
-          <a:bodyPr rtlCol="0" anchor="ctr"/>
-          <a:lstStyle/>
-          <a:p>
-            <a:pPr algn="ctr"/>
-            <a:endParaRPr lang="en-US"/>
-          </a:p>
-        </p:txBody>
-      </p:sp>
-      <p:cxnSp>
-        <p:nvCxnSpPr>
-          <p:cNvPr id="6" name="Straight Arrow Connector 5">
-            <a:extLst>
-              <a:ext uri="{FF2B5EF4-FFF2-40B4-BE49-F238E27FC236}">
-                <a16:creationId xmlns:a16="http://schemas.microsoft.com/office/drawing/2014/main" id="{CFE3C244-4D31-445E-85CE-53C3174B2EC3}"/>
-              </a:ext>
-            </a:extLst>
-          </p:cNvPr>
-          <p:cNvCxnSpPr/>
-          <p:nvPr/>
-        </p:nvCxnSpPr>
-        <p:spPr>
-          <a:xfrm>
-            <a:off x="1949116" y="4041190"/>
-            <a:ext cx="561474" cy="0"/>
-          </a:xfrm>
-          <a:prstGeom prst="straightConnector1">
-            <a:avLst/>
-          </a:prstGeom>
-          <a:ln>
+          <a:ln w="6350">
+            <a:solidFill>
+              <a:srgbClr val="000000"/>
+            </a:solidFill>
+            <a:miter/>
             <a:tailEnd type="triangle"/>
           </a:ln>
         </p:spPr>
-        <p:style>
-          <a:lnRef idx="1">
-            <a:schemeClr val="dk1"/>
-          </a:lnRef>
-          <a:fillRef idx="0">
-            <a:schemeClr val="dk1"/>
-          </a:fillRef>
-          <a:effectRef idx="0">
-            <a:schemeClr val="dk1"/>
-          </a:effectRef>
-          <a:fontRef idx="minor">
-            <a:schemeClr val="tx1"/>
-          </a:fontRef>
-        </p:style>
-      </p:cxnSp>
-      <p:sp>
-        <p:nvSpPr>
-          <p:cNvPr id="7" name="Flowchart: Alternate Process 6">
-            <a:extLst>
-              <a:ext uri="{FF2B5EF4-FFF2-40B4-BE49-F238E27FC236}">
-                <a16:creationId xmlns:a16="http://schemas.microsoft.com/office/drawing/2014/main" id="{A040E231-076C-4673-8ADB-1BBF14BCF2AF}"/>
+        <p:txBody>
+          <a:bodyPr lIns="45719" rIns="45719"/>
+          <a:lstStyle/>
+          <a:p>
+            <a:endParaRPr/>
+          </a:p>
+        </p:txBody>
+      </p:sp>
+      <p:sp>
+        <p:nvSpPr>
+          <p:cNvPr id="20" name="Flowchart: Alternate Process 6">
+            <a:extLst>
+              <a:ext uri="{FF2B5EF4-FFF2-40B4-BE49-F238E27FC236}">
+                <a16:creationId xmlns:a16="http://schemas.microsoft.com/office/drawing/2014/main" id="{142EA6A7-0829-455A-A230-CC74DF7B212B}"/>
               </a:ext>
             </a:extLst>
           </p:cNvPr>
@@ -3966,84 +4384,130 @@
         </p:nvSpPr>
         <p:spPr>
           <a:xfrm>
-            <a:off x="2510590" y="3712326"/>
-            <a:ext cx="1187116" cy="689811"/>
+            <a:off x="3160292" y="5622087"/>
+            <a:ext cx="1187119" cy="689813"/>
           </a:xfrm>
-          <a:prstGeom prst="flowChartAlternateProcess">
+          <a:custGeom>
+            <a:avLst/>
+            <a:gdLst/>
+            <a:ahLst/>
+            <a:cxnLst>
+              <a:cxn ang="0">
+                <a:pos x="wd2" y="hd2"/>
+              </a:cxn>
+              <a:cxn ang="5400000">
+                <a:pos x="wd2" y="hd2"/>
+              </a:cxn>
+              <a:cxn ang="10800000">
+                <a:pos x="wd2" y="hd2"/>
+              </a:cxn>
+              <a:cxn ang="16200000">
+                <a:pos x="wd2" y="hd2"/>
+              </a:cxn>
+            </a:cxnLst>
+            <a:rect l="0" t="0" r="r" b="b"/>
+            <a:pathLst>
+              <a:path w="21600" h="21600" extrusionOk="0">
+                <a:moveTo>
+                  <a:pt x="0" y="3600"/>
+                </a:moveTo>
+                <a:cubicBezTo>
+                  <a:pt x="0" y="1612"/>
+                  <a:pt x="937" y="0"/>
+                  <a:pt x="2092" y="0"/>
+                </a:cubicBezTo>
+                <a:lnTo>
+                  <a:pt x="19508" y="0"/>
+                </a:lnTo>
+                <a:cubicBezTo>
+                  <a:pt x="20663" y="0"/>
+                  <a:pt x="21600" y="1612"/>
+                  <a:pt x="21600" y="3600"/>
+                </a:cubicBezTo>
+                <a:lnTo>
+                  <a:pt x="21600" y="18000"/>
+                </a:lnTo>
+                <a:cubicBezTo>
+                  <a:pt x="21600" y="19988"/>
+                  <a:pt x="20663" y="21600"/>
+                  <a:pt x="19508" y="21600"/>
+                </a:cubicBezTo>
+                <a:lnTo>
+                  <a:pt x="2092" y="21600"/>
+                </a:lnTo>
+                <a:cubicBezTo>
+                  <a:pt x="937" y="21600"/>
+                  <a:pt x="0" y="19988"/>
+                  <a:pt x="0" y="18000"/>
+                </a:cubicBezTo>
+                <a:close/>
+              </a:path>
+            </a:pathLst>
+          </a:custGeom>
+          <a:solidFill>
+            <a:srgbClr val="FFFFFF"/>
+          </a:solidFill>
+          <a:ln w="12700">
+            <a:solidFill>
+              <a:srgbClr val="000000"/>
+            </a:solidFill>
+            <a:miter/>
+          </a:ln>
+          <a:effectLst>
+            <a:reflection stA="52000" endPos="40000" dir="5400000" sy="-100000" algn="bl" rotWithShape="0"/>
+          </a:effectLst>
+        </p:spPr>
+        <p:txBody>
+          <a:bodyPr lIns="45719" rIns="45719" anchor="ctr"/>
+          <a:lstStyle/>
+          <a:p>
+            <a:pPr algn="ctr"/>
+            <a:endParaRPr/>
+          </a:p>
+        </p:txBody>
+      </p:sp>
+      <p:sp>
+        <p:nvSpPr>
+          <p:cNvPr id="21" name="Straight Arrow Connector 7">
+            <a:extLst>
+              <a:ext uri="{FF2B5EF4-FFF2-40B4-BE49-F238E27FC236}">
+                <a16:creationId xmlns:a16="http://schemas.microsoft.com/office/drawing/2014/main" id="{CE5EFECE-3578-48CD-9EA4-F02153E318CB}"/>
+              </a:ext>
+            </a:extLst>
+          </p:cNvPr>
+          <p:cNvSpPr/>
+          <p:nvPr/>
+        </p:nvSpPr>
+        <p:spPr>
+          <a:xfrm>
+            <a:off x="4347409" y="5950951"/>
+            <a:ext cx="561475" cy="1"/>
+          </a:xfrm>
+          <a:prstGeom prst="line">
             <a:avLst/>
           </a:prstGeom>
-          <a:effectLst>
-            <a:reflection blurRad="6350" stA="52000" endA="300" endPos="35000" dir="5400000" sy="-100000" algn="bl" rotWithShape="0"/>
-          </a:effectLst>
-        </p:spPr>
-        <p:style>
-          <a:lnRef idx="2">
-            <a:schemeClr val="dk1"/>
-          </a:lnRef>
-          <a:fillRef idx="1">
-            <a:schemeClr val="lt1"/>
-          </a:fillRef>
-          <a:effectRef idx="0">
-            <a:schemeClr val="dk1"/>
-          </a:effectRef>
-          <a:fontRef idx="minor">
-            <a:schemeClr val="dk1"/>
-          </a:fontRef>
-        </p:style>
-        <p:txBody>
-          <a:bodyPr rtlCol="0" anchor="ctr"/>
-          <a:lstStyle/>
-          <a:p>
-            <a:pPr algn="ctr"/>
-            <a:endParaRPr lang="en-US"/>
-          </a:p>
-        </p:txBody>
-      </p:sp>
-      <p:cxnSp>
-        <p:nvCxnSpPr>
-          <p:cNvPr id="8" name="Straight Arrow Connector 7">
-            <a:extLst>
-              <a:ext uri="{FF2B5EF4-FFF2-40B4-BE49-F238E27FC236}">
-                <a16:creationId xmlns:a16="http://schemas.microsoft.com/office/drawing/2014/main" id="{F5023A28-B079-4D7C-894D-CFFFF35383FF}"/>
-              </a:ext>
-            </a:extLst>
-          </p:cNvPr>
-          <p:cNvCxnSpPr/>
-          <p:nvPr/>
-        </p:nvCxnSpPr>
-        <p:spPr>
-          <a:xfrm>
-            <a:off x="3697706" y="4041190"/>
-            <a:ext cx="561474" cy="0"/>
-          </a:xfrm>
-          <a:prstGeom prst="straightConnector1">
-            <a:avLst/>
-          </a:prstGeom>
-          <a:ln>
+          <a:ln w="6350">
+            <a:solidFill>
+              <a:srgbClr val="000000"/>
+            </a:solidFill>
+            <a:miter/>
             <a:tailEnd type="triangle"/>
           </a:ln>
         </p:spPr>
-        <p:style>
-          <a:lnRef idx="1">
-            <a:schemeClr val="dk1"/>
-          </a:lnRef>
-          <a:fillRef idx="0">
-            <a:schemeClr val="dk1"/>
-          </a:fillRef>
-          <a:effectRef idx="0">
-            <a:schemeClr val="dk1"/>
-          </a:effectRef>
-          <a:fontRef idx="minor">
-            <a:schemeClr val="tx1"/>
-          </a:fontRef>
-        </p:style>
-      </p:cxnSp>
-      <p:sp>
-        <p:nvSpPr>
-          <p:cNvPr id="9" name="Flowchart: Alternate Process 8">
-            <a:extLst>
-              <a:ext uri="{FF2B5EF4-FFF2-40B4-BE49-F238E27FC236}">
-                <a16:creationId xmlns:a16="http://schemas.microsoft.com/office/drawing/2014/main" id="{AB55D23D-2929-41A1-848E-4FAF426DAA58}"/>
+        <p:txBody>
+          <a:bodyPr lIns="45719" rIns="45719"/>
+          <a:lstStyle/>
+          <a:p>
+            <a:endParaRPr/>
+          </a:p>
+        </p:txBody>
+      </p:sp>
+      <p:sp>
+        <p:nvSpPr>
+          <p:cNvPr id="22" name="Flowchart: Alternate Process 8">
+            <a:extLst>
+              <a:ext uri="{FF2B5EF4-FFF2-40B4-BE49-F238E27FC236}">
+                <a16:creationId xmlns:a16="http://schemas.microsoft.com/office/drawing/2014/main" id="{B7DFEDE4-4422-48C9-8D00-3BACCABF57D3}"/>
               </a:ext>
             </a:extLst>
           </p:cNvPr>
@@ -4052,322 +4516,88 @@
         </p:nvSpPr>
         <p:spPr>
           <a:xfrm>
-            <a:off x="4259180" y="3710905"/>
-            <a:ext cx="1187116" cy="689811"/>
+            <a:off x="4908882" y="5620665"/>
+            <a:ext cx="1187118" cy="689813"/>
           </a:xfrm>
-          <a:prstGeom prst="flowChartAlternateProcess">
+          <a:custGeom>
             <a:avLst/>
-          </a:prstGeom>
+            <a:gdLst/>
+            <a:ahLst/>
+            <a:cxnLst>
+              <a:cxn ang="0">
+                <a:pos x="wd2" y="hd2"/>
+              </a:cxn>
+              <a:cxn ang="5400000">
+                <a:pos x="wd2" y="hd2"/>
+              </a:cxn>
+              <a:cxn ang="10800000">
+                <a:pos x="wd2" y="hd2"/>
+              </a:cxn>
+              <a:cxn ang="16200000">
+                <a:pos x="wd2" y="hd2"/>
+              </a:cxn>
+            </a:cxnLst>
+            <a:rect l="0" t="0" r="r" b="b"/>
+            <a:pathLst>
+              <a:path w="21600" h="21600" extrusionOk="0">
+                <a:moveTo>
+                  <a:pt x="0" y="3600"/>
+                </a:moveTo>
+                <a:cubicBezTo>
+                  <a:pt x="0" y="1612"/>
+                  <a:pt x="937" y="0"/>
+                  <a:pt x="2092" y="0"/>
+                </a:cubicBezTo>
+                <a:lnTo>
+                  <a:pt x="19508" y="0"/>
+                </a:lnTo>
+                <a:cubicBezTo>
+                  <a:pt x="20663" y="0"/>
+                  <a:pt x="21600" y="1612"/>
+                  <a:pt x="21600" y="3600"/>
+                </a:cubicBezTo>
+                <a:lnTo>
+                  <a:pt x="21600" y="18000"/>
+                </a:lnTo>
+                <a:cubicBezTo>
+                  <a:pt x="21600" y="19988"/>
+                  <a:pt x="20663" y="21600"/>
+                  <a:pt x="19508" y="21600"/>
+                </a:cubicBezTo>
+                <a:lnTo>
+                  <a:pt x="2092" y="21600"/>
+                </a:lnTo>
+                <a:cubicBezTo>
+                  <a:pt x="937" y="21600"/>
+                  <a:pt x="0" y="19988"/>
+                  <a:pt x="0" y="18000"/>
+                </a:cubicBezTo>
+                <a:close/>
+              </a:path>
+            </a:pathLst>
+          </a:custGeom>
+          <a:solidFill>
+            <a:srgbClr val="FFFFFF"/>
+          </a:solidFill>
+          <a:ln w="12700">
+            <a:solidFill>
+              <a:srgbClr val="000000"/>
+            </a:solidFill>
+            <a:miter/>
+          </a:ln>
           <a:effectLst>
-            <a:reflection blurRad="6350" stA="52000" endA="300" endPos="35000" dir="5400000" sy="-100000" algn="bl" rotWithShape="0"/>
+            <a:reflection stA="52000" endPos="40000" dir="5400000" sy="-100000" algn="bl" rotWithShape="0"/>
           </a:effectLst>
         </p:spPr>
-        <p:style>
-          <a:lnRef idx="2">
-            <a:schemeClr val="dk1"/>
-          </a:lnRef>
-          <a:fillRef idx="1">
-            <a:schemeClr val="lt1"/>
-          </a:fillRef>
-          <a:effectRef idx="0">
-            <a:schemeClr val="dk1"/>
-          </a:effectRef>
-          <a:fontRef idx="minor">
-            <a:schemeClr val="dk1"/>
-          </a:fontRef>
-        </p:style>
-        <p:txBody>
-          <a:bodyPr rtlCol="0" anchor="ctr"/>
+        <p:txBody>
+          <a:bodyPr lIns="45719" rIns="45719" anchor="ctr"/>
           <a:lstStyle/>
           <a:p>
             <a:pPr algn="ctr"/>
-            <a:endParaRPr lang="en-US"/>
-          </a:p>
-        </p:txBody>
-      </p:sp>
-      <p:sp>
-        <p:nvSpPr>
-          <p:cNvPr id="11" name="Flowchart: Process 10">
-            <a:extLst>
-              <a:ext uri="{FF2B5EF4-FFF2-40B4-BE49-F238E27FC236}">
-                <a16:creationId xmlns:a16="http://schemas.microsoft.com/office/drawing/2014/main" id="{89C57FF5-6F6B-411E-A95D-855466E06DF7}"/>
-              </a:ext>
-            </a:extLst>
-          </p:cNvPr>
-          <p:cNvSpPr/>
-          <p:nvPr/>
-        </p:nvSpPr>
-        <p:spPr>
-          <a:xfrm>
-            <a:off x="7603958" y="3575968"/>
-            <a:ext cx="561474" cy="955927"/>
-          </a:xfrm>
-          <a:prstGeom prst="flowChartProcess">
-            <a:avLst/>
-          </a:prstGeom>
-          <a:effectLst>
-            <a:outerShdw blurRad="152400" dist="317500" dir="5400000" sx="90000" sy="-19000" rotWithShape="0">
-              <a:prstClr val="black">
-                <a:alpha val="15000"/>
-              </a:prstClr>
-            </a:outerShdw>
-            <a:reflection blurRad="6350" stA="52000" endA="300" endPos="35000" dir="5400000" sy="-100000" algn="bl" rotWithShape="0"/>
-          </a:effectLst>
-        </p:spPr>
-        <p:style>
-          <a:lnRef idx="2">
-            <a:schemeClr val="dk1"/>
-          </a:lnRef>
-          <a:fillRef idx="1">
-            <a:schemeClr val="lt1"/>
-          </a:fillRef>
-          <a:effectRef idx="0">
-            <a:schemeClr val="dk1"/>
-          </a:effectRef>
-          <a:fontRef idx="minor">
-            <a:schemeClr val="dk1"/>
-          </a:fontRef>
-        </p:style>
-        <p:txBody>
-          <a:bodyPr rtlCol="0" anchor="ctr"/>
-          <a:lstStyle/>
-          <a:p>
-            <a:pPr algn="ctr"/>
-            <a:endParaRPr lang="en-US"/>
-          </a:p>
-        </p:txBody>
-      </p:sp>
-      <p:cxnSp>
-        <p:nvCxnSpPr>
-          <p:cNvPr id="13" name="Straight Arrow Connector 12">
-            <a:extLst>
-              <a:ext uri="{FF2B5EF4-FFF2-40B4-BE49-F238E27FC236}">
-                <a16:creationId xmlns:a16="http://schemas.microsoft.com/office/drawing/2014/main" id="{B797188B-3276-4C06-8EE4-76B71C20F156}"/>
-              </a:ext>
-            </a:extLst>
-          </p:cNvPr>
-          <p:cNvCxnSpPr>
-            <a:cxnSpLocks/>
-            <a:endCxn id="15" idx="1"/>
-          </p:cNvCxnSpPr>
-          <p:nvPr/>
-        </p:nvCxnSpPr>
-        <p:spPr>
-          <a:xfrm flipV="1">
-            <a:off x="8143378" y="3695827"/>
-            <a:ext cx="1132970" cy="149784"/>
-          </a:xfrm>
-          <a:prstGeom prst="straightConnector1">
-            <a:avLst/>
-          </a:prstGeom>
-          <a:ln>
-            <a:headEnd type="triangle"/>
-            <a:tailEnd type="triangle"/>
-          </a:ln>
-        </p:spPr>
-        <p:style>
-          <a:lnRef idx="1">
-            <a:schemeClr val="dk1"/>
-          </a:lnRef>
-          <a:fillRef idx="0">
-            <a:schemeClr val="dk1"/>
-          </a:fillRef>
-          <a:effectRef idx="0">
-            <a:schemeClr val="dk1"/>
-          </a:effectRef>
-          <a:fontRef idx="minor">
-            <a:schemeClr val="tx1"/>
-          </a:fontRef>
-        </p:style>
-      </p:cxnSp>
-      <p:sp>
-        <p:nvSpPr>
-          <p:cNvPr id="15" name="Flowchart: Process 14">
-            <a:extLst>
-              <a:ext uri="{FF2B5EF4-FFF2-40B4-BE49-F238E27FC236}">
-                <a16:creationId xmlns:a16="http://schemas.microsoft.com/office/drawing/2014/main" id="{706C262C-7AE1-4ABA-B8E9-991151745307}"/>
-              </a:ext>
-            </a:extLst>
-          </p:cNvPr>
-          <p:cNvSpPr/>
-          <p:nvPr/>
-        </p:nvSpPr>
-        <p:spPr>
-          <a:xfrm>
-            <a:off x="9276348" y="3217863"/>
-            <a:ext cx="561474" cy="955927"/>
-          </a:xfrm>
-          <a:prstGeom prst="flowChartProcess">
-            <a:avLst/>
-          </a:prstGeom>
-          <a:effectLst>
-            <a:outerShdw blurRad="152400" dist="317500" dir="5400000" sx="90000" sy="-19000" rotWithShape="0">
-              <a:prstClr val="black">
-                <a:alpha val="15000"/>
-              </a:prstClr>
-            </a:outerShdw>
-            <a:reflection blurRad="6350" stA="52000" endA="300" endPos="35000" dir="5400000" sy="-100000" algn="bl" rotWithShape="0"/>
-          </a:effectLst>
-        </p:spPr>
-        <p:style>
-          <a:lnRef idx="2">
-            <a:schemeClr val="dk1"/>
-          </a:lnRef>
-          <a:fillRef idx="1">
-            <a:schemeClr val="lt1"/>
-          </a:fillRef>
-          <a:effectRef idx="0">
-            <a:schemeClr val="dk1"/>
-          </a:effectRef>
-          <a:fontRef idx="minor">
-            <a:schemeClr val="dk1"/>
-          </a:fontRef>
-        </p:style>
-        <p:txBody>
-          <a:bodyPr rtlCol="0" anchor="ctr"/>
-          <a:lstStyle/>
-          <a:p>
-            <a:pPr algn="ctr"/>
-            <a:endParaRPr lang="en-US"/>
-          </a:p>
-        </p:txBody>
-      </p:sp>
-      <p:cxnSp>
-        <p:nvCxnSpPr>
-          <p:cNvPr id="14" name="Straight Arrow Connector 13">
-            <a:extLst>
-              <a:ext uri="{FF2B5EF4-FFF2-40B4-BE49-F238E27FC236}">
-                <a16:creationId xmlns:a16="http://schemas.microsoft.com/office/drawing/2014/main" id="{6F890061-9C1F-4A3A-8926-919980F19D58}"/>
-              </a:ext>
-            </a:extLst>
-          </p:cNvPr>
-          <p:cNvCxnSpPr>
-            <a:cxnSpLocks/>
-          </p:cNvCxnSpPr>
-          <p:nvPr/>
-        </p:nvCxnSpPr>
-        <p:spPr>
-          <a:xfrm flipV="1">
-            <a:off x="9180094" y="3994484"/>
-            <a:ext cx="300790" cy="585538"/>
-          </a:xfrm>
-          <a:prstGeom prst="straightConnector1">
-            <a:avLst/>
-          </a:prstGeom>
-          <a:ln>
-            <a:headEnd type="triangle"/>
-            <a:tailEnd type="triangle"/>
-          </a:ln>
-        </p:spPr>
-        <p:style>
-          <a:lnRef idx="1">
-            <a:schemeClr val="dk1"/>
-          </a:lnRef>
-          <a:fillRef idx="0">
-            <a:schemeClr val="dk1"/>
-          </a:fillRef>
-          <a:effectRef idx="0">
-            <a:schemeClr val="dk1"/>
-          </a:effectRef>
-          <a:fontRef idx="minor">
-            <a:schemeClr val="tx1"/>
-          </a:fontRef>
-        </p:style>
-      </p:cxnSp>
-      <p:sp>
-        <p:nvSpPr>
-          <p:cNvPr id="16" name="Flowchart: Process 15">
-            <a:extLst>
-              <a:ext uri="{FF2B5EF4-FFF2-40B4-BE49-F238E27FC236}">
-                <a16:creationId xmlns:a16="http://schemas.microsoft.com/office/drawing/2014/main" id="{E0C87FAB-D7E0-45C7-B13D-E44AAEB92F32}"/>
-              </a:ext>
-            </a:extLst>
-          </p:cNvPr>
-          <p:cNvSpPr/>
-          <p:nvPr/>
-        </p:nvSpPr>
-        <p:spPr>
-          <a:xfrm>
-            <a:off x="8618620" y="3922752"/>
-            <a:ext cx="561474" cy="955927"/>
-          </a:xfrm>
-          <a:prstGeom prst="flowChartProcess">
-            <a:avLst/>
-          </a:prstGeom>
-          <a:effectLst>
-            <a:outerShdw blurRad="152400" dist="317500" dir="5400000" sx="90000" sy="-19000" rotWithShape="0">
-              <a:prstClr val="black">
-                <a:alpha val="15000"/>
-              </a:prstClr>
-            </a:outerShdw>
-            <a:reflection blurRad="6350" stA="52000" endA="300" endPos="35000" dir="5400000" sy="-100000" algn="bl" rotWithShape="0"/>
-          </a:effectLst>
-        </p:spPr>
-        <p:style>
-          <a:lnRef idx="2">
-            <a:schemeClr val="dk1"/>
-          </a:lnRef>
-          <a:fillRef idx="1">
-            <a:schemeClr val="lt1"/>
-          </a:fillRef>
-          <a:effectRef idx="0">
-            <a:schemeClr val="dk1"/>
-          </a:effectRef>
-          <a:fontRef idx="minor">
-            <a:schemeClr val="dk1"/>
-          </a:fontRef>
-        </p:style>
-        <p:txBody>
-          <a:bodyPr rtlCol="0" anchor="ctr"/>
-          <a:lstStyle/>
-          <a:p>
-            <a:pPr algn="ctr"/>
-            <a:endParaRPr lang="en-US"/>
-          </a:p>
-        </p:txBody>
-      </p:sp>
-      <p:cxnSp>
-        <p:nvCxnSpPr>
-          <p:cNvPr id="18" name="Straight Arrow Connector 17">
-            <a:extLst>
-              <a:ext uri="{FF2B5EF4-FFF2-40B4-BE49-F238E27FC236}">
-                <a16:creationId xmlns:a16="http://schemas.microsoft.com/office/drawing/2014/main" id="{135EC877-5D45-436B-A28A-CBF1DF37B7C3}"/>
-              </a:ext>
-            </a:extLst>
-          </p:cNvPr>
-          <p:cNvCxnSpPr>
-            <a:cxnSpLocks/>
-          </p:cNvCxnSpPr>
-          <p:nvPr/>
-        </p:nvCxnSpPr>
-        <p:spPr>
-          <a:xfrm flipH="1" flipV="1">
-            <a:off x="8029074" y="4188868"/>
-            <a:ext cx="589546" cy="391155"/>
-          </a:xfrm>
-          <a:prstGeom prst="straightConnector1">
-            <a:avLst/>
-          </a:prstGeom>
-          <a:ln>
-            <a:headEnd type="triangle"/>
-            <a:tailEnd type="triangle"/>
-          </a:ln>
-        </p:spPr>
-        <p:style>
-          <a:lnRef idx="1">
-            <a:schemeClr val="dk1"/>
-          </a:lnRef>
-          <a:fillRef idx="0">
-            <a:schemeClr val="dk1"/>
-          </a:fillRef>
-          <a:effectRef idx="0">
-            <a:schemeClr val="dk1"/>
-          </a:effectRef>
-          <a:fontRef idx="minor">
-            <a:schemeClr val="tx1"/>
-          </a:fontRef>
-        </p:style>
-      </p:cxnSp>
+            <a:endParaRPr/>
+          </a:p>
+        </p:txBody>
+      </p:sp>
     </p:spTree>
     <p:extLst>
       <p:ext uri="{BB962C8B-B14F-4D97-AF65-F5344CB8AC3E}">
@@ -4403,7 +4633,7 @@
           <p:cNvPr id="2" name="Title 1">
             <a:extLst>
               <a:ext uri="{FF2B5EF4-FFF2-40B4-BE49-F238E27FC236}">
-                <a16:creationId xmlns:a16="http://schemas.microsoft.com/office/drawing/2014/main" id="{49ACE9E3-EE9F-48D1-BF7A-0B12768F7E8D}"/>
+                <a16:creationId xmlns:a16="http://schemas.microsoft.com/office/drawing/2014/main" id="{375F47C8-4F11-7740-B679-EF14AC7FA69B}"/>
               </a:ext>
             </a:extLst>
           </p:cNvPr>
@@ -4416,45 +4646,1567 @@
         </p:nvSpPr>
         <p:spPr/>
         <p:txBody>
-          <a:bodyPr/>
+          <a:bodyPr>
+            <a:normAutofit/>
+          </a:bodyPr>
           <a:lstStyle/>
           <a:p>
             <a:r>
               <a:rPr lang="en-US" dirty="0"/>
-              <a:t>Data and Results</a:t>
-            </a:r>
-          </a:p>
-        </p:txBody>
-      </p:sp>
-      <p:sp>
-        <p:nvSpPr>
-          <p:cNvPr id="3" name="Content Placeholder 2">
-            <a:extLst>
-              <a:ext uri="{FF2B5EF4-FFF2-40B4-BE49-F238E27FC236}">
-                <a16:creationId xmlns:a16="http://schemas.microsoft.com/office/drawing/2014/main" id="{0D35F901-2ADE-44E9-9625-508BEA63ED07}"/>
-              </a:ext>
-            </a:extLst>
-          </p:cNvPr>
-          <p:cNvSpPr>
-            <a:spLocks noGrp="1"/>
+              <a:t>Converting Problem to QUBO</a:t>
+            </a:r>
+            <a:br>
+              <a:rPr lang="en-US" dirty="0"/>
+            </a:br>
+            <a:r>
+              <a:rPr lang="en-US" sz="2000" dirty="0"/>
+              <a:t>A grocery store manager wants to re-stock and achieve two goals.</a:t>
+            </a:r>
+          </a:p>
+        </p:txBody>
+      </p:sp>
+      <p:grpSp>
+        <p:nvGrpSpPr>
+          <p:cNvPr id="4" name="Group 3">
+            <a:extLst>
+              <a:ext uri="{FF2B5EF4-FFF2-40B4-BE49-F238E27FC236}">
+                <a16:creationId xmlns:a16="http://schemas.microsoft.com/office/drawing/2014/main" id="{73125922-4E22-8C4A-9366-1796F7A95671}"/>
+              </a:ext>
+            </a:extLst>
+          </p:cNvPr>
+          <p:cNvGrpSpPr/>
+          <p:nvPr/>
+        </p:nvGrpSpPr>
+        <p:grpSpPr>
+          <a:xfrm>
+            <a:off x="6372572" y="1721309"/>
+            <a:ext cx="5200322" cy="2998013"/>
+            <a:chOff x="1090393" y="1662402"/>
+            <a:chExt cx="5200322" cy="2998013"/>
+          </a:xfrm>
+        </p:grpSpPr>
+        <p:sp>
+          <p:nvSpPr>
+            <p:cNvPr id="5" name="Title 1">
+              <a:extLst>
+                <a:ext uri="{FF2B5EF4-FFF2-40B4-BE49-F238E27FC236}">
+                  <a16:creationId xmlns:a16="http://schemas.microsoft.com/office/drawing/2014/main" id="{C930425E-4A15-0D49-88E2-40194DDC8519}"/>
+                </a:ext>
+              </a:extLst>
+            </p:cNvPr>
+            <p:cNvSpPr txBox="1">
+              <a:spLocks/>
+            </p:cNvSpPr>
+            <p:nvPr/>
+          </p:nvSpPr>
+          <p:spPr>
+            <a:xfrm>
+              <a:off x="2807981" y="1662402"/>
+              <a:ext cx="1994851" cy="443255"/>
+            </a:xfrm>
+            <a:prstGeom prst="rect">
+              <a:avLst/>
+            </a:prstGeom>
+            <a:solidFill>
+              <a:schemeClr val="tx1"/>
+            </a:solidFill>
+          </p:spPr>
+          <p:txBody>
+            <a:bodyPr vert="horz" lIns="91440" tIns="45720" rIns="91440" bIns="45720" rtlCol="0" anchor="ctr">
+              <a:normAutofit/>
+            </a:bodyPr>
+            <a:lstStyle>
+              <a:lvl1pPr algn="l" defTabSz="914400" rtl="0" eaLnBrk="1" latinLnBrk="0" hangingPunct="1">
+                <a:lnSpc>
+                  <a:spcPct val="90000"/>
+                </a:lnSpc>
+                <a:spcBef>
+                  <a:spcPct val="0"/>
+                </a:spcBef>
+                <a:buNone/>
+                <a:defRPr sz="4400" kern="1200">
+                  <a:solidFill>
+                    <a:schemeClr val="tx1"/>
+                  </a:solidFill>
+                  <a:latin typeface="+mj-lt"/>
+                  <a:ea typeface="+mj-ea"/>
+                  <a:cs typeface="+mj-cs"/>
+                </a:defRPr>
+              </a:lvl1pPr>
+            </a:lstStyle>
+            <a:p>
+              <a:r>
+                <a:rPr lang="en-US" sz="2200" dirty="0">
+                  <a:solidFill>
+                    <a:schemeClr val="bg1"/>
+                  </a:solidFill>
+                </a:rPr>
+                <a:t>Set Cover BQM</a:t>
+              </a:r>
+            </a:p>
+          </p:txBody>
+        </p:sp>
+        <p:sp>
+          <p:nvSpPr>
+            <p:cNvPr id="6" name="Content Placeholder 2">
+              <a:extLst>
+                <a:ext uri="{FF2B5EF4-FFF2-40B4-BE49-F238E27FC236}">
+                  <a16:creationId xmlns:a16="http://schemas.microsoft.com/office/drawing/2014/main" id="{997CA990-4962-4442-8B54-4969A4E48945}"/>
+                </a:ext>
+              </a:extLst>
+            </p:cNvPr>
+            <p:cNvSpPr txBox="1">
+              <a:spLocks/>
+            </p:cNvSpPr>
+            <p:nvPr/>
+          </p:nvSpPr>
+          <p:spPr>
+            <a:xfrm>
+              <a:off x="1138270" y="2176549"/>
+              <a:ext cx="4834377" cy="801491"/>
+            </a:xfrm>
+            <a:prstGeom prst="rect">
+              <a:avLst/>
+            </a:prstGeom>
+          </p:spPr>
+          <p:txBody>
+            <a:bodyPr vert="horz" lIns="91440" tIns="45720" rIns="91440" bIns="45720" rtlCol="0">
+              <a:normAutofit/>
+            </a:bodyPr>
+            <a:lstStyle>
+              <a:lvl1pPr marL="228600" indent="-228600" algn="l" defTabSz="914400" rtl="0" eaLnBrk="1" latinLnBrk="0" hangingPunct="1">
+                <a:lnSpc>
+                  <a:spcPct val="90000"/>
+                </a:lnSpc>
+                <a:spcBef>
+                  <a:spcPts val="1000"/>
+                </a:spcBef>
+                <a:buFont typeface="Arial" panose="020B0604020202020204" pitchFamily="34" charset="0"/>
+                <a:buChar char="•"/>
+                <a:defRPr sz="2800" kern="1200">
+                  <a:solidFill>
+                    <a:schemeClr val="tx1"/>
+                  </a:solidFill>
+                  <a:latin typeface="+mn-lt"/>
+                  <a:ea typeface="+mn-ea"/>
+                  <a:cs typeface="+mn-cs"/>
+                </a:defRPr>
+              </a:lvl1pPr>
+              <a:lvl2pPr marL="685800" indent="-228600" algn="l" defTabSz="914400" rtl="0" eaLnBrk="1" latinLnBrk="0" hangingPunct="1">
+                <a:lnSpc>
+                  <a:spcPct val="90000"/>
+                </a:lnSpc>
+                <a:spcBef>
+                  <a:spcPts val="500"/>
+                </a:spcBef>
+                <a:buFont typeface="Arial" panose="020B0604020202020204" pitchFamily="34" charset="0"/>
+                <a:buChar char="•"/>
+                <a:defRPr sz="2400" kern="1200">
+                  <a:solidFill>
+                    <a:schemeClr val="tx1"/>
+                  </a:solidFill>
+                  <a:latin typeface="+mn-lt"/>
+                  <a:ea typeface="+mn-ea"/>
+                  <a:cs typeface="+mn-cs"/>
+                </a:defRPr>
+              </a:lvl2pPr>
+              <a:lvl3pPr marL="1143000" indent="-228600" algn="l" defTabSz="914400" rtl="0" eaLnBrk="1" latinLnBrk="0" hangingPunct="1">
+                <a:lnSpc>
+                  <a:spcPct val="90000"/>
+                </a:lnSpc>
+                <a:spcBef>
+                  <a:spcPts val="500"/>
+                </a:spcBef>
+                <a:buFont typeface="Arial" panose="020B0604020202020204" pitchFamily="34" charset="0"/>
+                <a:buChar char="•"/>
+                <a:defRPr sz="2000" kern="1200">
+                  <a:solidFill>
+                    <a:schemeClr val="tx1"/>
+                  </a:solidFill>
+                  <a:latin typeface="+mn-lt"/>
+                  <a:ea typeface="+mn-ea"/>
+                  <a:cs typeface="+mn-cs"/>
+                </a:defRPr>
+              </a:lvl3pPr>
+              <a:lvl4pPr marL="1600200" indent="-228600" algn="l" defTabSz="914400" rtl="0" eaLnBrk="1" latinLnBrk="0" hangingPunct="1">
+                <a:lnSpc>
+                  <a:spcPct val="90000"/>
+                </a:lnSpc>
+                <a:spcBef>
+                  <a:spcPts val="500"/>
+                </a:spcBef>
+                <a:buFont typeface="Arial" panose="020B0604020202020204" pitchFamily="34" charset="0"/>
+                <a:buChar char="•"/>
+                <a:defRPr sz="1800" kern="1200">
+                  <a:solidFill>
+                    <a:schemeClr val="tx1"/>
+                  </a:solidFill>
+                  <a:latin typeface="+mn-lt"/>
+                  <a:ea typeface="+mn-ea"/>
+                  <a:cs typeface="+mn-cs"/>
+                </a:defRPr>
+              </a:lvl4pPr>
+              <a:lvl5pPr marL="2057400" indent="-228600" algn="l" defTabSz="914400" rtl="0" eaLnBrk="1" latinLnBrk="0" hangingPunct="1">
+                <a:lnSpc>
+                  <a:spcPct val="90000"/>
+                </a:lnSpc>
+                <a:spcBef>
+                  <a:spcPts val="500"/>
+                </a:spcBef>
+                <a:buFont typeface="Arial" panose="020B0604020202020204" pitchFamily="34" charset="0"/>
+                <a:buChar char="•"/>
+                <a:defRPr sz="1800" kern="1200">
+                  <a:solidFill>
+                    <a:schemeClr val="tx1"/>
+                  </a:solidFill>
+                  <a:latin typeface="+mn-lt"/>
+                  <a:ea typeface="+mn-ea"/>
+                  <a:cs typeface="+mn-cs"/>
+                </a:defRPr>
+              </a:lvl5pPr>
+              <a:lvl6pPr marL="2514600" indent="-228600" algn="l" defTabSz="914400" rtl="0" eaLnBrk="1" latinLnBrk="0" hangingPunct="1">
+                <a:lnSpc>
+                  <a:spcPct val="90000"/>
+                </a:lnSpc>
+                <a:spcBef>
+                  <a:spcPts val="500"/>
+                </a:spcBef>
+                <a:buFont typeface="Arial" panose="020B0604020202020204" pitchFamily="34" charset="0"/>
+                <a:buChar char="•"/>
+                <a:defRPr sz="1800" kern="1200">
+                  <a:solidFill>
+                    <a:schemeClr val="tx1"/>
+                  </a:solidFill>
+                  <a:latin typeface="+mn-lt"/>
+                  <a:ea typeface="+mn-ea"/>
+                  <a:cs typeface="+mn-cs"/>
+                </a:defRPr>
+              </a:lvl6pPr>
+              <a:lvl7pPr marL="2971800" indent="-228600" algn="l" defTabSz="914400" rtl="0" eaLnBrk="1" latinLnBrk="0" hangingPunct="1">
+                <a:lnSpc>
+                  <a:spcPct val="90000"/>
+                </a:lnSpc>
+                <a:spcBef>
+                  <a:spcPts val="500"/>
+                </a:spcBef>
+                <a:buFont typeface="Arial" panose="020B0604020202020204" pitchFamily="34" charset="0"/>
+                <a:buChar char="•"/>
+                <a:defRPr sz="1800" kern="1200">
+                  <a:solidFill>
+                    <a:schemeClr val="tx1"/>
+                  </a:solidFill>
+                  <a:latin typeface="+mn-lt"/>
+                  <a:ea typeface="+mn-ea"/>
+                  <a:cs typeface="+mn-cs"/>
+                </a:defRPr>
+              </a:lvl7pPr>
+              <a:lvl8pPr marL="3429000" indent="-228600" algn="l" defTabSz="914400" rtl="0" eaLnBrk="1" latinLnBrk="0" hangingPunct="1">
+                <a:lnSpc>
+                  <a:spcPct val="90000"/>
+                </a:lnSpc>
+                <a:spcBef>
+                  <a:spcPts val="500"/>
+                </a:spcBef>
+                <a:buFont typeface="Arial" panose="020B0604020202020204" pitchFamily="34" charset="0"/>
+                <a:buChar char="•"/>
+                <a:defRPr sz="1800" kern="1200">
+                  <a:solidFill>
+                    <a:schemeClr val="tx1"/>
+                  </a:solidFill>
+                  <a:latin typeface="+mn-lt"/>
+                  <a:ea typeface="+mn-ea"/>
+                  <a:cs typeface="+mn-cs"/>
+                </a:defRPr>
+              </a:lvl8pPr>
+              <a:lvl9pPr marL="3886200" indent="-228600" algn="l" defTabSz="914400" rtl="0" eaLnBrk="1" latinLnBrk="0" hangingPunct="1">
+                <a:lnSpc>
+                  <a:spcPct val="90000"/>
+                </a:lnSpc>
+                <a:spcBef>
+                  <a:spcPts val="500"/>
+                </a:spcBef>
+                <a:buFont typeface="Arial" panose="020B0604020202020204" pitchFamily="34" charset="0"/>
+                <a:buChar char="•"/>
+                <a:defRPr sz="1800" kern="1200">
+                  <a:solidFill>
+                    <a:schemeClr val="tx1"/>
+                  </a:solidFill>
+                  <a:latin typeface="+mn-lt"/>
+                  <a:ea typeface="+mn-ea"/>
+                  <a:cs typeface="+mn-cs"/>
+                </a:defRPr>
+              </a:lvl9pPr>
+            </a:lstStyle>
+            <a:p>
+              <a:pPr>
+                <a:lnSpc>
+                  <a:spcPct val="100000"/>
+                </a:lnSpc>
+              </a:pPr>
+              <a:r>
+                <a:rPr lang="en-US" sz="1800" dirty="0"/>
+                <a:t>Find a minimum number of suppliers to fill the inventory.</a:t>
+              </a:r>
+            </a:p>
+          </p:txBody>
+        </p:sp>
+        <p:pic>
+          <p:nvPicPr>
+            <p:cNvPr id="7" name="Picture 6">
+              <a:extLst>
+                <a:ext uri="{FF2B5EF4-FFF2-40B4-BE49-F238E27FC236}">
+                  <a16:creationId xmlns:a16="http://schemas.microsoft.com/office/drawing/2014/main" id="{8F3E2A9F-EB3D-6143-9566-5B2300FB8079}"/>
+                </a:ext>
+              </a:extLst>
+            </p:cNvPr>
+            <p:cNvPicPr>
+              <a:picLocks noChangeAspect="1"/>
+            </p:cNvPicPr>
+            <p:nvPr/>
+          </p:nvPicPr>
+          <p:blipFill>
+            <a:blip r:embed="rId2"/>
+            <a:stretch>
+              <a:fillRect/>
+            </a:stretch>
+          </p:blipFill>
+          <p:spPr>
+            <a:xfrm>
+              <a:off x="1138270" y="2900256"/>
+              <a:ext cx="5152445" cy="801491"/>
+            </a:xfrm>
+            <a:prstGeom prst="rect">
+              <a:avLst/>
+            </a:prstGeom>
+          </p:spPr>
+        </p:pic>
+        <p:pic>
+          <p:nvPicPr>
+            <p:cNvPr id="8" name="Picture 7">
+              <a:extLst>
+                <a:ext uri="{FF2B5EF4-FFF2-40B4-BE49-F238E27FC236}">
+                  <a16:creationId xmlns:a16="http://schemas.microsoft.com/office/drawing/2014/main" id="{6BC01987-3CA6-AC4B-B92D-384367741D4B}"/>
+                </a:ext>
+              </a:extLst>
+            </p:cNvPr>
+            <p:cNvPicPr>
+              <a:picLocks noChangeAspect="1"/>
+            </p:cNvPicPr>
+            <p:nvPr/>
+          </p:nvPicPr>
+          <p:blipFill>
+            <a:blip r:embed="rId3"/>
+            <a:stretch>
+              <a:fillRect/>
+            </a:stretch>
+          </p:blipFill>
+          <p:spPr>
+            <a:xfrm>
+              <a:off x="1090393" y="3768096"/>
+              <a:ext cx="5200322" cy="892319"/>
+            </a:xfrm>
+            <a:prstGeom prst="rect">
+              <a:avLst/>
+            </a:prstGeom>
+          </p:spPr>
+        </p:pic>
+      </p:grpSp>
+      <p:grpSp>
+        <p:nvGrpSpPr>
+          <p:cNvPr id="9" name="Group 8">
+            <a:extLst>
+              <a:ext uri="{FF2B5EF4-FFF2-40B4-BE49-F238E27FC236}">
+                <a16:creationId xmlns:a16="http://schemas.microsoft.com/office/drawing/2014/main" id="{28E67C8F-90B9-3B48-BD8D-9F9A92586B6F}"/>
+              </a:ext>
+            </a:extLst>
+          </p:cNvPr>
+          <p:cNvGrpSpPr/>
+          <p:nvPr/>
+        </p:nvGrpSpPr>
+        <p:grpSpPr>
+          <a:xfrm>
+            <a:off x="838200" y="1690688"/>
+            <a:ext cx="5152445" cy="3780832"/>
+            <a:chOff x="6599545" y="1596133"/>
+            <a:chExt cx="5152445" cy="3780832"/>
+          </a:xfrm>
+        </p:grpSpPr>
+        <p:sp>
+          <p:nvSpPr>
+            <p:cNvPr id="10" name="Title 1">
+              <a:extLst>
+                <a:ext uri="{FF2B5EF4-FFF2-40B4-BE49-F238E27FC236}">
+                  <a16:creationId xmlns:a16="http://schemas.microsoft.com/office/drawing/2014/main" id="{B65576C5-CC8A-6348-801F-C23E822DA7C5}"/>
+                </a:ext>
+              </a:extLst>
+            </p:cNvPr>
+            <p:cNvSpPr txBox="1">
+              <a:spLocks/>
+            </p:cNvSpPr>
+            <p:nvPr/>
+          </p:nvSpPr>
+          <p:spPr>
+            <a:xfrm>
+              <a:off x="8178342" y="1596133"/>
+              <a:ext cx="1994851" cy="443255"/>
+            </a:xfrm>
+            <a:prstGeom prst="rect">
+              <a:avLst/>
+            </a:prstGeom>
+            <a:solidFill>
+              <a:schemeClr val="tx1"/>
+            </a:solidFill>
+          </p:spPr>
+          <p:txBody>
+            <a:bodyPr vert="horz" lIns="91440" tIns="45720" rIns="91440" bIns="45720" rtlCol="0" anchor="ctr">
+              <a:noAutofit/>
+            </a:bodyPr>
+            <a:lstStyle>
+              <a:lvl1pPr algn="l" defTabSz="914400" rtl="0" eaLnBrk="1" latinLnBrk="0" hangingPunct="1">
+                <a:lnSpc>
+                  <a:spcPct val="90000"/>
+                </a:lnSpc>
+                <a:spcBef>
+                  <a:spcPct val="0"/>
+                </a:spcBef>
+                <a:buNone/>
+                <a:defRPr sz="4400" kern="1200">
+                  <a:solidFill>
+                    <a:schemeClr val="tx1"/>
+                  </a:solidFill>
+                  <a:latin typeface="+mj-lt"/>
+                  <a:ea typeface="+mj-ea"/>
+                  <a:cs typeface="+mj-cs"/>
+                </a:defRPr>
+              </a:lvl1pPr>
+            </a:lstStyle>
+            <a:p>
+              <a:r>
+                <a:rPr lang="en-US" sz="2000" dirty="0">
+                  <a:solidFill>
+                    <a:schemeClr val="bg1"/>
+                  </a:solidFill>
+                </a:rPr>
+                <a:t>Knapsack DQM</a:t>
+              </a:r>
+            </a:p>
+          </p:txBody>
+        </p:sp>
+        <p:sp>
+          <p:nvSpPr>
+            <p:cNvPr id="11" name="Content Placeholder 2">
+              <a:extLst>
+                <a:ext uri="{FF2B5EF4-FFF2-40B4-BE49-F238E27FC236}">
+                  <a16:creationId xmlns:a16="http://schemas.microsoft.com/office/drawing/2014/main" id="{88FDF2DC-00D3-2A46-9458-F5AAB05E62E2}"/>
+                </a:ext>
+              </a:extLst>
+            </p:cNvPr>
+            <p:cNvSpPr txBox="1">
+              <a:spLocks/>
+            </p:cNvSpPr>
+            <p:nvPr/>
+          </p:nvSpPr>
+          <p:spPr>
+            <a:xfrm>
+              <a:off x="6599545" y="2130400"/>
+              <a:ext cx="5152445" cy="1420191"/>
+            </a:xfrm>
+            <a:prstGeom prst="rect">
+              <a:avLst/>
+            </a:prstGeom>
+          </p:spPr>
+          <p:txBody>
+            <a:bodyPr vert="horz" lIns="91440" tIns="45720" rIns="91440" bIns="45720" rtlCol="0">
+              <a:normAutofit/>
+            </a:bodyPr>
+            <a:lstStyle>
+              <a:lvl1pPr marL="228600" indent="-228600" algn="l" defTabSz="914400" rtl="0" eaLnBrk="1" latinLnBrk="0" hangingPunct="1">
+                <a:lnSpc>
+                  <a:spcPct val="90000"/>
+                </a:lnSpc>
+                <a:spcBef>
+                  <a:spcPts val="1000"/>
+                </a:spcBef>
+                <a:buFont typeface="Arial" panose="020B0604020202020204" pitchFamily="34" charset="0"/>
+                <a:buChar char="•"/>
+                <a:defRPr sz="2800" kern="1200">
+                  <a:solidFill>
+                    <a:schemeClr val="tx1"/>
+                  </a:solidFill>
+                  <a:latin typeface="+mn-lt"/>
+                  <a:ea typeface="+mn-ea"/>
+                  <a:cs typeface="+mn-cs"/>
+                </a:defRPr>
+              </a:lvl1pPr>
+              <a:lvl2pPr marL="685800" indent="-228600" algn="l" defTabSz="914400" rtl="0" eaLnBrk="1" latinLnBrk="0" hangingPunct="1">
+                <a:lnSpc>
+                  <a:spcPct val="90000"/>
+                </a:lnSpc>
+                <a:spcBef>
+                  <a:spcPts val="500"/>
+                </a:spcBef>
+                <a:buFont typeface="Arial" panose="020B0604020202020204" pitchFamily="34" charset="0"/>
+                <a:buChar char="•"/>
+                <a:defRPr sz="2400" kern="1200">
+                  <a:solidFill>
+                    <a:schemeClr val="tx1"/>
+                  </a:solidFill>
+                  <a:latin typeface="+mn-lt"/>
+                  <a:ea typeface="+mn-ea"/>
+                  <a:cs typeface="+mn-cs"/>
+                </a:defRPr>
+              </a:lvl2pPr>
+              <a:lvl3pPr marL="1143000" indent="-228600" algn="l" defTabSz="914400" rtl="0" eaLnBrk="1" latinLnBrk="0" hangingPunct="1">
+                <a:lnSpc>
+                  <a:spcPct val="90000"/>
+                </a:lnSpc>
+                <a:spcBef>
+                  <a:spcPts val="500"/>
+                </a:spcBef>
+                <a:buFont typeface="Arial" panose="020B0604020202020204" pitchFamily="34" charset="0"/>
+                <a:buChar char="•"/>
+                <a:defRPr sz="2000" kern="1200">
+                  <a:solidFill>
+                    <a:schemeClr val="tx1"/>
+                  </a:solidFill>
+                  <a:latin typeface="+mn-lt"/>
+                  <a:ea typeface="+mn-ea"/>
+                  <a:cs typeface="+mn-cs"/>
+                </a:defRPr>
+              </a:lvl3pPr>
+              <a:lvl4pPr marL="1600200" indent="-228600" algn="l" defTabSz="914400" rtl="0" eaLnBrk="1" latinLnBrk="0" hangingPunct="1">
+                <a:lnSpc>
+                  <a:spcPct val="90000"/>
+                </a:lnSpc>
+                <a:spcBef>
+                  <a:spcPts val="500"/>
+                </a:spcBef>
+                <a:buFont typeface="Arial" panose="020B0604020202020204" pitchFamily="34" charset="0"/>
+                <a:buChar char="•"/>
+                <a:defRPr sz="1800" kern="1200">
+                  <a:solidFill>
+                    <a:schemeClr val="tx1"/>
+                  </a:solidFill>
+                  <a:latin typeface="+mn-lt"/>
+                  <a:ea typeface="+mn-ea"/>
+                  <a:cs typeface="+mn-cs"/>
+                </a:defRPr>
+              </a:lvl4pPr>
+              <a:lvl5pPr marL="2057400" indent="-228600" algn="l" defTabSz="914400" rtl="0" eaLnBrk="1" latinLnBrk="0" hangingPunct="1">
+                <a:lnSpc>
+                  <a:spcPct val="90000"/>
+                </a:lnSpc>
+                <a:spcBef>
+                  <a:spcPts val="500"/>
+                </a:spcBef>
+                <a:buFont typeface="Arial" panose="020B0604020202020204" pitchFamily="34" charset="0"/>
+                <a:buChar char="•"/>
+                <a:defRPr sz="1800" kern="1200">
+                  <a:solidFill>
+                    <a:schemeClr val="tx1"/>
+                  </a:solidFill>
+                  <a:latin typeface="+mn-lt"/>
+                  <a:ea typeface="+mn-ea"/>
+                  <a:cs typeface="+mn-cs"/>
+                </a:defRPr>
+              </a:lvl5pPr>
+              <a:lvl6pPr marL="2514600" indent="-228600" algn="l" defTabSz="914400" rtl="0" eaLnBrk="1" latinLnBrk="0" hangingPunct="1">
+                <a:lnSpc>
+                  <a:spcPct val="90000"/>
+                </a:lnSpc>
+                <a:spcBef>
+                  <a:spcPts val="500"/>
+                </a:spcBef>
+                <a:buFont typeface="Arial" panose="020B0604020202020204" pitchFamily="34" charset="0"/>
+                <a:buChar char="•"/>
+                <a:defRPr sz="1800" kern="1200">
+                  <a:solidFill>
+                    <a:schemeClr val="tx1"/>
+                  </a:solidFill>
+                  <a:latin typeface="+mn-lt"/>
+                  <a:ea typeface="+mn-ea"/>
+                  <a:cs typeface="+mn-cs"/>
+                </a:defRPr>
+              </a:lvl6pPr>
+              <a:lvl7pPr marL="2971800" indent="-228600" algn="l" defTabSz="914400" rtl="0" eaLnBrk="1" latinLnBrk="0" hangingPunct="1">
+                <a:lnSpc>
+                  <a:spcPct val="90000"/>
+                </a:lnSpc>
+                <a:spcBef>
+                  <a:spcPts val="500"/>
+                </a:spcBef>
+                <a:buFont typeface="Arial" panose="020B0604020202020204" pitchFamily="34" charset="0"/>
+                <a:buChar char="•"/>
+                <a:defRPr sz="1800" kern="1200">
+                  <a:solidFill>
+                    <a:schemeClr val="tx1"/>
+                  </a:solidFill>
+                  <a:latin typeface="+mn-lt"/>
+                  <a:ea typeface="+mn-ea"/>
+                  <a:cs typeface="+mn-cs"/>
+                </a:defRPr>
+              </a:lvl7pPr>
+              <a:lvl8pPr marL="3429000" indent="-228600" algn="l" defTabSz="914400" rtl="0" eaLnBrk="1" latinLnBrk="0" hangingPunct="1">
+                <a:lnSpc>
+                  <a:spcPct val="90000"/>
+                </a:lnSpc>
+                <a:spcBef>
+                  <a:spcPts val="500"/>
+                </a:spcBef>
+                <a:buFont typeface="Arial" panose="020B0604020202020204" pitchFamily="34" charset="0"/>
+                <a:buChar char="•"/>
+                <a:defRPr sz="1800" kern="1200">
+                  <a:solidFill>
+                    <a:schemeClr val="tx1"/>
+                  </a:solidFill>
+                  <a:latin typeface="+mn-lt"/>
+                  <a:ea typeface="+mn-ea"/>
+                  <a:cs typeface="+mn-cs"/>
+                </a:defRPr>
+              </a:lvl8pPr>
+              <a:lvl9pPr marL="3886200" indent="-228600" algn="l" defTabSz="914400" rtl="0" eaLnBrk="1" latinLnBrk="0" hangingPunct="1">
+                <a:lnSpc>
+                  <a:spcPct val="90000"/>
+                </a:lnSpc>
+                <a:spcBef>
+                  <a:spcPts val="500"/>
+                </a:spcBef>
+                <a:buFont typeface="Arial" panose="020B0604020202020204" pitchFamily="34" charset="0"/>
+                <a:buChar char="•"/>
+                <a:defRPr sz="1800" kern="1200">
+                  <a:solidFill>
+                    <a:schemeClr val="tx1"/>
+                  </a:solidFill>
+                  <a:latin typeface="+mn-lt"/>
+                  <a:ea typeface="+mn-ea"/>
+                  <a:cs typeface="+mn-cs"/>
+                </a:defRPr>
+              </a:lvl9pPr>
+            </a:lstStyle>
+            <a:p>
+              <a:pPr>
+                <a:lnSpc>
+                  <a:spcPct val="100000"/>
+                </a:lnSpc>
+              </a:pPr>
+              <a:r>
+                <a:rPr lang="en-US" sz="1800" dirty="0"/>
+                <a:t>Given a budget constraint, decide what and how many items to purchase to maximize the profit.</a:t>
+              </a:r>
+            </a:p>
+          </p:txBody>
+        </p:sp>
+        <p:pic>
+          <p:nvPicPr>
+            <p:cNvPr id="12" name="Picture 11">
+              <a:extLst>
+                <a:ext uri="{FF2B5EF4-FFF2-40B4-BE49-F238E27FC236}">
+                  <a16:creationId xmlns:a16="http://schemas.microsoft.com/office/drawing/2014/main" id="{7009CD0C-948D-A945-A0B9-D8C1C2CE3F52}"/>
+                </a:ext>
+              </a:extLst>
+            </p:cNvPr>
+            <p:cNvPicPr>
+              <a:picLocks noChangeAspect="1"/>
+            </p:cNvPicPr>
+            <p:nvPr/>
+          </p:nvPicPr>
+          <p:blipFill>
+            <a:blip r:embed="rId4"/>
+            <a:stretch>
+              <a:fillRect/>
+            </a:stretch>
+          </p:blipFill>
+          <p:spPr>
+            <a:xfrm>
+              <a:off x="7319832" y="4649390"/>
+              <a:ext cx="4339919" cy="727575"/>
+            </a:xfrm>
+            <a:prstGeom prst="rect">
+              <a:avLst/>
+            </a:prstGeom>
+          </p:spPr>
+        </p:pic>
+      </p:grpSp>
+      <p:sp>
+        <p:nvSpPr>
+          <p:cNvPr id="13" name="Title 1">
+            <a:extLst>
+              <a:ext uri="{FF2B5EF4-FFF2-40B4-BE49-F238E27FC236}">
+                <a16:creationId xmlns:a16="http://schemas.microsoft.com/office/drawing/2014/main" id="{472B0578-1678-EF43-93F8-E255D4CE5245}"/>
+              </a:ext>
+            </a:extLst>
+          </p:cNvPr>
+          <p:cNvSpPr txBox="1">
+            <a:spLocks/>
           </p:cNvSpPr>
-          <p:nvPr>
-            <p:ph idx="1"/>
-          </p:nvPr>
-        </p:nvSpPr>
-        <p:spPr/>
-        <p:txBody>
-          <a:bodyPr/>
-          <a:lstStyle/>
-          <a:p>
-            <a:endParaRPr lang="en-US"/>
+          <p:nvPr/>
+        </p:nvSpPr>
+        <p:spPr>
+          <a:xfrm>
+            <a:off x="5063152" y="5409108"/>
+            <a:ext cx="2209319" cy="443255"/>
+          </a:xfrm>
+          <a:prstGeom prst="rect">
+            <a:avLst/>
+          </a:prstGeom>
+          <a:solidFill>
+            <a:schemeClr val="tx1"/>
+          </a:solidFill>
+        </p:spPr>
+        <p:txBody>
+          <a:bodyPr vert="horz" lIns="91440" tIns="45720" rIns="91440" bIns="45720" rtlCol="0" anchor="ctr">
+            <a:noAutofit/>
+          </a:bodyPr>
+          <a:lstStyle>
+            <a:lvl1pPr algn="l" defTabSz="914400" rtl="0" eaLnBrk="1" latinLnBrk="0" hangingPunct="1">
+              <a:lnSpc>
+                <a:spcPct val="90000"/>
+              </a:lnSpc>
+              <a:spcBef>
+                <a:spcPct val="0"/>
+              </a:spcBef>
+              <a:buNone/>
+              <a:defRPr sz="4400" kern="1200">
+                <a:solidFill>
+                  <a:schemeClr val="tx1"/>
+                </a:solidFill>
+                <a:latin typeface="+mj-lt"/>
+                <a:ea typeface="+mj-ea"/>
+                <a:cs typeface="+mj-cs"/>
+              </a:defRPr>
+            </a:lvl1pPr>
+          </a:lstStyle>
+          <a:p>
+            <a:r>
+              <a:rPr lang="en-US" sz="2000" dirty="0">
+                <a:solidFill>
+                  <a:schemeClr val="bg1"/>
+                </a:solidFill>
+              </a:rPr>
+              <a:t>Combined QUBO</a:t>
+            </a:r>
+          </a:p>
+        </p:txBody>
+      </p:sp>
+      <p:pic>
+        <p:nvPicPr>
+          <p:cNvPr id="14" name="Picture 13">
+            <a:extLst>
+              <a:ext uri="{FF2B5EF4-FFF2-40B4-BE49-F238E27FC236}">
+                <a16:creationId xmlns:a16="http://schemas.microsoft.com/office/drawing/2014/main" id="{A112F1C2-F8EC-4740-BB10-D10642CF1FEA}"/>
+              </a:ext>
+            </a:extLst>
+          </p:cNvPr>
+          <p:cNvPicPr>
+            <a:picLocks noChangeAspect="1"/>
+          </p:cNvPicPr>
+          <p:nvPr/>
+        </p:nvPicPr>
+        <p:blipFill>
+          <a:blip r:embed="rId5"/>
+          <a:stretch>
+            <a:fillRect/>
+          </a:stretch>
+        </p:blipFill>
+        <p:spPr>
+          <a:xfrm>
+            <a:off x="1461167" y="2974624"/>
+            <a:ext cx="4437239" cy="642329"/>
+          </a:xfrm>
+          <a:prstGeom prst="rect">
+            <a:avLst/>
+          </a:prstGeom>
+        </p:spPr>
+      </p:pic>
+      <p:sp>
+        <p:nvSpPr>
+          <p:cNvPr id="15" name="TextBox 14">
+            <a:extLst>
+              <a:ext uri="{FF2B5EF4-FFF2-40B4-BE49-F238E27FC236}">
+                <a16:creationId xmlns:a16="http://schemas.microsoft.com/office/drawing/2014/main" id="{0D59C0DA-AA73-454B-8A91-811EB84D71DE}"/>
+              </a:ext>
+            </a:extLst>
+          </p:cNvPr>
+          <p:cNvSpPr txBox="1"/>
+          <p:nvPr/>
+        </p:nvSpPr>
+        <p:spPr>
+          <a:xfrm>
+            <a:off x="599931" y="2812828"/>
+            <a:ext cx="794898" cy="369332"/>
+          </a:xfrm>
+          <a:prstGeom prst="rect">
+            <a:avLst/>
+          </a:prstGeom>
+          <a:noFill/>
+        </p:spPr>
+        <p:txBody>
+          <a:bodyPr wrap="none" rtlCol="0">
+            <a:spAutoFit/>
+          </a:bodyPr>
+          <a:lstStyle/>
+          <a:p>
+            <a:r>
+              <a:rPr lang="en-US" dirty="0">
+                <a:solidFill>
+                  <a:schemeClr val="bg1">
+                    <a:lumMod val="50000"/>
+                  </a:schemeClr>
+                </a:solidFill>
+              </a:rPr>
+              <a:t>profits</a:t>
+            </a:r>
+          </a:p>
+        </p:txBody>
+      </p:sp>
+      <p:sp>
+        <p:nvSpPr>
+          <p:cNvPr id="16" name="TextBox 15">
+            <a:extLst>
+              <a:ext uri="{FF2B5EF4-FFF2-40B4-BE49-F238E27FC236}">
+                <a16:creationId xmlns:a16="http://schemas.microsoft.com/office/drawing/2014/main" id="{AF55BBED-A6F2-374E-AEC7-8CE5299B9080}"/>
+              </a:ext>
+            </a:extLst>
+          </p:cNvPr>
+          <p:cNvSpPr txBox="1"/>
+          <p:nvPr/>
+        </p:nvSpPr>
+        <p:spPr>
+          <a:xfrm>
+            <a:off x="683990" y="3182160"/>
+            <a:ext cx="656270" cy="369332"/>
+          </a:xfrm>
+          <a:prstGeom prst="rect">
+            <a:avLst/>
+          </a:prstGeom>
+          <a:noFill/>
+        </p:spPr>
+        <p:txBody>
+          <a:bodyPr wrap="none" rtlCol="0">
+            <a:spAutoFit/>
+          </a:bodyPr>
+          <a:lstStyle/>
+          <a:p>
+            <a:r>
+              <a:rPr lang="en-US" dirty="0">
+                <a:solidFill>
+                  <a:schemeClr val="bg1">
+                    <a:lumMod val="50000"/>
+                  </a:schemeClr>
+                </a:solidFill>
+              </a:rPr>
+              <a:t>costs</a:t>
+            </a:r>
+          </a:p>
+        </p:txBody>
+      </p:sp>
+      <p:cxnSp>
+        <p:nvCxnSpPr>
+          <p:cNvPr id="17" name="Straight Connector 16">
+            <a:extLst>
+              <a:ext uri="{FF2B5EF4-FFF2-40B4-BE49-F238E27FC236}">
+                <a16:creationId xmlns:a16="http://schemas.microsoft.com/office/drawing/2014/main" id="{3D9DA743-BBE2-EE44-AC75-DFED7463B35E}"/>
+              </a:ext>
+            </a:extLst>
+          </p:cNvPr>
+          <p:cNvCxnSpPr>
+            <a:cxnSpLocks/>
+          </p:cNvCxnSpPr>
+          <p:nvPr/>
+        </p:nvCxnSpPr>
+        <p:spPr>
+          <a:xfrm>
+            <a:off x="1322152" y="3025759"/>
+            <a:ext cx="192753" cy="57581"/>
+          </a:xfrm>
+          <a:prstGeom prst="line">
+            <a:avLst/>
+          </a:prstGeom>
+          <a:ln w="28575">
+            <a:solidFill>
+              <a:schemeClr val="bg1">
+                <a:lumMod val="65000"/>
+              </a:schemeClr>
+            </a:solidFill>
+          </a:ln>
+        </p:spPr>
+        <p:style>
+          <a:lnRef idx="1">
+            <a:schemeClr val="accent1"/>
+          </a:lnRef>
+          <a:fillRef idx="0">
+            <a:schemeClr val="accent1"/>
+          </a:fillRef>
+          <a:effectRef idx="0">
+            <a:schemeClr val="accent1"/>
+          </a:effectRef>
+          <a:fontRef idx="minor">
+            <a:schemeClr val="tx1"/>
+          </a:fontRef>
+        </p:style>
+      </p:cxnSp>
+      <p:cxnSp>
+        <p:nvCxnSpPr>
+          <p:cNvPr id="18" name="Straight Connector 17">
+            <a:extLst>
+              <a:ext uri="{FF2B5EF4-FFF2-40B4-BE49-F238E27FC236}">
+                <a16:creationId xmlns:a16="http://schemas.microsoft.com/office/drawing/2014/main" id="{F61253BE-7B86-044A-B087-DDFD9321A191}"/>
+              </a:ext>
+            </a:extLst>
+          </p:cNvPr>
+          <p:cNvCxnSpPr>
+            <a:cxnSpLocks/>
+          </p:cNvCxnSpPr>
+          <p:nvPr/>
+        </p:nvCxnSpPr>
+        <p:spPr>
+          <a:xfrm flipV="1">
+            <a:off x="1290420" y="3316453"/>
+            <a:ext cx="224485" cy="77095"/>
+          </a:xfrm>
+          <a:prstGeom prst="line">
+            <a:avLst/>
+          </a:prstGeom>
+          <a:ln w="28575">
+            <a:solidFill>
+              <a:schemeClr val="bg1">
+                <a:lumMod val="65000"/>
+              </a:schemeClr>
+            </a:solidFill>
+          </a:ln>
+        </p:spPr>
+        <p:style>
+          <a:lnRef idx="1">
+            <a:schemeClr val="accent1"/>
+          </a:lnRef>
+          <a:fillRef idx="0">
+            <a:schemeClr val="accent1"/>
+          </a:fillRef>
+          <a:effectRef idx="0">
+            <a:schemeClr val="accent1"/>
+          </a:effectRef>
+          <a:fontRef idx="minor">
+            <a:schemeClr val="tx1"/>
+          </a:fontRef>
+        </p:style>
+      </p:cxnSp>
+      <p:sp>
+        <p:nvSpPr>
+          <p:cNvPr id="19" name="TextBox 18">
+            <a:extLst>
+              <a:ext uri="{FF2B5EF4-FFF2-40B4-BE49-F238E27FC236}">
+                <a16:creationId xmlns:a16="http://schemas.microsoft.com/office/drawing/2014/main" id="{8AC98E81-00E1-9748-A9E9-1F3336A3ADC5}"/>
+              </a:ext>
+            </a:extLst>
+          </p:cNvPr>
+          <p:cNvSpPr txBox="1"/>
+          <p:nvPr/>
+        </p:nvSpPr>
+        <p:spPr>
+          <a:xfrm>
+            <a:off x="437521" y="3551492"/>
+            <a:ext cx="848374" cy="369332"/>
+          </a:xfrm>
+          <a:prstGeom prst="rect">
+            <a:avLst/>
+          </a:prstGeom>
+          <a:noFill/>
+        </p:spPr>
+        <p:txBody>
+          <a:bodyPr wrap="none" rtlCol="0">
+            <a:spAutoFit/>
+          </a:bodyPr>
+          <a:lstStyle/>
+          <a:p>
+            <a:r>
+              <a:rPr lang="en-US" dirty="0">
+                <a:solidFill>
+                  <a:schemeClr val="bg1">
+                    <a:lumMod val="50000"/>
+                  </a:schemeClr>
+                </a:solidFill>
+              </a:rPr>
+              <a:t>budget</a:t>
+            </a:r>
+          </a:p>
+        </p:txBody>
+      </p:sp>
+      <p:cxnSp>
+        <p:nvCxnSpPr>
+          <p:cNvPr id="20" name="Straight Connector 19">
+            <a:extLst>
+              <a:ext uri="{FF2B5EF4-FFF2-40B4-BE49-F238E27FC236}">
+                <a16:creationId xmlns:a16="http://schemas.microsoft.com/office/drawing/2014/main" id="{28D7DD50-C165-AB4D-9E48-C4FCBCDB46F6}"/>
+              </a:ext>
+            </a:extLst>
+          </p:cNvPr>
+          <p:cNvCxnSpPr>
+            <a:cxnSpLocks/>
+            <a:stCxn id="19" idx="3"/>
+          </p:cNvCxnSpPr>
+          <p:nvPr/>
+        </p:nvCxnSpPr>
+        <p:spPr>
+          <a:xfrm flipV="1">
+            <a:off x="1285895" y="3511260"/>
+            <a:ext cx="248053" cy="224898"/>
+          </a:xfrm>
+          <a:prstGeom prst="line">
+            <a:avLst/>
+          </a:prstGeom>
+          <a:ln w="28575">
+            <a:solidFill>
+              <a:schemeClr val="bg1">
+                <a:lumMod val="65000"/>
+              </a:schemeClr>
+            </a:solidFill>
+          </a:ln>
+        </p:spPr>
+        <p:style>
+          <a:lnRef idx="1">
+            <a:schemeClr val="accent1"/>
+          </a:lnRef>
+          <a:fillRef idx="0">
+            <a:schemeClr val="accent1"/>
+          </a:fillRef>
+          <a:effectRef idx="0">
+            <a:schemeClr val="accent1"/>
+          </a:effectRef>
+          <a:fontRef idx="minor">
+            <a:schemeClr val="tx1"/>
+          </a:fontRef>
+        </p:style>
+      </p:cxnSp>
+      <p:cxnSp>
+        <p:nvCxnSpPr>
+          <p:cNvPr id="21" name="Straight Connector 20">
+            <a:extLst>
+              <a:ext uri="{FF2B5EF4-FFF2-40B4-BE49-F238E27FC236}">
+                <a16:creationId xmlns:a16="http://schemas.microsoft.com/office/drawing/2014/main" id="{BD87EA8C-C232-6F40-95F5-23E1D0FD54F0}"/>
+              </a:ext>
+            </a:extLst>
+          </p:cNvPr>
+          <p:cNvCxnSpPr>
+            <a:cxnSpLocks/>
+          </p:cNvCxnSpPr>
+          <p:nvPr/>
+        </p:nvCxnSpPr>
+        <p:spPr>
+          <a:xfrm flipV="1">
+            <a:off x="8774514" y="3063714"/>
+            <a:ext cx="626144" cy="14635"/>
+          </a:xfrm>
+          <a:prstGeom prst="line">
+            <a:avLst/>
+          </a:prstGeom>
+          <a:ln w="28575">
+            <a:solidFill>
+              <a:schemeClr val="bg1">
+                <a:lumMod val="65000"/>
+              </a:schemeClr>
+            </a:solidFill>
+          </a:ln>
+        </p:spPr>
+        <p:style>
+          <a:lnRef idx="1">
+            <a:schemeClr val="accent1"/>
+          </a:lnRef>
+          <a:fillRef idx="0">
+            <a:schemeClr val="accent1"/>
+          </a:fillRef>
+          <a:effectRef idx="0">
+            <a:schemeClr val="accent1"/>
+          </a:effectRef>
+          <a:fontRef idx="minor">
+            <a:schemeClr val="tx1"/>
+          </a:fontRef>
+        </p:style>
+      </p:cxnSp>
+      <p:sp>
+        <p:nvSpPr>
+          <p:cNvPr id="22" name="TextBox 21">
+            <a:extLst>
+              <a:ext uri="{FF2B5EF4-FFF2-40B4-BE49-F238E27FC236}">
+                <a16:creationId xmlns:a16="http://schemas.microsoft.com/office/drawing/2014/main" id="{3B4DED94-D2C1-DD42-B966-DC5425BF935C}"/>
+              </a:ext>
+            </a:extLst>
+          </p:cNvPr>
+          <p:cNvSpPr txBox="1"/>
+          <p:nvPr/>
+        </p:nvSpPr>
+        <p:spPr>
+          <a:xfrm>
+            <a:off x="9400707" y="2879048"/>
+            <a:ext cx="1074653" cy="369332"/>
+          </a:xfrm>
+          <a:prstGeom prst="rect">
+            <a:avLst/>
+          </a:prstGeom>
+          <a:noFill/>
+        </p:spPr>
+        <p:txBody>
+          <a:bodyPr wrap="none" rtlCol="0">
+            <a:spAutoFit/>
+          </a:bodyPr>
+          <a:lstStyle/>
+          <a:p>
+            <a:r>
+              <a:rPr lang="en-US" dirty="0">
+                <a:solidFill>
+                  <a:schemeClr val="bg1">
+                    <a:lumMod val="50000"/>
+                  </a:schemeClr>
+                </a:solidFill>
+              </a:rPr>
+              <a:t>inventory</a:t>
+            </a:r>
+          </a:p>
+        </p:txBody>
+      </p:sp>
+      <p:sp>
+        <p:nvSpPr>
+          <p:cNvPr id="23" name="Oval 22">
+            <a:extLst>
+              <a:ext uri="{FF2B5EF4-FFF2-40B4-BE49-F238E27FC236}">
+                <a16:creationId xmlns:a16="http://schemas.microsoft.com/office/drawing/2014/main" id="{B7BA4610-BC69-B643-A080-8F7725230BB9}"/>
+              </a:ext>
+            </a:extLst>
+          </p:cNvPr>
+          <p:cNvSpPr/>
+          <p:nvPr/>
+        </p:nvSpPr>
+        <p:spPr>
+          <a:xfrm>
+            <a:off x="9485713" y="3304620"/>
+            <a:ext cx="394010" cy="270353"/>
+          </a:xfrm>
+          <a:prstGeom prst="ellipse">
+            <a:avLst/>
+          </a:prstGeom>
+          <a:noFill/>
+          <a:ln>
+            <a:solidFill>
+              <a:schemeClr val="bg1">
+                <a:lumMod val="65000"/>
+              </a:schemeClr>
+            </a:solidFill>
+          </a:ln>
+        </p:spPr>
+        <p:style>
+          <a:lnRef idx="2">
+            <a:schemeClr val="accent1">
+              <a:shade val="50000"/>
+            </a:schemeClr>
+          </a:lnRef>
+          <a:fillRef idx="1">
+            <a:schemeClr val="accent1"/>
+          </a:fillRef>
+          <a:effectRef idx="0">
+            <a:schemeClr val="accent1"/>
+          </a:effectRef>
+          <a:fontRef idx="minor">
+            <a:schemeClr val="lt1"/>
+          </a:fontRef>
+        </p:style>
+        <p:txBody>
+          <a:bodyPr rtlCol="0" anchor="ctr"/>
+          <a:lstStyle/>
+          <a:p>
+            <a:pPr algn="ctr"/>
+            <a:endParaRPr lang="en-US">
+              <a:solidFill>
+                <a:schemeClr val="bg1">
+                  <a:lumMod val="50000"/>
+                </a:schemeClr>
+              </a:solidFill>
+            </a:endParaRPr>
+          </a:p>
+        </p:txBody>
+      </p:sp>
+      <p:sp>
+        <p:nvSpPr>
+          <p:cNvPr id="24" name="Oval 23">
+            <a:extLst>
+              <a:ext uri="{FF2B5EF4-FFF2-40B4-BE49-F238E27FC236}">
+                <a16:creationId xmlns:a16="http://schemas.microsoft.com/office/drawing/2014/main" id="{65A81113-CC55-8648-90BF-96492666DF37}"/>
+              </a:ext>
+            </a:extLst>
+          </p:cNvPr>
+          <p:cNvSpPr/>
+          <p:nvPr/>
+        </p:nvSpPr>
+        <p:spPr>
+          <a:xfrm>
+            <a:off x="10861139" y="3312392"/>
+            <a:ext cx="631431" cy="270353"/>
+          </a:xfrm>
+          <a:prstGeom prst="ellipse">
+            <a:avLst/>
+          </a:prstGeom>
+          <a:noFill/>
+          <a:ln>
+            <a:solidFill>
+              <a:schemeClr val="bg1">
+                <a:lumMod val="65000"/>
+              </a:schemeClr>
+            </a:solidFill>
+          </a:ln>
+        </p:spPr>
+        <p:style>
+          <a:lnRef idx="2">
+            <a:schemeClr val="accent1">
+              <a:shade val="50000"/>
+            </a:schemeClr>
+          </a:lnRef>
+          <a:fillRef idx="1">
+            <a:schemeClr val="accent1"/>
+          </a:fillRef>
+          <a:effectRef idx="0">
+            <a:schemeClr val="accent1"/>
+          </a:effectRef>
+          <a:fontRef idx="minor">
+            <a:schemeClr val="lt1"/>
+          </a:fontRef>
+        </p:style>
+        <p:txBody>
+          <a:bodyPr rtlCol="0" anchor="ctr"/>
+          <a:lstStyle/>
+          <a:p>
+            <a:pPr algn="ctr"/>
+            <a:endParaRPr lang="en-US">
+              <a:solidFill>
+                <a:schemeClr val="bg1">
+                  <a:lumMod val="50000"/>
+                </a:schemeClr>
+              </a:solidFill>
+            </a:endParaRPr>
+          </a:p>
+        </p:txBody>
+      </p:sp>
+      <p:pic>
+        <p:nvPicPr>
+          <p:cNvPr id="25" name="Picture 24">
+            <a:extLst>
+              <a:ext uri="{FF2B5EF4-FFF2-40B4-BE49-F238E27FC236}">
+                <a16:creationId xmlns:a16="http://schemas.microsoft.com/office/drawing/2014/main" id="{08202012-358E-7E48-8477-6D8C3D0ADDD7}"/>
+              </a:ext>
+            </a:extLst>
+          </p:cNvPr>
+          <p:cNvPicPr>
+            <a:picLocks noChangeAspect="1"/>
+          </p:cNvPicPr>
+          <p:nvPr/>
+        </p:nvPicPr>
+        <p:blipFill>
+          <a:blip r:embed="rId6"/>
+          <a:stretch>
+            <a:fillRect/>
+          </a:stretch>
+        </p:blipFill>
+        <p:spPr>
+          <a:xfrm>
+            <a:off x="1514906" y="3750190"/>
+            <a:ext cx="4144530" cy="587371"/>
+          </a:xfrm>
+          <a:prstGeom prst="rect">
+            <a:avLst/>
+          </a:prstGeom>
+        </p:spPr>
+      </p:pic>
+      <p:sp>
+        <p:nvSpPr>
+          <p:cNvPr id="26" name="TextBox 25">
+            <a:extLst>
+              <a:ext uri="{FF2B5EF4-FFF2-40B4-BE49-F238E27FC236}">
+                <a16:creationId xmlns:a16="http://schemas.microsoft.com/office/drawing/2014/main" id="{997D0AB2-BF04-5E4B-A6B5-E4357705E7D5}"/>
+              </a:ext>
+            </a:extLst>
+          </p:cNvPr>
+          <p:cNvSpPr txBox="1"/>
+          <p:nvPr/>
+        </p:nvSpPr>
+        <p:spPr>
+          <a:xfrm>
+            <a:off x="295273" y="4313044"/>
+            <a:ext cx="3502845" cy="369332"/>
+          </a:xfrm>
+          <a:prstGeom prst="rect">
+            <a:avLst/>
+          </a:prstGeom>
+          <a:noFill/>
+        </p:spPr>
+        <p:txBody>
+          <a:bodyPr wrap="square" rtlCol="0">
+            <a:spAutoFit/>
+          </a:bodyPr>
+          <a:lstStyle/>
+          <a:p>
+            <a:r>
+              <a:rPr lang="en-US" dirty="0">
+                <a:solidFill>
+                  <a:schemeClr val="bg1">
+                    <a:lumMod val="50000"/>
+                  </a:schemeClr>
+                </a:solidFill>
+              </a:rPr>
+              <a:t>Upper bound varies between items</a:t>
+            </a:r>
+          </a:p>
+        </p:txBody>
+      </p:sp>
+      <p:cxnSp>
+        <p:nvCxnSpPr>
+          <p:cNvPr id="27" name="Straight Connector 26">
+            <a:extLst>
+              <a:ext uri="{FF2B5EF4-FFF2-40B4-BE49-F238E27FC236}">
+                <a16:creationId xmlns:a16="http://schemas.microsoft.com/office/drawing/2014/main" id="{5F751723-4625-0245-A214-B70241EDCBC6}"/>
+              </a:ext>
+            </a:extLst>
+          </p:cNvPr>
+          <p:cNvCxnSpPr>
+            <a:cxnSpLocks/>
+          </p:cNvCxnSpPr>
+          <p:nvPr/>
+        </p:nvCxnSpPr>
+        <p:spPr>
+          <a:xfrm>
+            <a:off x="1240974" y="4682376"/>
+            <a:ext cx="235178" cy="82201"/>
+          </a:xfrm>
+          <a:prstGeom prst="line">
+            <a:avLst/>
+          </a:prstGeom>
+          <a:ln w="28575">
+            <a:solidFill>
+              <a:schemeClr val="bg1">
+                <a:lumMod val="65000"/>
+              </a:schemeClr>
+            </a:solidFill>
+          </a:ln>
+        </p:spPr>
+        <p:style>
+          <a:lnRef idx="1">
+            <a:schemeClr val="accent1"/>
+          </a:lnRef>
+          <a:fillRef idx="0">
+            <a:schemeClr val="accent1"/>
+          </a:fillRef>
+          <a:effectRef idx="0">
+            <a:schemeClr val="accent1"/>
+          </a:effectRef>
+          <a:fontRef idx="minor">
+            <a:schemeClr val="tx1"/>
+          </a:fontRef>
+        </p:style>
+      </p:cxnSp>
+      <p:sp>
+        <p:nvSpPr>
+          <p:cNvPr id="29" name="Content Placeholder 2">
+            <a:extLst>
+              <a:ext uri="{FF2B5EF4-FFF2-40B4-BE49-F238E27FC236}">
+                <a16:creationId xmlns:a16="http://schemas.microsoft.com/office/drawing/2014/main" id="{DAE49538-0BA9-8B4E-9AA8-0256B0E08C49}"/>
+              </a:ext>
+            </a:extLst>
+          </p:cNvPr>
+          <p:cNvSpPr txBox="1">
+            <a:spLocks/>
+          </p:cNvSpPr>
+          <p:nvPr/>
+        </p:nvSpPr>
+        <p:spPr>
+          <a:xfrm>
+            <a:off x="1123273" y="6075706"/>
+            <a:ext cx="9945454" cy="1287860"/>
+          </a:xfrm>
+          <a:prstGeom prst="rect">
+            <a:avLst/>
+          </a:prstGeom>
+        </p:spPr>
+        <p:txBody>
+          <a:bodyPr vert="horz" lIns="91440" tIns="45720" rIns="91440" bIns="45720" rtlCol="0">
+            <a:normAutofit/>
+          </a:bodyPr>
+          <a:lstStyle>
+            <a:lvl1pPr marL="228600" indent="-228600" algn="l" defTabSz="914400" rtl="0" eaLnBrk="1" latinLnBrk="0" hangingPunct="1">
+              <a:lnSpc>
+                <a:spcPct val="90000"/>
+              </a:lnSpc>
+              <a:spcBef>
+                <a:spcPts val="1000"/>
+              </a:spcBef>
+              <a:buFont typeface="Arial" panose="020B0604020202020204" pitchFamily="34" charset="0"/>
+              <a:buChar char="•"/>
+              <a:defRPr sz="2800" kern="1200">
+                <a:solidFill>
+                  <a:schemeClr val="tx1"/>
+                </a:solidFill>
+                <a:latin typeface="+mn-lt"/>
+                <a:ea typeface="+mn-ea"/>
+                <a:cs typeface="+mn-cs"/>
+              </a:defRPr>
+            </a:lvl1pPr>
+            <a:lvl2pPr marL="685800" indent="-228600" algn="l" defTabSz="914400" rtl="0" eaLnBrk="1" latinLnBrk="0" hangingPunct="1">
+              <a:lnSpc>
+                <a:spcPct val="90000"/>
+              </a:lnSpc>
+              <a:spcBef>
+                <a:spcPts val="500"/>
+              </a:spcBef>
+              <a:buFont typeface="Arial" panose="020B0604020202020204" pitchFamily="34" charset="0"/>
+              <a:buChar char="•"/>
+              <a:defRPr sz="2400" kern="1200">
+                <a:solidFill>
+                  <a:schemeClr val="tx1"/>
+                </a:solidFill>
+                <a:latin typeface="+mn-lt"/>
+                <a:ea typeface="+mn-ea"/>
+                <a:cs typeface="+mn-cs"/>
+              </a:defRPr>
+            </a:lvl2pPr>
+            <a:lvl3pPr marL="1143000" indent="-228600" algn="l" defTabSz="914400" rtl="0" eaLnBrk="1" latinLnBrk="0" hangingPunct="1">
+              <a:lnSpc>
+                <a:spcPct val="90000"/>
+              </a:lnSpc>
+              <a:spcBef>
+                <a:spcPts val="500"/>
+              </a:spcBef>
+              <a:buFont typeface="Arial" panose="020B0604020202020204" pitchFamily="34" charset="0"/>
+              <a:buChar char="•"/>
+              <a:defRPr sz="2000" kern="1200">
+                <a:solidFill>
+                  <a:schemeClr val="tx1"/>
+                </a:solidFill>
+                <a:latin typeface="+mn-lt"/>
+                <a:ea typeface="+mn-ea"/>
+                <a:cs typeface="+mn-cs"/>
+              </a:defRPr>
+            </a:lvl3pPr>
+            <a:lvl4pPr marL="1600200" indent="-228600" algn="l" defTabSz="914400" rtl="0" eaLnBrk="1" latinLnBrk="0" hangingPunct="1">
+              <a:lnSpc>
+                <a:spcPct val="90000"/>
+              </a:lnSpc>
+              <a:spcBef>
+                <a:spcPts val="500"/>
+              </a:spcBef>
+              <a:buFont typeface="Arial" panose="020B0604020202020204" pitchFamily="34" charset="0"/>
+              <a:buChar char="•"/>
+              <a:defRPr sz="1800" kern="1200">
+                <a:solidFill>
+                  <a:schemeClr val="tx1"/>
+                </a:solidFill>
+                <a:latin typeface="+mn-lt"/>
+                <a:ea typeface="+mn-ea"/>
+                <a:cs typeface="+mn-cs"/>
+              </a:defRPr>
+            </a:lvl4pPr>
+            <a:lvl5pPr marL="2057400" indent="-228600" algn="l" defTabSz="914400" rtl="0" eaLnBrk="1" latinLnBrk="0" hangingPunct="1">
+              <a:lnSpc>
+                <a:spcPct val="90000"/>
+              </a:lnSpc>
+              <a:spcBef>
+                <a:spcPts val="500"/>
+              </a:spcBef>
+              <a:buFont typeface="Arial" panose="020B0604020202020204" pitchFamily="34" charset="0"/>
+              <a:buChar char="•"/>
+              <a:defRPr sz="1800" kern="1200">
+                <a:solidFill>
+                  <a:schemeClr val="tx1"/>
+                </a:solidFill>
+                <a:latin typeface="+mn-lt"/>
+                <a:ea typeface="+mn-ea"/>
+                <a:cs typeface="+mn-cs"/>
+              </a:defRPr>
+            </a:lvl5pPr>
+            <a:lvl6pPr marL="2514600" indent="-228600" algn="l" defTabSz="914400" rtl="0" eaLnBrk="1" latinLnBrk="0" hangingPunct="1">
+              <a:lnSpc>
+                <a:spcPct val="90000"/>
+              </a:lnSpc>
+              <a:spcBef>
+                <a:spcPts val="500"/>
+              </a:spcBef>
+              <a:buFont typeface="Arial" panose="020B0604020202020204" pitchFamily="34" charset="0"/>
+              <a:buChar char="•"/>
+              <a:defRPr sz="1800" kern="1200">
+                <a:solidFill>
+                  <a:schemeClr val="tx1"/>
+                </a:solidFill>
+                <a:latin typeface="+mn-lt"/>
+                <a:ea typeface="+mn-ea"/>
+                <a:cs typeface="+mn-cs"/>
+              </a:defRPr>
+            </a:lvl6pPr>
+            <a:lvl7pPr marL="2971800" indent="-228600" algn="l" defTabSz="914400" rtl="0" eaLnBrk="1" latinLnBrk="0" hangingPunct="1">
+              <a:lnSpc>
+                <a:spcPct val="90000"/>
+              </a:lnSpc>
+              <a:spcBef>
+                <a:spcPts val="500"/>
+              </a:spcBef>
+              <a:buFont typeface="Arial" panose="020B0604020202020204" pitchFamily="34" charset="0"/>
+              <a:buChar char="•"/>
+              <a:defRPr sz="1800" kern="1200">
+                <a:solidFill>
+                  <a:schemeClr val="tx1"/>
+                </a:solidFill>
+                <a:latin typeface="+mn-lt"/>
+                <a:ea typeface="+mn-ea"/>
+                <a:cs typeface="+mn-cs"/>
+              </a:defRPr>
+            </a:lvl7pPr>
+            <a:lvl8pPr marL="3429000" indent="-228600" algn="l" defTabSz="914400" rtl="0" eaLnBrk="1" latinLnBrk="0" hangingPunct="1">
+              <a:lnSpc>
+                <a:spcPct val="90000"/>
+              </a:lnSpc>
+              <a:spcBef>
+                <a:spcPts val="500"/>
+              </a:spcBef>
+              <a:buFont typeface="Arial" panose="020B0604020202020204" pitchFamily="34" charset="0"/>
+              <a:buChar char="•"/>
+              <a:defRPr sz="1800" kern="1200">
+                <a:solidFill>
+                  <a:schemeClr val="tx1"/>
+                </a:solidFill>
+                <a:latin typeface="+mn-lt"/>
+                <a:ea typeface="+mn-ea"/>
+                <a:cs typeface="+mn-cs"/>
+              </a:defRPr>
+            </a:lvl8pPr>
+            <a:lvl9pPr marL="3886200" indent="-228600" algn="l" defTabSz="914400" rtl="0" eaLnBrk="1" latinLnBrk="0" hangingPunct="1">
+              <a:lnSpc>
+                <a:spcPct val="90000"/>
+              </a:lnSpc>
+              <a:spcBef>
+                <a:spcPts val="500"/>
+              </a:spcBef>
+              <a:buFont typeface="Arial" panose="020B0604020202020204" pitchFamily="34" charset="0"/>
+              <a:buChar char="•"/>
+              <a:defRPr sz="1800" kern="1200">
+                <a:solidFill>
+                  <a:schemeClr val="tx1"/>
+                </a:solidFill>
+                <a:latin typeface="+mn-lt"/>
+                <a:ea typeface="+mn-ea"/>
+                <a:cs typeface="+mn-cs"/>
+              </a:defRPr>
+            </a:lvl9pPr>
+          </a:lstStyle>
+          <a:p>
+            <a:pPr>
+              <a:lnSpc>
+                <a:spcPct val="100000"/>
+              </a:lnSpc>
+            </a:pPr>
+            <a:r>
+              <a:rPr lang="en-US" sz="1800" dirty="0"/>
+              <a:t>In the real world, these two goals cannot be satisfied simultaneously. We built a combined QUBO to solve optimization dilemma and use different penalty coefficients to prioritize objectives.</a:t>
+            </a:r>
           </a:p>
         </p:txBody>
       </p:sp>
     </p:spTree>
     <p:extLst>
       <p:ext uri="{BB962C8B-B14F-4D97-AF65-F5344CB8AC3E}">
-        <p14:creationId xmlns:p14="http://schemas.microsoft.com/office/powerpoint/2010/main" val="3183133460"/>
+        <p14:creationId xmlns:p14="http://schemas.microsoft.com/office/powerpoint/2010/main" val="1121094365"/>
       </p:ext>
     </p:extLst>
   </p:cSld>
@@ -4483,38 +6235,776 @@
       </p:grpSpPr>
       <p:sp>
         <p:nvSpPr>
-          <p:cNvPr id="2" name="Title 1">
-            <a:extLst>
-              <a:ext uri="{FF2B5EF4-FFF2-40B4-BE49-F238E27FC236}">
-                <a16:creationId xmlns:a16="http://schemas.microsoft.com/office/drawing/2014/main" id="{B4DEFB80-6FDC-49B1-867D-DFEC75A5A963}"/>
-              </a:ext>
-            </a:extLst>
-          </p:cNvPr>
-          <p:cNvSpPr>
+          <p:cNvPr id="114" name="Title 1"/>
+          <p:cNvSpPr txBox="1">
             <a:spLocks noGrp="1"/>
           </p:cNvSpPr>
           <p:nvPr>
             <p:ph type="title"/>
           </p:nvPr>
         </p:nvSpPr>
-        <p:spPr/>
+        <p:spPr>
+          <a:xfrm>
+            <a:off x="838200" y="365125"/>
+            <a:ext cx="10515600" cy="1325563"/>
+          </a:xfrm>
+          <a:prstGeom prst="rect">
+            <a:avLst/>
+          </a:prstGeom>
+        </p:spPr>
         <p:txBody>
           <a:bodyPr/>
           <a:lstStyle/>
           <a:p>
             <a:r>
+              <a:t>Data and Results</a:t>
+            </a:r>
+          </a:p>
+        </p:txBody>
+      </p:sp>
+      <p:pic>
+        <p:nvPicPr>
+          <p:cNvPr id="115" name="Screen Shot 2021-07-28 at 8.41.20 AM.png" descr="Screen Shot 2021-07-28 at 8.41.20 AM.png"/>
+          <p:cNvPicPr>
+            <a:picLocks noChangeAspect="1"/>
+          </p:cNvPicPr>
+          <p:nvPr/>
+        </p:nvPicPr>
+        <p:blipFill>
+          <a:blip r:embed="rId2"/>
+          <a:stretch>
+            <a:fillRect/>
+          </a:stretch>
+        </p:blipFill>
+        <p:spPr>
+          <a:xfrm>
+            <a:off x="538959" y="4764809"/>
+            <a:ext cx="5557041" cy="1498601"/>
+          </a:xfrm>
+          <a:prstGeom prst="rect">
+            <a:avLst/>
+          </a:prstGeom>
+          <a:ln w="12700">
+            <a:miter lim="400000"/>
+          </a:ln>
+        </p:spPr>
+      </p:pic>
+      <p:pic>
+        <p:nvPicPr>
+          <p:cNvPr id="116" name="Screen Shot 2021-07-28 at 8.43.24 AM.png" descr="Screen Shot 2021-07-28 at 8.43.24 AM.png"/>
+          <p:cNvPicPr>
+            <a:picLocks noChangeAspect="1"/>
+          </p:cNvPicPr>
+          <p:nvPr/>
+        </p:nvPicPr>
+        <p:blipFill>
+          <a:blip r:embed="rId3"/>
+          <a:stretch>
+            <a:fillRect/>
+          </a:stretch>
+        </p:blipFill>
+        <p:spPr>
+          <a:xfrm>
+            <a:off x="538959" y="2074219"/>
+            <a:ext cx="4359933" cy="1276258"/>
+          </a:xfrm>
+          <a:prstGeom prst="rect">
+            <a:avLst/>
+          </a:prstGeom>
+          <a:ln w="12700">
+            <a:miter lim="400000"/>
+          </a:ln>
+        </p:spPr>
+      </p:pic>
+      <p:pic>
+        <p:nvPicPr>
+          <p:cNvPr id="117" name="Screen Shot 2021-07-28 at 8.45.14 AM.png" descr="Screen Shot 2021-07-28 at 8.45.14 AM.png"/>
+          <p:cNvPicPr>
+            <a:picLocks noChangeAspect="1"/>
+          </p:cNvPicPr>
+          <p:nvPr/>
+        </p:nvPicPr>
+        <p:blipFill>
+          <a:blip r:embed="rId4"/>
+          <a:stretch>
+            <a:fillRect/>
+          </a:stretch>
+        </p:blipFill>
+        <p:spPr>
+          <a:xfrm>
+            <a:off x="7128670" y="2074219"/>
+            <a:ext cx="3869288" cy="738032"/>
+          </a:xfrm>
+          <a:prstGeom prst="rect">
+            <a:avLst/>
+          </a:prstGeom>
+          <a:ln w="12700">
+            <a:miter lim="400000"/>
+          </a:ln>
+        </p:spPr>
+      </p:pic>
+      <p:pic>
+        <p:nvPicPr>
+          <p:cNvPr id="118" name="Screen Shot 2021-07-28 at 8.45.23 AM.png" descr="Screen Shot 2021-07-28 at 8.45.23 AM.png"/>
+          <p:cNvPicPr>
+            <a:picLocks noChangeAspect="1"/>
+          </p:cNvPicPr>
+          <p:nvPr/>
+        </p:nvPicPr>
+        <p:blipFill>
+          <a:blip r:embed="rId5"/>
+          <a:stretch>
+            <a:fillRect/>
+          </a:stretch>
+        </p:blipFill>
+        <p:spPr>
+          <a:xfrm>
+            <a:off x="7119505" y="4776077"/>
+            <a:ext cx="4234295" cy="738032"/>
+          </a:xfrm>
+          <a:prstGeom prst="rect">
+            <a:avLst/>
+          </a:prstGeom>
+          <a:ln w="12700">
+            <a:miter lim="400000"/>
+          </a:ln>
+        </p:spPr>
+      </p:pic>
+      <p:sp>
+        <p:nvSpPr>
+          <p:cNvPr id="119" name="Profit Optimizer"/>
+          <p:cNvSpPr txBox="1"/>
+          <p:nvPr/>
+        </p:nvSpPr>
+        <p:spPr>
+          <a:xfrm>
+            <a:off x="641930" y="4444442"/>
+            <a:ext cx="3919436" cy="369332"/>
+          </a:xfrm>
+          <a:prstGeom prst="rect">
+            <a:avLst/>
+          </a:prstGeom>
+          <a:ln w="12700">
+            <a:miter lim="400000"/>
+          </a:ln>
+          <a:extLst>
+            <a:ext uri="{C572A759-6A51-4108-AA02-DFA0A04FC94B}">
+              <ma14:wrappingTextBoxFlag xmlns:ma14="http://schemas.microsoft.com/office/mac/drawingml/2011/main" xmlns:a14="http://schemas.microsoft.com/office/drawing/2010/main" xmlns:m="http://schemas.openxmlformats.org/officeDocument/2006/math" xmlns="" val="1"/>
+            </a:ext>
+          </a:extLst>
+        </p:spPr>
+        <p:txBody>
+          <a:bodyPr wrap="square" lIns="45719" rIns="45719">
+            <a:spAutoFit/>
+          </a:bodyPr>
+          <a:lstStyle/>
+          <a:p>
+            <a:r>
+              <a:rPr dirty="0"/>
+              <a:t>Profit </a:t>
+            </a:r>
+            <a:r>
               <a:rPr lang="en-US" dirty="0"/>
-              <a:t>Observations and Lessons Learned</a:t>
-            </a:r>
-          </a:p>
-        </p:txBody>
-      </p:sp>
-      <p:sp>
-        <p:nvSpPr>
-          <p:cNvPr id="3" name="Content Placeholder 2">
-            <a:extLst>
-              <a:ext uri="{FF2B5EF4-FFF2-40B4-BE49-F238E27FC236}">
-                <a16:creationId xmlns:a16="http://schemas.microsoft.com/office/drawing/2014/main" id="{97388C2B-7AED-46B7-92CE-EB873D293EBF}"/>
+              <a:t>Maximization on Inventory</a:t>
+            </a:r>
+            <a:endParaRPr dirty="0"/>
+          </a:p>
+        </p:txBody>
+      </p:sp>
+      <p:sp>
+        <p:nvSpPr>
+          <p:cNvPr id="120" name="Inventory Optimizer"/>
+          <p:cNvSpPr txBox="1"/>
+          <p:nvPr/>
+        </p:nvSpPr>
+        <p:spPr>
+          <a:xfrm>
+            <a:off x="538959" y="1641723"/>
+            <a:ext cx="2744367" cy="369332"/>
+          </a:xfrm>
+          <a:prstGeom prst="rect">
+            <a:avLst/>
+          </a:prstGeom>
+          <a:ln w="12700">
+            <a:miter lim="400000"/>
+          </a:ln>
+          <a:extLst>
+            <a:ext uri="{C572A759-6A51-4108-AA02-DFA0A04FC94B}">
+              <ma14:wrappingTextBoxFlag xmlns:ma14="http://schemas.microsoft.com/office/mac/drawingml/2011/main" xmlns:a14="http://schemas.microsoft.com/office/drawing/2010/main" xmlns:m="http://schemas.openxmlformats.org/officeDocument/2006/math" xmlns="" val="1"/>
+            </a:ext>
+          </a:extLst>
+        </p:spPr>
+        <p:txBody>
+          <a:bodyPr lIns="45719" rIns="45719">
+            <a:spAutoFit/>
+          </a:bodyPr>
+          <a:lstStyle/>
+          <a:p>
+            <a:r>
+              <a:rPr lang="en-US" dirty="0"/>
+              <a:t>Supplier Pre-Selection</a:t>
+            </a:r>
+            <a:endParaRPr dirty="0"/>
+          </a:p>
+        </p:txBody>
+      </p:sp>
+      <p:sp>
+        <p:nvSpPr>
+          <p:cNvPr id="121" name="QUBO Chain"/>
+          <p:cNvSpPr txBox="1"/>
+          <p:nvPr/>
+        </p:nvSpPr>
+        <p:spPr>
+          <a:xfrm>
+            <a:off x="8582780" y="3559083"/>
+            <a:ext cx="1266815" cy="646331"/>
+          </a:xfrm>
+          <a:prstGeom prst="rect">
+            <a:avLst/>
+          </a:prstGeom>
+          <a:ln w="12700">
+            <a:miter lim="400000"/>
+          </a:ln>
+          <a:extLst>
+            <a:ext uri="{C572A759-6A51-4108-AA02-DFA0A04FC94B}">
+              <ma14:wrappingTextBoxFlag xmlns:ma14="http://schemas.microsoft.com/office/mac/drawingml/2011/main" xmlns:a14="http://schemas.microsoft.com/office/drawing/2010/main" xmlns:m="http://schemas.openxmlformats.org/officeDocument/2006/math" xmlns="" val="1"/>
+            </a:ext>
+          </a:extLst>
+        </p:spPr>
+        <p:txBody>
+          <a:bodyPr wrap="square" lIns="45719" rIns="45719">
+            <a:spAutoFit/>
+          </a:bodyPr>
+          <a:lstStyle/>
+          <a:p>
+            <a:pPr algn="ctr"/>
+            <a:r>
+              <a:rPr lang="en-US" dirty="0"/>
+              <a:t>CORE™</a:t>
+            </a:r>
+          </a:p>
+          <a:p>
+            <a:pPr algn="ctr"/>
+            <a:r>
+              <a:rPr dirty="0"/>
+              <a:t>QUBO Chain</a:t>
+            </a:r>
+          </a:p>
+        </p:txBody>
+      </p:sp>
+      <p:sp>
+        <p:nvSpPr>
+          <p:cNvPr id="3" name="Arrow: Right 2">
+            <a:extLst>
+              <a:ext uri="{FF2B5EF4-FFF2-40B4-BE49-F238E27FC236}">
+                <a16:creationId xmlns:a16="http://schemas.microsoft.com/office/drawing/2014/main" id="{C59A9298-C7EA-4F0E-9C18-310B8A642A46}"/>
+              </a:ext>
+            </a:extLst>
+          </p:cNvPr>
+          <p:cNvSpPr/>
+          <p:nvPr/>
+        </p:nvSpPr>
+        <p:spPr>
+          <a:xfrm rot="5400000">
+            <a:off x="8215427" y="2789538"/>
+            <a:ext cx="2001523" cy="2064549"/>
+          </a:xfrm>
+          <a:prstGeom prst="rightArrow">
+            <a:avLst/>
+          </a:prstGeom>
+          <a:solidFill>
+            <a:srgbClr val="4472C4">
+              <a:alpha val="34902"/>
+            </a:srgbClr>
+          </a:solidFill>
+        </p:spPr>
+        <p:style>
+          <a:lnRef idx="2">
+            <a:schemeClr val="accent1">
+              <a:shade val="50000"/>
+            </a:schemeClr>
+          </a:lnRef>
+          <a:fillRef idx="1">
+            <a:schemeClr val="accent1"/>
+          </a:fillRef>
+          <a:effectRef idx="0">
+            <a:schemeClr val="accent1"/>
+          </a:effectRef>
+          <a:fontRef idx="minor">
+            <a:schemeClr val="lt1"/>
+          </a:fontRef>
+        </p:style>
+        <p:txBody>
+          <a:bodyPr rtlCol="0" anchor="ctr"/>
+          <a:lstStyle/>
+          <a:p>
+            <a:pPr algn="ctr"/>
+            <a:endParaRPr lang="en-US" dirty="0"/>
+          </a:p>
+        </p:txBody>
+      </p:sp>
+      <p:sp>
+        <p:nvSpPr>
+          <p:cNvPr id="16" name="Flowchart: Alternate Process 3">
+            <a:extLst>
+              <a:ext uri="{FF2B5EF4-FFF2-40B4-BE49-F238E27FC236}">
+                <a16:creationId xmlns:a16="http://schemas.microsoft.com/office/drawing/2014/main" id="{871E5C1B-7CF8-45AD-98DF-1E060B4A34B1}"/>
+              </a:ext>
+            </a:extLst>
+          </p:cNvPr>
+          <p:cNvSpPr/>
+          <p:nvPr/>
+        </p:nvSpPr>
+        <p:spPr>
+          <a:xfrm>
+            <a:off x="6669503" y="289295"/>
+            <a:ext cx="1187118" cy="689813"/>
+          </a:xfrm>
+          <a:custGeom>
+            <a:avLst/>
+            <a:gdLst/>
+            <a:ahLst/>
+            <a:cxnLst>
+              <a:cxn ang="0">
+                <a:pos x="wd2" y="hd2"/>
+              </a:cxn>
+              <a:cxn ang="5400000">
+                <a:pos x="wd2" y="hd2"/>
+              </a:cxn>
+              <a:cxn ang="10800000">
+                <a:pos x="wd2" y="hd2"/>
+              </a:cxn>
+              <a:cxn ang="16200000">
+                <a:pos x="wd2" y="hd2"/>
+              </a:cxn>
+            </a:cxnLst>
+            <a:rect l="0" t="0" r="r" b="b"/>
+            <a:pathLst>
+              <a:path w="21600" h="21600" extrusionOk="0">
+                <a:moveTo>
+                  <a:pt x="0" y="3600"/>
+                </a:moveTo>
+                <a:cubicBezTo>
+                  <a:pt x="0" y="1612"/>
+                  <a:pt x="937" y="0"/>
+                  <a:pt x="2092" y="0"/>
+                </a:cubicBezTo>
+                <a:lnTo>
+                  <a:pt x="19508" y="0"/>
+                </a:lnTo>
+                <a:cubicBezTo>
+                  <a:pt x="20663" y="0"/>
+                  <a:pt x="21600" y="1612"/>
+                  <a:pt x="21600" y="3600"/>
+                </a:cubicBezTo>
+                <a:lnTo>
+                  <a:pt x="21600" y="18000"/>
+                </a:lnTo>
+                <a:cubicBezTo>
+                  <a:pt x="21600" y="19988"/>
+                  <a:pt x="20663" y="21600"/>
+                  <a:pt x="19508" y="21600"/>
+                </a:cubicBezTo>
+                <a:lnTo>
+                  <a:pt x="2092" y="21600"/>
+                </a:lnTo>
+                <a:cubicBezTo>
+                  <a:pt x="937" y="21600"/>
+                  <a:pt x="0" y="19988"/>
+                  <a:pt x="0" y="18000"/>
+                </a:cubicBezTo>
+                <a:close/>
+              </a:path>
+            </a:pathLst>
+          </a:custGeom>
+          <a:solidFill>
+            <a:srgbClr val="FFFFFF"/>
+          </a:solidFill>
+          <a:ln w="12700">
+            <a:solidFill>
+              <a:srgbClr val="000000"/>
+            </a:solidFill>
+            <a:miter/>
+          </a:ln>
+          <a:effectLst>
+            <a:reflection stA="52000" endPos="40000" dir="5400000" sy="-100000" algn="bl" rotWithShape="0"/>
+          </a:effectLst>
+        </p:spPr>
+        <p:txBody>
+          <a:bodyPr lIns="45719" rIns="45719" anchor="ctr"/>
+          <a:lstStyle/>
+          <a:p>
+            <a:pPr algn="ctr"/>
+            <a:endParaRPr/>
+          </a:p>
+        </p:txBody>
+      </p:sp>
+      <p:sp>
+        <p:nvSpPr>
+          <p:cNvPr id="17" name="Straight Arrow Connector 5">
+            <a:extLst>
+              <a:ext uri="{FF2B5EF4-FFF2-40B4-BE49-F238E27FC236}">
+                <a16:creationId xmlns:a16="http://schemas.microsoft.com/office/drawing/2014/main" id="{026D07F1-6D3D-4C51-BA65-ECAD14BF5F14}"/>
+              </a:ext>
+            </a:extLst>
+          </p:cNvPr>
+          <p:cNvSpPr/>
+          <p:nvPr/>
+        </p:nvSpPr>
+        <p:spPr>
+          <a:xfrm>
+            <a:off x="7856618" y="618159"/>
+            <a:ext cx="561475" cy="1"/>
+          </a:xfrm>
+          <a:prstGeom prst="line">
+            <a:avLst/>
+          </a:prstGeom>
+          <a:ln w="6350">
+            <a:solidFill>
+              <a:srgbClr val="000000"/>
+            </a:solidFill>
+            <a:miter/>
+            <a:tailEnd type="triangle"/>
+          </a:ln>
+        </p:spPr>
+        <p:txBody>
+          <a:bodyPr lIns="45719" rIns="45719"/>
+          <a:lstStyle/>
+          <a:p>
+            <a:endParaRPr/>
+          </a:p>
+        </p:txBody>
+      </p:sp>
+      <p:sp>
+        <p:nvSpPr>
+          <p:cNvPr id="18" name="Flowchart: Alternate Process 6">
+            <a:extLst>
+              <a:ext uri="{FF2B5EF4-FFF2-40B4-BE49-F238E27FC236}">
+                <a16:creationId xmlns:a16="http://schemas.microsoft.com/office/drawing/2014/main" id="{3E15E10E-DA1F-4120-A1E8-0FF7D0C88BD7}"/>
+              </a:ext>
+            </a:extLst>
+          </p:cNvPr>
+          <p:cNvSpPr/>
+          <p:nvPr/>
+        </p:nvSpPr>
+        <p:spPr>
+          <a:xfrm>
+            <a:off x="8418092" y="289295"/>
+            <a:ext cx="1187119" cy="689813"/>
+          </a:xfrm>
+          <a:custGeom>
+            <a:avLst/>
+            <a:gdLst/>
+            <a:ahLst/>
+            <a:cxnLst>
+              <a:cxn ang="0">
+                <a:pos x="wd2" y="hd2"/>
+              </a:cxn>
+              <a:cxn ang="5400000">
+                <a:pos x="wd2" y="hd2"/>
+              </a:cxn>
+              <a:cxn ang="10800000">
+                <a:pos x="wd2" y="hd2"/>
+              </a:cxn>
+              <a:cxn ang="16200000">
+                <a:pos x="wd2" y="hd2"/>
+              </a:cxn>
+            </a:cxnLst>
+            <a:rect l="0" t="0" r="r" b="b"/>
+            <a:pathLst>
+              <a:path w="21600" h="21600" extrusionOk="0">
+                <a:moveTo>
+                  <a:pt x="0" y="3600"/>
+                </a:moveTo>
+                <a:cubicBezTo>
+                  <a:pt x="0" y="1612"/>
+                  <a:pt x="937" y="0"/>
+                  <a:pt x="2092" y="0"/>
+                </a:cubicBezTo>
+                <a:lnTo>
+                  <a:pt x="19508" y="0"/>
+                </a:lnTo>
+                <a:cubicBezTo>
+                  <a:pt x="20663" y="0"/>
+                  <a:pt x="21600" y="1612"/>
+                  <a:pt x="21600" y="3600"/>
+                </a:cubicBezTo>
+                <a:lnTo>
+                  <a:pt x="21600" y="18000"/>
+                </a:lnTo>
+                <a:cubicBezTo>
+                  <a:pt x="21600" y="19988"/>
+                  <a:pt x="20663" y="21600"/>
+                  <a:pt x="19508" y="21600"/>
+                </a:cubicBezTo>
+                <a:lnTo>
+                  <a:pt x="2092" y="21600"/>
+                </a:lnTo>
+                <a:cubicBezTo>
+                  <a:pt x="937" y="21600"/>
+                  <a:pt x="0" y="19988"/>
+                  <a:pt x="0" y="18000"/>
+                </a:cubicBezTo>
+                <a:close/>
+              </a:path>
+            </a:pathLst>
+          </a:custGeom>
+          <a:solidFill>
+            <a:srgbClr val="FFFFFF"/>
+          </a:solidFill>
+          <a:ln w="12700">
+            <a:solidFill>
+              <a:srgbClr val="000000"/>
+            </a:solidFill>
+            <a:miter/>
+          </a:ln>
+          <a:effectLst>
+            <a:reflection stA="52000" endPos="40000" dir="5400000" sy="-100000" algn="bl" rotWithShape="0"/>
+          </a:effectLst>
+        </p:spPr>
+        <p:txBody>
+          <a:bodyPr lIns="45719" rIns="45719" anchor="ctr"/>
+          <a:lstStyle/>
+          <a:p>
+            <a:pPr algn="ctr"/>
+            <a:endParaRPr/>
+          </a:p>
+        </p:txBody>
+      </p:sp>
+      <p:sp>
+        <p:nvSpPr>
+          <p:cNvPr id="19" name="Straight Arrow Connector 7">
+            <a:extLst>
+              <a:ext uri="{FF2B5EF4-FFF2-40B4-BE49-F238E27FC236}">
+                <a16:creationId xmlns:a16="http://schemas.microsoft.com/office/drawing/2014/main" id="{753286B4-5E09-49E2-B4EF-E8FBAB2022A1}"/>
+              </a:ext>
+            </a:extLst>
+          </p:cNvPr>
+          <p:cNvSpPr/>
+          <p:nvPr/>
+        </p:nvSpPr>
+        <p:spPr>
+          <a:xfrm>
+            <a:off x="9605209" y="618159"/>
+            <a:ext cx="561475" cy="1"/>
+          </a:xfrm>
+          <a:prstGeom prst="line">
+            <a:avLst/>
+          </a:prstGeom>
+          <a:ln w="6350">
+            <a:solidFill>
+              <a:srgbClr val="000000"/>
+            </a:solidFill>
+            <a:miter/>
+            <a:tailEnd type="triangle"/>
+          </a:ln>
+        </p:spPr>
+        <p:txBody>
+          <a:bodyPr lIns="45719" rIns="45719"/>
+          <a:lstStyle/>
+          <a:p>
+            <a:endParaRPr/>
+          </a:p>
+        </p:txBody>
+      </p:sp>
+      <p:sp>
+        <p:nvSpPr>
+          <p:cNvPr id="20" name="Flowchart: Alternate Process 8">
+            <a:extLst>
+              <a:ext uri="{FF2B5EF4-FFF2-40B4-BE49-F238E27FC236}">
+                <a16:creationId xmlns:a16="http://schemas.microsoft.com/office/drawing/2014/main" id="{C5F1DC02-181A-45C3-9897-93BC2DA21FCF}"/>
+              </a:ext>
+            </a:extLst>
+          </p:cNvPr>
+          <p:cNvSpPr/>
+          <p:nvPr/>
+        </p:nvSpPr>
+        <p:spPr>
+          <a:xfrm>
+            <a:off x="10166682" y="287873"/>
+            <a:ext cx="1187118" cy="689813"/>
+          </a:xfrm>
+          <a:custGeom>
+            <a:avLst/>
+            <a:gdLst/>
+            <a:ahLst/>
+            <a:cxnLst>
+              <a:cxn ang="0">
+                <a:pos x="wd2" y="hd2"/>
+              </a:cxn>
+              <a:cxn ang="5400000">
+                <a:pos x="wd2" y="hd2"/>
+              </a:cxn>
+              <a:cxn ang="10800000">
+                <a:pos x="wd2" y="hd2"/>
+              </a:cxn>
+              <a:cxn ang="16200000">
+                <a:pos x="wd2" y="hd2"/>
+              </a:cxn>
+            </a:cxnLst>
+            <a:rect l="0" t="0" r="r" b="b"/>
+            <a:pathLst>
+              <a:path w="21600" h="21600" extrusionOk="0">
+                <a:moveTo>
+                  <a:pt x="0" y="3600"/>
+                </a:moveTo>
+                <a:cubicBezTo>
+                  <a:pt x="0" y="1612"/>
+                  <a:pt x="937" y="0"/>
+                  <a:pt x="2092" y="0"/>
+                </a:cubicBezTo>
+                <a:lnTo>
+                  <a:pt x="19508" y="0"/>
+                </a:lnTo>
+                <a:cubicBezTo>
+                  <a:pt x="20663" y="0"/>
+                  <a:pt x="21600" y="1612"/>
+                  <a:pt x="21600" y="3600"/>
+                </a:cubicBezTo>
+                <a:lnTo>
+                  <a:pt x="21600" y="18000"/>
+                </a:lnTo>
+                <a:cubicBezTo>
+                  <a:pt x="21600" y="19988"/>
+                  <a:pt x="20663" y="21600"/>
+                  <a:pt x="19508" y="21600"/>
+                </a:cubicBezTo>
+                <a:lnTo>
+                  <a:pt x="2092" y="21600"/>
+                </a:lnTo>
+                <a:cubicBezTo>
+                  <a:pt x="937" y="21600"/>
+                  <a:pt x="0" y="19988"/>
+                  <a:pt x="0" y="18000"/>
+                </a:cubicBezTo>
+                <a:close/>
+              </a:path>
+            </a:pathLst>
+          </a:custGeom>
+          <a:solidFill>
+            <a:srgbClr val="FFFFFF"/>
+          </a:solidFill>
+          <a:ln w="12700">
+            <a:solidFill>
+              <a:srgbClr val="000000"/>
+            </a:solidFill>
+            <a:miter/>
+          </a:ln>
+          <a:effectLst>
+            <a:reflection stA="52000" endPos="40000" dir="5400000" sy="-100000" algn="bl" rotWithShape="0"/>
+          </a:effectLst>
+        </p:spPr>
+        <p:txBody>
+          <a:bodyPr lIns="45719" rIns="45719" anchor="ctr"/>
+          <a:lstStyle/>
+          <a:p>
+            <a:pPr algn="ctr"/>
+            <a:endParaRPr/>
+          </a:p>
+        </p:txBody>
+      </p:sp>
+    </p:spTree>
+  </p:cSld>
+  <p:clrMapOvr>
+    <a:masterClrMapping/>
+  </p:clrMapOvr>
+</p:sld>
+</file>
+
+<file path=ppt/slides/slide5.xml><?xml version="1.0" encoding="utf-8"?>
+<p:sld xmlns:a="http://schemas.openxmlformats.org/drawingml/2006/main" xmlns:r="http://schemas.openxmlformats.org/officeDocument/2006/relationships" xmlns:p="http://schemas.openxmlformats.org/presentationml/2006/main">
+  <p:cSld>
+    <p:spTree>
+      <p:nvGrpSpPr>
+        <p:cNvPr id="1" name=""/>
+        <p:cNvGrpSpPr/>
+        <p:nvPr/>
+      </p:nvGrpSpPr>
+      <p:grpSpPr>
+        <a:xfrm>
+          <a:off x="0" y="0"/>
+          <a:ext cx="0" cy="0"/>
+          <a:chOff x="0" y="0"/>
+          <a:chExt cx="0" cy="0"/>
+        </a:xfrm>
+      </p:grpSpPr>
+      <p:pic>
+        <p:nvPicPr>
+          <p:cNvPr id="5" name="Picture 4" descr="A picture containing shape&#10;&#10;Description automatically generated">
+            <a:extLst>
+              <a:ext uri="{FF2B5EF4-FFF2-40B4-BE49-F238E27FC236}">
+                <a16:creationId xmlns:a16="http://schemas.microsoft.com/office/drawing/2014/main" id="{E0C4BE79-B6A9-45C4-9101-F8CF10428C1B}"/>
+              </a:ext>
+            </a:extLst>
+          </p:cNvPr>
+          <p:cNvPicPr>
+            <a:picLocks noChangeAspect="1"/>
+          </p:cNvPicPr>
+          <p:nvPr/>
+        </p:nvPicPr>
+        <p:blipFill rotWithShape="1">
+          <a:blip r:embed="rId2">
+            <a:extLst>
+              <a:ext uri="{28A0092B-C50C-407E-A947-70E740481C1C}">
+                <a14:useLocalDpi xmlns:a14="http://schemas.microsoft.com/office/drawing/2010/main" val="0"/>
+              </a:ext>
+            </a:extLst>
+          </a:blip>
+          <a:srcRect t="20054" r="8138" b="7270"/>
+          <a:stretch/>
+        </p:blipFill>
+        <p:spPr>
+          <a:xfrm>
+            <a:off x="3523488" y="10"/>
+            <a:ext cx="8668512" cy="6857990"/>
+          </a:xfrm>
+          <a:prstGeom prst="rect">
+            <a:avLst/>
+          </a:prstGeom>
+        </p:spPr>
+      </p:pic>
+      <p:pic>
+        <p:nvPicPr>
+          <p:cNvPr id="7" name="Picture 6" descr="A picture containing text, clipart&#10;&#10;Description automatically generated">
+            <a:extLst>
+              <a:ext uri="{FF2B5EF4-FFF2-40B4-BE49-F238E27FC236}">
+                <a16:creationId xmlns:a16="http://schemas.microsoft.com/office/drawing/2014/main" id="{0A45E6AA-E181-457E-9692-7CB1DEAE3DED}"/>
+              </a:ext>
+            </a:extLst>
+          </p:cNvPr>
+          <p:cNvPicPr>
+            <a:picLocks noChangeAspect="1"/>
+          </p:cNvPicPr>
+          <p:nvPr/>
+        </p:nvPicPr>
+        <p:blipFill>
+          <a:blip r:embed="rId3">
+            <a:extLst>
+              <a:ext uri="{28A0092B-C50C-407E-A947-70E740481C1C}">
+                <a14:useLocalDpi xmlns:a14="http://schemas.microsoft.com/office/drawing/2010/main" val="0"/>
+              </a:ext>
+            </a:extLst>
+          </a:blip>
+          <a:stretch>
+            <a:fillRect/>
+          </a:stretch>
+        </p:blipFill>
+        <p:spPr>
+          <a:xfrm>
+            <a:off x="9488654" y="6178877"/>
+            <a:ext cx="2703346" cy="679123"/>
+          </a:xfrm>
+          <a:prstGeom prst="rect">
+            <a:avLst/>
+          </a:prstGeom>
+        </p:spPr>
+      </p:pic>
+      <p:sp>
+        <p:nvSpPr>
+          <p:cNvPr id="13" name="Subtitle 2">
+            <a:extLst>
+              <a:ext uri="{FF2B5EF4-FFF2-40B4-BE49-F238E27FC236}">
+                <a16:creationId xmlns:a16="http://schemas.microsoft.com/office/drawing/2014/main" id="{74B8D09A-8A38-4470-AD4E-824B5C81CE98}"/>
               </a:ext>
             </a:extLst>
           </p:cNvPr>
@@ -4522,22 +7012,149 @@
             <a:spLocks noGrp="1"/>
           </p:cNvSpPr>
           <p:nvPr>
-            <p:ph idx="1"/>
+            <p:ph type="subTitle" idx="1"/>
           </p:nvPr>
         </p:nvSpPr>
-        <p:spPr/>
-        <p:txBody>
-          <a:bodyPr/>
-          <a:lstStyle/>
-          <a:p>
-            <a:endParaRPr lang="en-US" dirty="0"/>
+        <p:spPr>
+          <a:xfrm>
+            <a:off x="410071" y="782801"/>
+            <a:ext cx="4988276" cy="4432666"/>
+          </a:xfrm>
+        </p:spPr>
+        <p:txBody>
+          <a:bodyPr>
+            <a:normAutofit fontScale="77500" lnSpcReduction="20000"/>
+          </a:bodyPr>
+          <a:lstStyle/>
+          <a:p>
+            <a:pPr marL="342900" indent="-342900" algn="l">
+              <a:buFont typeface="Arial" panose="020B0604020202020204" pitchFamily="34" charset="0"/>
+              <a:buChar char="•"/>
+            </a:pPr>
+            <a:endParaRPr lang="en-US" sz="2400" dirty="0">
+              <a:latin typeface="Times New Roman" panose="02020603050405020304" pitchFamily="18" charset="0"/>
+              <a:cs typeface="Times New Roman" panose="02020603050405020304" pitchFamily="18" charset="0"/>
+            </a:endParaRPr>
+          </a:p>
+          <a:p>
+            <a:pPr algn="l"/>
+            <a:endParaRPr lang="en-US" sz="2400" dirty="0">
+              <a:latin typeface="Times New Roman" panose="02020603050405020304" pitchFamily="18" charset="0"/>
+              <a:cs typeface="Times New Roman" panose="02020603050405020304" pitchFamily="18" charset="0"/>
+            </a:endParaRPr>
+          </a:p>
+          <a:p>
+            <a:pPr marL="342900" indent="-342900" algn="l">
+              <a:buFont typeface="Arial" panose="020B0604020202020204" pitchFamily="34" charset="0"/>
+              <a:buChar char="•"/>
+            </a:pPr>
+            <a:endParaRPr lang="en-US" sz="2400" dirty="0">
+              <a:latin typeface="Times New Roman" panose="02020603050405020304" pitchFamily="18" charset="0"/>
+              <a:cs typeface="Times New Roman" panose="02020603050405020304" pitchFamily="18" charset="0"/>
+            </a:endParaRPr>
+          </a:p>
+          <a:p>
+            <a:pPr marL="342900" indent="-342900" algn="l">
+              <a:lnSpc>
+                <a:spcPct val="120000"/>
+              </a:lnSpc>
+              <a:buFont typeface="Arial" panose="020B0604020202020204" pitchFamily="34" charset="0"/>
+              <a:buChar char="•"/>
+            </a:pPr>
+            <a:r>
+              <a:rPr lang="en-US" sz="2900" dirty="0">
+                <a:latin typeface="Times New Roman" panose="02020603050405020304" pitchFamily="18" charset="0"/>
+                <a:cs typeface="Times New Roman" panose="02020603050405020304" pitchFamily="18" charset="0"/>
+              </a:rPr>
+              <a:t>Inventory management system is vulnerable to the SC disruptions</a:t>
+            </a:r>
+          </a:p>
+          <a:p>
+            <a:pPr marL="342900" indent="-342900" algn="l">
+              <a:lnSpc>
+                <a:spcPct val="120000"/>
+              </a:lnSpc>
+              <a:buFont typeface="Arial" panose="020B0604020202020204" pitchFamily="34" charset="0"/>
+              <a:buChar char="•"/>
+            </a:pPr>
+            <a:r>
+              <a:rPr lang="en-US" sz="2900" dirty="0">
+                <a:latin typeface="Times New Roman" panose="02020603050405020304" pitchFamily="18" charset="0"/>
+                <a:cs typeface="Times New Roman" panose="02020603050405020304" pitchFamily="18" charset="0"/>
+              </a:rPr>
+              <a:t>Chained-CUBO technique </a:t>
+            </a:r>
+          </a:p>
+          <a:p>
+            <a:pPr marL="342900" indent="-342900" algn="l">
+              <a:lnSpc>
+                <a:spcPct val="120000"/>
+              </a:lnSpc>
+              <a:buFont typeface="Arial" panose="020B0604020202020204" pitchFamily="34" charset="0"/>
+              <a:buChar char="•"/>
+            </a:pPr>
+            <a:r>
+              <a:rPr lang="en-US" sz="2900" dirty="0">
+                <a:latin typeface="Times New Roman" panose="02020603050405020304" pitchFamily="18" charset="0"/>
+                <a:cs typeface="Times New Roman" panose="02020603050405020304" pitchFamily="18" charset="0"/>
+              </a:rPr>
+              <a:t>Best suitable set of suppliers </a:t>
+            </a:r>
+          </a:p>
+          <a:p>
+            <a:pPr marL="342900" indent="-342900" algn="l">
+              <a:lnSpc>
+                <a:spcPct val="120000"/>
+              </a:lnSpc>
+              <a:buFont typeface="Arial" panose="020B0604020202020204" pitchFamily="34" charset="0"/>
+              <a:buChar char="•"/>
+            </a:pPr>
+            <a:r>
+              <a:rPr lang="en-US" sz="2900" dirty="0">
+                <a:latin typeface="Times New Roman" panose="02020603050405020304" pitchFamily="18" charset="0"/>
+                <a:cs typeface="Times New Roman" panose="02020603050405020304" pitchFamily="18" charset="0"/>
+              </a:rPr>
+              <a:t>Maximize inventory profit</a:t>
+            </a:r>
+          </a:p>
+          <a:p>
+            <a:pPr marL="342900" indent="-342900" algn="l">
+              <a:lnSpc>
+                <a:spcPct val="120000"/>
+              </a:lnSpc>
+              <a:buFont typeface="Arial" panose="020B0604020202020204" pitchFamily="34" charset="0"/>
+              <a:buChar char="•"/>
+            </a:pPr>
+            <a:r>
+              <a:rPr lang="en-US" sz="2900" dirty="0">
+                <a:latin typeface="Times New Roman" panose="02020603050405020304" pitchFamily="18" charset="0"/>
+                <a:cs typeface="Times New Roman" panose="02020603050405020304" pitchFamily="18" charset="0"/>
+              </a:rPr>
+              <a:t>Build your company’s resilience</a:t>
+            </a:r>
+            <a:br>
+              <a:rPr lang="en-US" sz="2900" dirty="0">
+                <a:latin typeface="Times New Roman" panose="02020603050405020304" pitchFamily="18" charset="0"/>
+                <a:cs typeface="Times New Roman" panose="02020603050405020304" pitchFamily="18" charset="0"/>
+              </a:rPr>
+            </a:br>
+            <a:br>
+              <a:rPr lang="en-US" sz="2900" dirty="0">
+                <a:latin typeface="Times New Roman" panose="02020603050405020304" pitchFamily="18" charset="0"/>
+                <a:cs typeface="Times New Roman" panose="02020603050405020304" pitchFamily="18" charset="0"/>
+              </a:rPr>
+            </a:br>
+            <a:endParaRPr lang="en-MY" sz="2900" dirty="0">
+              <a:latin typeface="Times New Roman" panose="02020603050405020304" pitchFamily="18" charset="0"/>
+              <a:cs typeface="Times New Roman" panose="02020603050405020304" pitchFamily="18" charset="0"/>
+            </a:endParaRPr>
           </a:p>
         </p:txBody>
       </p:sp>
     </p:spTree>
     <p:extLst>
       <p:ext uri="{BB962C8B-B14F-4D97-AF65-F5344CB8AC3E}">
-        <p14:creationId xmlns:p14="http://schemas.microsoft.com/office/powerpoint/2010/main" val="2019088010"/>
+        <p14:creationId xmlns:p14="http://schemas.microsoft.com/office/powerpoint/2010/main" val="903607634"/>
       </p:ext>
     </p:extLst>
   </p:cSld>

</xml_diff>